<commit_message>
Taking notes as I read multilayer films chapter
</commit_message>
<xml_diff>
--- a/Presentations/Theory of Multilayer Films.pptx
+++ b/Presentations/Theory of Multilayer Films.pptx
@@ -2,10 +2,13 @@
 <file path=ppt/presentation.xml><?xml version="1.0" encoding="utf-8"?>
 <p:presentation xmlns:a="http://schemas.openxmlformats.org/drawingml/2006/main" xmlns:r="http://schemas.openxmlformats.org/officeDocument/2006/relationships" xmlns:p="http://schemas.openxmlformats.org/presentationml/2006/main" saveSubsetFonts="1" autoCompressPictures="0">
   <p:sldMasterIdLst>
-    <p:sldMasterId id="2147483648" r:id="rId1"/>
+    <p:sldMasterId id="2147483686" r:id="rId1"/>
   </p:sldMasterIdLst>
   <p:sldIdLst>
     <p:sldId id="256" r:id="rId2"/>
+    <p:sldId id="257" r:id="rId3"/>
+    <p:sldId id="258" r:id="rId4"/>
+    <p:sldId id="259" r:id="rId5"/>
   </p:sldIdLst>
   <p:sldSz cx="12192000" cy="6858000"/>
   <p:notesSz cx="6858000" cy="9144000"/>
@@ -104,11 +107,16 @@
       </a:defRPr>
     </a:lvl9pPr>
   </p:defaultTextStyle>
+  <p:extLst>
+    <p:ext uri="{EFAFB233-063F-42B5-8137-9DF3F51BA10A}">
+      <p15:sldGuideLst xmlns:p15="http://schemas.microsoft.com/office/powerpoint/2012/main"/>
+    </p:ext>
+  </p:extLst>
 </p:presentation>
 </file>
 
 <file path=ppt/slideLayouts/slideLayout1.xml><?xml version="1.0" encoding="utf-8"?>
-<p:sldLayout xmlns:a="http://schemas.openxmlformats.org/drawingml/2006/main" xmlns:r="http://schemas.openxmlformats.org/officeDocument/2006/relationships" xmlns:p="http://schemas.openxmlformats.org/presentationml/2006/main" type="title" preserve="1">
+<p:sldLayout xmlns:a="http://schemas.openxmlformats.org/drawingml/2006/main" xmlns:r="http://schemas.openxmlformats.org/officeDocument/2006/relationships" xmlns:p="http://schemas.openxmlformats.org/presentationml/2006/main" showMasterSp="0" type="title" preserve="1">
   <p:cSld name="Title Slide">
     <p:spTree>
       <p:nvGrpSpPr>
@@ -126,36 +134,232 @@
       </p:grpSpPr>
       <p:sp>
         <p:nvSpPr>
-          <p:cNvPr id="2" name="Title 1">
-            <a:extLst>
-              <a:ext uri="{FF2B5EF4-FFF2-40B4-BE49-F238E27FC236}">
-                <a16:creationId xmlns:a16="http://schemas.microsoft.com/office/drawing/2014/main" id="{6EF442C1-24A9-02B8-5D04-D737572EB4DD}"/>
-              </a:ext>
-            </a:extLst>
-          </p:cNvPr>
-          <p:cNvSpPr>
-            <a:spLocks noGrp="1"/>
-          </p:cNvSpPr>
-          <p:nvPr>
-            <p:ph type="ctrTitle"/>
-          </p:nvPr>
+          <p:cNvPr id="18" name="Freeform: Shape 17">
+            <a:extLst>
+              <a:ext uri="{FF2B5EF4-FFF2-40B4-BE49-F238E27FC236}">
+                <a16:creationId xmlns:a16="http://schemas.microsoft.com/office/drawing/2014/main" id="{5CD60141-EEBD-4EC1-8E34-0344C16A18A2}"/>
+              </a:ext>
+              <a:ext uri="{C183D7F6-B498-43B3-948B-1728B52AA6E4}">
+                <adec:decorative xmlns:adec="http://schemas.microsoft.com/office/drawing/2017/decorative" val="1"/>
+              </a:ext>
+            </a:extLst>
+          </p:cNvPr>
+          <p:cNvSpPr/>
+          <p:nvPr/>
         </p:nvSpPr>
         <p:spPr>
           <a:xfrm>
-            <a:off x="1524000" y="1122363"/>
-            <a:ext cx="9144000" cy="2387600"/>
+            <a:off x="5318308" y="0"/>
+            <a:ext cx="6873692" cy="6858000"/>
+          </a:xfrm>
+          <a:custGeom>
+            <a:avLst/>
+            <a:gdLst>
+              <a:gd name="connsiteX0" fmla="*/ 11328900 w 12192000"/>
+              <a:gd name="connsiteY0" fmla="*/ 0 h 6858000"/>
+              <a:gd name="connsiteX1" fmla="*/ 12192000 w 12192000"/>
+              <a:gd name="connsiteY1" fmla="*/ 0 h 6858000"/>
+              <a:gd name="connsiteX2" fmla="*/ 12192000 w 12192000"/>
+              <a:gd name="connsiteY2" fmla="*/ 6858000 h 6858000"/>
+              <a:gd name="connsiteX3" fmla="*/ 5318308 w 12192000"/>
+              <a:gd name="connsiteY3" fmla="*/ 6858000 h 6858000"/>
+              <a:gd name="connsiteX4" fmla="*/ 11328897 w 12192000"/>
+              <a:gd name="connsiteY4" fmla="*/ 4 h 6858000"/>
+              <a:gd name="connsiteX5" fmla="*/ 11328898 w 12192000"/>
+              <a:gd name="connsiteY5" fmla="*/ 2 h 6858000"/>
+              <a:gd name="connsiteX6" fmla="*/ 0 w 12192000"/>
+              <a:gd name="connsiteY6" fmla="*/ 0 h 6858000"/>
+              <a:gd name="connsiteX7" fmla="*/ 6700 w 12192000"/>
+              <a:gd name="connsiteY7" fmla="*/ 0 h 6858000"/>
+              <a:gd name="connsiteX8" fmla="*/ 6700 w 12192000"/>
+              <a:gd name="connsiteY8" fmla="*/ 6858000 h 6858000"/>
+              <a:gd name="connsiteX9" fmla="*/ 0 w 12192000"/>
+              <a:gd name="connsiteY9" fmla="*/ 6858000 h 6858000"/>
+              <a:gd name="connsiteX0" fmla="*/ 11328900 w 12192000"/>
+              <a:gd name="connsiteY0" fmla="*/ 0 h 6858000"/>
+              <a:gd name="connsiteX1" fmla="*/ 12192000 w 12192000"/>
+              <a:gd name="connsiteY1" fmla="*/ 0 h 6858000"/>
+              <a:gd name="connsiteX2" fmla="*/ 12192000 w 12192000"/>
+              <a:gd name="connsiteY2" fmla="*/ 6858000 h 6858000"/>
+              <a:gd name="connsiteX3" fmla="*/ 5318308 w 12192000"/>
+              <a:gd name="connsiteY3" fmla="*/ 6858000 h 6858000"/>
+              <a:gd name="connsiteX4" fmla="*/ 11328897 w 12192000"/>
+              <a:gd name="connsiteY4" fmla="*/ 4 h 6858000"/>
+              <a:gd name="connsiteX5" fmla="*/ 11328898 w 12192000"/>
+              <a:gd name="connsiteY5" fmla="*/ 2 h 6858000"/>
+              <a:gd name="connsiteX6" fmla="*/ 11328900 w 12192000"/>
+              <a:gd name="connsiteY6" fmla="*/ 0 h 6858000"/>
+              <a:gd name="connsiteX7" fmla="*/ 0 w 12192000"/>
+              <a:gd name="connsiteY7" fmla="*/ 6858000 h 6858000"/>
+              <a:gd name="connsiteX8" fmla="*/ 6700 w 12192000"/>
+              <a:gd name="connsiteY8" fmla="*/ 0 h 6858000"/>
+              <a:gd name="connsiteX9" fmla="*/ 6700 w 12192000"/>
+              <a:gd name="connsiteY9" fmla="*/ 6858000 h 6858000"/>
+              <a:gd name="connsiteX10" fmla="*/ 0 w 12192000"/>
+              <a:gd name="connsiteY10" fmla="*/ 6858000 h 6858000"/>
+              <a:gd name="connsiteX0" fmla="*/ 11322200 w 12185300"/>
+              <a:gd name="connsiteY0" fmla="*/ 0 h 6858000"/>
+              <a:gd name="connsiteX1" fmla="*/ 12185300 w 12185300"/>
+              <a:gd name="connsiteY1" fmla="*/ 0 h 6858000"/>
+              <a:gd name="connsiteX2" fmla="*/ 12185300 w 12185300"/>
+              <a:gd name="connsiteY2" fmla="*/ 6858000 h 6858000"/>
+              <a:gd name="connsiteX3" fmla="*/ 5311608 w 12185300"/>
+              <a:gd name="connsiteY3" fmla="*/ 6858000 h 6858000"/>
+              <a:gd name="connsiteX4" fmla="*/ 11322197 w 12185300"/>
+              <a:gd name="connsiteY4" fmla="*/ 4 h 6858000"/>
+              <a:gd name="connsiteX5" fmla="*/ 11322198 w 12185300"/>
+              <a:gd name="connsiteY5" fmla="*/ 2 h 6858000"/>
+              <a:gd name="connsiteX6" fmla="*/ 11322200 w 12185300"/>
+              <a:gd name="connsiteY6" fmla="*/ 0 h 6858000"/>
+              <a:gd name="connsiteX7" fmla="*/ 0 w 12185300"/>
+              <a:gd name="connsiteY7" fmla="*/ 6858000 h 6858000"/>
+              <a:gd name="connsiteX8" fmla="*/ 0 w 12185300"/>
+              <a:gd name="connsiteY8" fmla="*/ 0 h 6858000"/>
+              <a:gd name="connsiteX9" fmla="*/ 0 w 12185300"/>
+              <a:gd name="connsiteY9" fmla="*/ 6858000 h 6858000"/>
+              <a:gd name="connsiteX0" fmla="*/ 6010592 w 6873692"/>
+              <a:gd name="connsiteY0" fmla="*/ 0 h 6858000"/>
+              <a:gd name="connsiteX1" fmla="*/ 6873692 w 6873692"/>
+              <a:gd name="connsiteY1" fmla="*/ 0 h 6858000"/>
+              <a:gd name="connsiteX2" fmla="*/ 6873692 w 6873692"/>
+              <a:gd name="connsiteY2" fmla="*/ 6858000 h 6858000"/>
+              <a:gd name="connsiteX3" fmla="*/ 0 w 6873692"/>
+              <a:gd name="connsiteY3" fmla="*/ 6858000 h 6858000"/>
+              <a:gd name="connsiteX4" fmla="*/ 6010589 w 6873692"/>
+              <a:gd name="connsiteY4" fmla="*/ 4 h 6858000"/>
+              <a:gd name="connsiteX5" fmla="*/ 6010590 w 6873692"/>
+              <a:gd name="connsiteY5" fmla="*/ 2 h 6858000"/>
+              <a:gd name="connsiteX6" fmla="*/ 6010592 w 6873692"/>
+              <a:gd name="connsiteY6" fmla="*/ 0 h 6858000"/>
+            </a:gdLst>
+            <a:ahLst/>
+            <a:cxnLst>
+              <a:cxn ang="0">
+                <a:pos x="connsiteX0" y="connsiteY0"/>
+              </a:cxn>
+              <a:cxn ang="0">
+                <a:pos x="connsiteX1" y="connsiteY1"/>
+              </a:cxn>
+              <a:cxn ang="0">
+                <a:pos x="connsiteX2" y="connsiteY2"/>
+              </a:cxn>
+              <a:cxn ang="0">
+                <a:pos x="connsiteX3" y="connsiteY3"/>
+              </a:cxn>
+              <a:cxn ang="0">
+                <a:pos x="connsiteX4" y="connsiteY4"/>
+              </a:cxn>
+              <a:cxn ang="0">
+                <a:pos x="connsiteX5" y="connsiteY5"/>
+              </a:cxn>
+              <a:cxn ang="0">
+                <a:pos x="connsiteX6" y="connsiteY6"/>
+              </a:cxn>
+            </a:cxnLst>
+            <a:rect l="l" t="t" r="r" b="b"/>
+            <a:pathLst>
+              <a:path w="6873692" h="6858000">
+                <a:moveTo>
+                  <a:pt x="6010592" y="0"/>
+                </a:moveTo>
+                <a:lnTo>
+                  <a:pt x="6873692" y="0"/>
+                </a:lnTo>
+                <a:lnTo>
+                  <a:pt x="6873692" y="6858000"/>
+                </a:lnTo>
+                <a:lnTo>
+                  <a:pt x="0" y="6858000"/>
+                </a:lnTo>
+                <a:lnTo>
+                  <a:pt x="6010589" y="4"/>
+                </a:lnTo>
+                <a:cubicBezTo>
+                  <a:pt x="6010589" y="3"/>
+                  <a:pt x="6010590" y="3"/>
+                  <a:pt x="6010590" y="2"/>
+                </a:cubicBezTo>
+                <a:lnTo>
+                  <a:pt x="6010592" y="0"/>
+                </a:lnTo>
+                <a:close/>
+              </a:path>
+            </a:pathLst>
+          </a:custGeom>
+          <a:solidFill>
+            <a:schemeClr val="bg2"/>
+          </a:solidFill>
+          <a:ln w="12700" cap="flat" cmpd="sng" algn="ctr">
+            <a:noFill/>
+            <a:prstDash val="solid"/>
+            <a:miter lim="800000"/>
+          </a:ln>
+          <a:effectLst/>
+        </p:spPr>
+        <p:style>
+          <a:lnRef idx="2">
+            <a:schemeClr val="accent1">
+              <a:shade val="50000"/>
+            </a:schemeClr>
+          </a:lnRef>
+          <a:fillRef idx="1">
+            <a:schemeClr val="accent1"/>
+          </a:fillRef>
+          <a:effectRef idx="0">
+            <a:schemeClr val="accent1"/>
+          </a:effectRef>
+          <a:fontRef idx="minor">
+            <a:schemeClr val="lt1"/>
+          </a:fontRef>
+        </p:style>
+        <p:txBody>
+          <a:bodyPr wrap="square" rtlCol="0" anchor="ctr">
+            <a:noAutofit/>
+          </a:bodyPr>
+          <a:lstStyle/>
+          <a:p>
+            <a:pPr algn="ctr"/>
+            <a:endParaRPr lang="en-US"/>
+          </a:p>
+        </p:txBody>
+      </p:sp>
+      <p:sp>
+        <p:nvSpPr>
+          <p:cNvPr id="2" name="Title 1">
+            <a:extLst>
+              <a:ext uri="{FF2B5EF4-FFF2-40B4-BE49-F238E27FC236}">
+                <a16:creationId xmlns:a16="http://schemas.microsoft.com/office/drawing/2014/main" id="{A65FCBBA-905A-4FD1-BFBA-F3EE6DA264E0}"/>
+              </a:ext>
+            </a:extLst>
+          </p:cNvPr>
+          <p:cNvSpPr>
+            <a:spLocks noGrp="1"/>
+          </p:cNvSpPr>
+          <p:nvPr>
+            <p:ph type="ctrTitle"/>
+          </p:nvPr>
+        </p:nvSpPr>
+        <p:spPr>
+          <a:xfrm>
+            <a:off x="1143000" y="1181098"/>
+            <a:ext cx="8986580" cy="2832404"/>
           </a:xfrm>
         </p:spPr>
         <p:txBody>
-          <a:bodyPr anchor="b"/>
+          <a:bodyPr anchor="t">
+            <a:normAutofit/>
+          </a:bodyPr>
           <a:lstStyle>
-            <a:lvl1pPr algn="ctr">
-              <a:defRPr sz="6000"/>
+            <a:lvl1pPr algn="l">
+              <a:lnSpc>
+                <a:spcPct val="100000"/>
+              </a:lnSpc>
+              <a:defRPr sz="4800" cap="all" spc="300" baseline="0"/>
             </a:lvl1pPr>
           </a:lstStyle>
           <a:p>
             <a:r>
-              <a:rPr lang="en-US"/>
+              <a:rPr lang="en-US" dirty="0"/>
               <a:t>Click to edit Master title style</a:t>
             </a:r>
           </a:p>
@@ -166,7 +370,7 @@
           <p:cNvPr id="3" name="Subtitle 2">
             <a:extLst>
               <a:ext uri="{FF2B5EF4-FFF2-40B4-BE49-F238E27FC236}">
-                <a16:creationId xmlns:a16="http://schemas.microsoft.com/office/drawing/2014/main" id="{1E1D8490-774F-F741-A11D-A93EE803EB08}"/>
+                <a16:creationId xmlns:a16="http://schemas.microsoft.com/office/drawing/2014/main" id="{13DD287E-F1C8-463F-8429-D1B5B1582520}"/>
               </a:ext>
             </a:extLst>
           </p:cNvPr>
@@ -179,16 +383,21 @@
         </p:nvSpPr>
         <p:spPr>
           <a:xfrm>
-            <a:off x="1524000" y="3602038"/>
-            <a:ext cx="9144000" cy="1655762"/>
+            <a:off x="1143000" y="5463522"/>
+            <a:ext cx="8986580" cy="650311"/>
           </a:xfrm>
         </p:spPr>
         <p:txBody>
-          <a:bodyPr/>
+          <a:bodyPr>
+            <a:normAutofit/>
+          </a:bodyPr>
           <a:lstStyle>
-            <a:lvl1pPr marL="0" indent="0" algn="ctr">
-              <a:buNone/>
-              <a:defRPr sz="2400"/>
+            <a:lvl1pPr marL="0" indent="0" algn="l">
+              <a:lnSpc>
+                <a:spcPct val="100000"/>
+              </a:lnSpc>
+              <a:buNone/>
+              <a:defRPr sz="1800"/>
             </a:lvl1pPr>
             <a:lvl2pPr marL="457200" indent="0" algn="ctr">
               <a:buNone/>
@@ -225,7 +434,7 @@
           </a:lstStyle>
           <a:p>
             <a:r>
-              <a:rPr lang="en-US"/>
+              <a:rPr lang="en-US" dirty="0"/>
               <a:t>Click to edit Master subtitle style</a:t>
             </a:r>
           </a:p>
@@ -236,7 +445,7 @@
           <p:cNvPr id="4" name="Date Placeholder 3">
             <a:extLst>
               <a:ext uri="{FF2B5EF4-FFF2-40B4-BE49-F238E27FC236}">
-                <a16:creationId xmlns:a16="http://schemas.microsoft.com/office/drawing/2014/main" id="{638D8D60-3BB6-54F9-8824-835590F6891A}"/>
+                <a16:creationId xmlns:a16="http://schemas.microsoft.com/office/drawing/2014/main" id="{A81F44ED-7973-4A99-B2CA-A8962BCE0D5D}"/>
               </a:ext>
             </a:extLst>
           </p:cNvPr>
@@ -252,7 +461,7 @@
           <a:bodyPr/>
           <a:lstStyle/>
           <a:p>
-            <a:fld id="{FE6A70BB-274E-3D43-8283-A9C170117839}" type="datetimeFigureOut">
+            <a:fld id="{3CADBD16-5BFB-4D9F-9646-C75D1B53BBB6}" type="datetimeFigureOut">
               <a:rPr lang="en-US" smtClean="0"/>
               <a:t>11/19/23</a:t>
             </a:fld>
@@ -265,7 +474,7 @@
           <p:cNvPr id="5" name="Footer Placeholder 4">
             <a:extLst>
               <a:ext uri="{FF2B5EF4-FFF2-40B4-BE49-F238E27FC236}">
-                <a16:creationId xmlns:a16="http://schemas.microsoft.com/office/drawing/2014/main" id="{20F8F93E-D3A8-D539-75BF-7F4021F2E653}"/>
+                <a16:creationId xmlns:a16="http://schemas.microsoft.com/office/drawing/2014/main" id="{08DF96F2-D6BE-49AC-A605-5AE87C3F2F10}"/>
               </a:ext>
             </a:extLst>
           </p:cNvPr>
@@ -290,7 +499,7 @@
           <p:cNvPr id="6" name="Slide Number Placeholder 5">
             <a:extLst>
               <a:ext uri="{FF2B5EF4-FFF2-40B4-BE49-F238E27FC236}">
-                <a16:creationId xmlns:a16="http://schemas.microsoft.com/office/drawing/2014/main" id="{2E558381-C586-6D0B-3CAC-8A80B2BD908A}"/>
+                <a16:creationId xmlns:a16="http://schemas.microsoft.com/office/drawing/2014/main" id="{1817FC50-B13C-4B63-AE64-F71A6EDE63B6}"/>
               </a:ext>
             </a:extLst>
           </p:cNvPr>
@@ -306,7 +515,7 @@
           <a:bodyPr/>
           <a:lstStyle/>
           <a:p>
-            <a:fld id="{E5F80103-A353-9143-ABE1-D1723BD49AAE}" type="slidenum">
+            <a:fld id="{C0722274-0FAA-4649-AA4E-4210F4F32167}" type="slidenum">
               <a:rPr lang="en-US" smtClean="0"/>
               <a:t>‹#›</a:t>
             </a:fld>
@@ -314,10 +523,53 @@
           </a:p>
         </p:txBody>
       </p:sp>
+      <p:cxnSp>
+        <p:nvCxnSpPr>
+          <p:cNvPr id="12" name="Straight Connector 11">
+            <a:extLst>
+              <a:ext uri="{FF2B5EF4-FFF2-40B4-BE49-F238E27FC236}">
+                <a16:creationId xmlns:a16="http://schemas.microsoft.com/office/drawing/2014/main" id="{4C75A547-BCD1-42BE-966E-53CA0AB93165}"/>
+              </a:ext>
+            </a:extLst>
+          </p:cNvPr>
+          <p:cNvCxnSpPr>
+            <a:cxnSpLocks/>
+          </p:cNvCxnSpPr>
+          <p:nvPr/>
+        </p:nvCxnSpPr>
+        <p:spPr>
+          <a:xfrm>
+            <a:off x="1188357" y="5151666"/>
+            <a:ext cx="9822543" cy="0"/>
+          </a:xfrm>
+          <a:prstGeom prst="line">
+            <a:avLst/>
+          </a:prstGeom>
+          <a:ln w="12700">
+            <a:solidFill>
+              <a:schemeClr val="tx1"/>
+            </a:solidFill>
+          </a:ln>
+        </p:spPr>
+        <p:style>
+          <a:lnRef idx="1">
+            <a:schemeClr val="accent1"/>
+          </a:lnRef>
+          <a:fillRef idx="0">
+            <a:schemeClr val="accent1"/>
+          </a:fillRef>
+          <a:effectRef idx="0">
+            <a:schemeClr val="accent1"/>
+          </a:effectRef>
+          <a:fontRef idx="minor">
+            <a:schemeClr val="tx1"/>
+          </a:fontRef>
+        </p:style>
+      </p:cxnSp>
     </p:spTree>
     <p:extLst>
       <p:ext uri="{BB962C8B-B14F-4D97-AF65-F5344CB8AC3E}">
-        <p14:creationId xmlns:p14="http://schemas.microsoft.com/office/powerpoint/2010/main" val="1864357918"/>
+        <p14:creationId xmlns:p14="http://schemas.microsoft.com/office/powerpoint/2010/main" val="345877031"/>
       </p:ext>
     </p:extLst>
   </p:cSld>
@@ -349,7 +601,7 @@
           <p:cNvPr id="2" name="Title 1">
             <a:extLst>
               <a:ext uri="{FF2B5EF4-FFF2-40B4-BE49-F238E27FC236}">
-                <a16:creationId xmlns:a16="http://schemas.microsoft.com/office/drawing/2014/main" id="{0EBBEF9B-578A-C846-7D3D-D04CFCE9ADD6}"/>
+                <a16:creationId xmlns:a16="http://schemas.microsoft.com/office/drawing/2014/main" id="{8A5A3BF2-BCE9-47D7-B1C0-1F0E4936B6B3}"/>
               </a:ext>
             </a:extLst>
           </p:cNvPr>
@@ -377,7 +629,7 @@
           <p:cNvPr id="3" name="Vertical Text Placeholder 2">
             <a:extLst>
               <a:ext uri="{FF2B5EF4-FFF2-40B4-BE49-F238E27FC236}">
-                <a16:creationId xmlns:a16="http://schemas.microsoft.com/office/drawing/2014/main" id="{61290EB7-0EDE-7295-F9CE-93B94CAF78F0}"/>
+                <a16:creationId xmlns:a16="http://schemas.microsoft.com/office/drawing/2014/main" id="{692722E9-C3E4-48AF-996A-495AE659FA6E}"/>
               </a:ext>
             </a:extLst>
           </p:cNvPr>
@@ -434,7 +686,7 @@
           <p:cNvPr id="4" name="Date Placeholder 3">
             <a:extLst>
               <a:ext uri="{FF2B5EF4-FFF2-40B4-BE49-F238E27FC236}">
-                <a16:creationId xmlns:a16="http://schemas.microsoft.com/office/drawing/2014/main" id="{E1DBFE09-6D8E-3DFF-ECCA-8EDBCA19CC34}"/>
+                <a16:creationId xmlns:a16="http://schemas.microsoft.com/office/drawing/2014/main" id="{19C9E516-382B-4845-93BF-20C16EE0DB05}"/>
               </a:ext>
             </a:extLst>
           </p:cNvPr>
@@ -450,7 +702,7 @@
           <a:bodyPr/>
           <a:lstStyle/>
           <a:p>
-            <a:fld id="{FE6A70BB-274E-3D43-8283-A9C170117839}" type="datetimeFigureOut">
+            <a:fld id="{3CADBD16-5BFB-4D9F-9646-C75D1B53BBB6}" type="datetimeFigureOut">
               <a:rPr lang="en-US" smtClean="0"/>
               <a:t>11/19/23</a:t>
             </a:fld>
@@ -463,7 +715,7 @@
           <p:cNvPr id="5" name="Footer Placeholder 4">
             <a:extLst>
               <a:ext uri="{FF2B5EF4-FFF2-40B4-BE49-F238E27FC236}">
-                <a16:creationId xmlns:a16="http://schemas.microsoft.com/office/drawing/2014/main" id="{ADA1079D-EF40-2688-BECB-AF8C1B0CB03E}"/>
+                <a16:creationId xmlns:a16="http://schemas.microsoft.com/office/drawing/2014/main" id="{EAB96E16-F168-442A-843C-5D490D54B06A}"/>
               </a:ext>
             </a:extLst>
           </p:cNvPr>
@@ -488,7 +740,7 @@
           <p:cNvPr id="6" name="Slide Number Placeholder 5">
             <a:extLst>
               <a:ext uri="{FF2B5EF4-FFF2-40B4-BE49-F238E27FC236}">
-                <a16:creationId xmlns:a16="http://schemas.microsoft.com/office/drawing/2014/main" id="{356A30E8-F337-2A70-55A1-9C54E8FAA547}"/>
+                <a16:creationId xmlns:a16="http://schemas.microsoft.com/office/drawing/2014/main" id="{A9A61BEA-A969-437A-BD8B-CB1B709AD430}"/>
               </a:ext>
             </a:extLst>
           </p:cNvPr>
@@ -504,7 +756,7 @@
           <a:bodyPr/>
           <a:lstStyle/>
           <a:p>
-            <a:fld id="{E5F80103-A353-9143-ABE1-D1723BD49AAE}" type="slidenum">
+            <a:fld id="{C0722274-0FAA-4649-AA4E-4210F4F32167}" type="slidenum">
               <a:rPr lang="en-US" smtClean="0"/>
               <a:t>‹#›</a:t>
             </a:fld>
@@ -515,7 +767,7 @@
     </p:spTree>
     <p:extLst>
       <p:ext uri="{BB962C8B-B14F-4D97-AF65-F5344CB8AC3E}">
-        <p14:creationId xmlns:p14="http://schemas.microsoft.com/office/powerpoint/2010/main" val="3350109196"/>
+        <p14:creationId xmlns:p14="http://schemas.microsoft.com/office/powerpoint/2010/main" val="3457973534"/>
       </p:ext>
     </p:extLst>
   </p:cSld>
@@ -547,7 +799,7 @@
           <p:cNvPr id="2" name="Vertical Title 1">
             <a:extLst>
               <a:ext uri="{FF2B5EF4-FFF2-40B4-BE49-F238E27FC236}">
-                <a16:creationId xmlns:a16="http://schemas.microsoft.com/office/drawing/2014/main" id="{D9508A64-9AAF-4623-F92D-3C90F7AB1AA9}"/>
+                <a16:creationId xmlns:a16="http://schemas.microsoft.com/office/drawing/2014/main" id="{66528449-3E11-45FF-BF3A-651867603E75}"/>
               </a:ext>
             </a:extLst>
           </p:cNvPr>
@@ -560,8 +812,8 @@
         </p:nvSpPr>
         <p:spPr>
           <a:xfrm>
-            <a:off x="8724900" y="365125"/>
-            <a:ext cx="2628900" cy="5811838"/>
+            <a:off x="8572500" y="870625"/>
+            <a:ext cx="2476499" cy="5029201"/>
           </a:xfrm>
         </p:spPr>
         <p:txBody>
@@ -569,7 +821,7 @@
           <a:lstStyle/>
           <a:p>
             <a:r>
-              <a:rPr lang="en-US"/>
+              <a:rPr lang="en-US" dirty="0"/>
               <a:t>Click to edit Master title style</a:t>
             </a:r>
           </a:p>
@@ -580,7 +832,7 @@
           <p:cNvPr id="3" name="Vertical Text Placeholder 2">
             <a:extLst>
               <a:ext uri="{FF2B5EF4-FFF2-40B4-BE49-F238E27FC236}">
-                <a16:creationId xmlns:a16="http://schemas.microsoft.com/office/drawing/2014/main" id="{7C6123A6-1758-1281-EF03-E098FECA8CE5}"/>
+                <a16:creationId xmlns:a16="http://schemas.microsoft.com/office/drawing/2014/main" id="{AFC0EAB0-2DFA-4CBA-86B1-1826EF523D4D}"/>
               </a:ext>
             </a:extLst>
           </p:cNvPr>
@@ -593,8 +845,8 @@
         </p:nvSpPr>
         <p:spPr>
           <a:xfrm>
-            <a:off x="838200" y="365125"/>
-            <a:ext cx="7734300" cy="5811838"/>
+            <a:off x="1143000" y="870625"/>
+            <a:ext cx="7324928" cy="5029201"/>
           </a:xfrm>
         </p:spPr>
         <p:txBody>
@@ -603,35 +855,35 @@
           <a:p>
             <a:pPr lvl="0"/>
             <a:r>
-              <a:rPr lang="en-US"/>
+              <a:rPr lang="en-US" dirty="0"/>
               <a:t>Click to edit Master text styles</a:t>
             </a:r>
           </a:p>
           <a:p>
             <a:pPr lvl="1"/>
             <a:r>
-              <a:rPr lang="en-US"/>
+              <a:rPr lang="en-US" dirty="0"/>
               <a:t>Second level</a:t>
             </a:r>
           </a:p>
           <a:p>
             <a:pPr lvl="2"/>
             <a:r>
-              <a:rPr lang="en-US"/>
+              <a:rPr lang="en-US" dirty="0"/>
               <a:t>Third level</a:t>
             </a:r>
           </a:p>
           <a:p>
             <a:pPr lvl="3"/>
             <a:r>
-              <a:rPr lang="en-US"/>
+              <a:rPr lang="en-US" dirty="0"/>
               <a:t>Fourth level</a:t>
             </a:r>
           </a:p>
           <a:p>
             <a:pPr lvl="4"/>
             <a:r>
-              <a:rPr lang="en-US"/>
+              <a:rPr lang="en-US" dirty="0"/>
               <a:t>Fifth level</a:t>
             </a:r>
           </a:p>
@@ -642,7 +894,7 @@
           <p:cNvPr id="4" name="Date Placeholder 3">
             <a:extLst>
               <a:ext uri="{FF2B5EF4-FFF2-40B4-BE49-F238E27FC236}">
-                <a16:creationId xmlns:a16="http://schemas.microsoft.com/office/drawing/2014/main" id="{A02B503F-B228-3B12-5877-755527105F82}"/>
+                <a16:creationId xmlns:a16="http://schemas.microsoft.com/office/drawing/2014/main" id="{DFA22F89-E1F5-45D7-945A-8A2886C4BA59}"/>
               </a:ext>
             </a:extLst>
           </p:cNvPr>
@@ -658,7 +910,7 @@
           <a:bodyPr/>
           <a:lstStyle/>
           <a:p>
-            <a:fld id="{FE6A70BB-274E-3D43-8283-A9C170117839}" type="datetimeFigureOut">
+            <a:fld id="{3CADBD16-5BFB-4D9F-9646-C75D1B53BBB6}" type="datetimeFigureOut">
               <a:rPr lang="en-US" smtClean="0"/>
               <a:t>11/19/23</a:t>
             </a:fld>
@@ -671,7 +923,7 @@
           <p:cNvPr id="5" name="Footer Placeholder 4">
             <a:extLst>
               <a:ext uri="{FF2B5EF4-FFF2-40B4-BE49-F238E27FC236}">
-                <a16:creationId xmlns:a16="http://schemas.microsoft.com/office/drawing/2014/main" id="{56215299-9DBC-747C-995C-6A3FA99D9714}"/>
+                <a16:creationId xmlns:a16="http://schemas.microsoft.com/office/drawing/2014/main" id="{637E7E82-5FB8-4289-AD0C-0BA788E14794}"/>
               </a:ext>
             </a:extLst>
           </p:cNvPr>
@@ -696,7 +948,7 @@
           <p:cNvPr id="6" name="Slide Number Placeholder 5">
             <a:extLst>
               <a:ext uri="{FF2B5EF4-FFF2-40B4-BE49-F238E27FC236}">
-                <a16:creationId xmlns:a16="http://schemas.microsoft.com/office/drawing/2014/main" id="{1E33C576-2772-613C-B365-AA6D09B99EE3}"/>
+                <a16:creationId xmlns:a16="http://schemas.microsoft.com/office/drawing/2014/main" id="{245A4046-1A2C-41F5-A177-1C3919C20569}"/>
               </a:ext>
             </a:extLst>
           </p:cNvPr>
@@ -712,7 +964,7 @@
           <a:bodyPr/>
           <a:lstStyle/>
           <a:p>
-            <a:fld id="{E5F80103-A353-9143-ABE1-D1723BD49AAE}" type="slidenum">
+            <a:fld id="{C0722274-0FAA-4649-AA4E-4210F4F32167}" type="slidenum">
               <a:rPr lang="en-US" smtClean="0"/>
               <a:t>‹#›</a:t>
             </a:fld>
@@ -723,7 +975,7 @@
     </p:spTree>
     <p:extLst>
       <p:ext uri="{BB962C8B-B14F-4D97-AF65-F5344CB8AC3E}">
-        <p14:creationId xmlns:p14="http://schemas.microsoft.com/office/powerpoint/2010/main" val="1458320982"/>
+        <p14:creationId xmlns:p14="http://schemas.microsoft.com/office/powerpoint/2010/main" val="1969068061"/>
       </p:ext>
     </p:extLst>
   </p:cSld>
@@ -755,7 +1007,7 @@
           <p:cNvPr id="2" name="Title 1">
             <a:extLst>
               <a:ext uri="{FF2B5EF4-FFF2-40B4-BE49-F238E27FC236}">
-                <a16:creationId xmlns:a16="http://schemas.microsoft.com/office/drawing/2014/main" id="{7ED81C3C-5B11-4067-77A9-A05FF9AC4EFB}"/>
+                <a16:creationId xmlns:a16="http://schemas.microsoft.com/office/drawing/2014/main" id="{03ECD6F3-88F1-4195-8395-57AA096BB3B2}"/>
               </a:ext>
             </a:extLst>
           </p:cNvPr>
@@ -783,7 +1035,7 @@
           <p:cNvPr id="3" name="Content Placeholder 2">
             <a:extLst>
               <a:ext uri="{FF2B5EF4-FFF2-40B4-BE49-F238E27FC236}">
-                <a16:creationId xmlns:a16="http://schemas.microsoft.com/office/drawing/2014/main" id="{D4DD62BC-B3BB-8098-3604-E835FD4AF0AE}"/>
+                <a16:creationId xmlns:a16="http://schemas.microsoft.com/office/drawing/2014/main" id="{CED8D06C-EB08-40B3-AFB3-A62F4411221C}"/>
               </a:ext>
             </a:extLst>
           </p:cNvPr>
@@ -840,7 +1092,7 @@
           <p:cNvPr id="4" name="Date Placeholder 3">
             <a:extLst>
               <a:ext uri="{FF2B5EF4-FFF2-40B4-BE49-F238E27FC236}">
-                <a16:creationId xmlns:a16="http://schemas.microsoft.com/office/drawing/2014/main" id="{921FFCC0-666A-B95D-E8C0-609ABA4B5E3A}"/>
+                <a16:creationId xmlns:a16="http://schemas.microsoft.com/office/drawing/2014/main" id="{6103962F-B413-4C4C-A490-724DDB9E7DB9}"/>
               </a:ext>
             </a:extLst>
           </p:cNvPr>
@@ -856,7 +1108,7 @@
           <a:bodyPr/>
           <a:lstStyle/>
           <a:p>
-            <a:fld id="{FE6A70BB-274E-3D43-8283-A9C170117839}" type="datetimeFigureOut">
+            <a:fld id="{3CADBD16-5BFB-4D9F-9646-C75D1B53BBB6}" type="datetimeFigureOut">
               <a:rPr lang="en-US" smtClean="0"/>
               <a:t>11/19/23</a:t>
             </a:fld>
@@ -869,7 +1121,7 @@
           <p:cNvPr id="5" name="Footer Placeholder 4">
             <a:extLst>
               <a:ext uri="{FF2B5EF4-FFF2-40B4-BE49-F238E27FC236}">
-                <a16:creationId xmlns:a16="http://schemas.microsoft.com/office/drawing/2014/main" id="{EC70E1A6-FC90-AED5-34C0-FCAB9DE18E7E}"/>
+                <a16:creationId xmlns:a16="http://schemas.microsoft.com/office/drawing/2014/main" id="{02871813-4E87-4C04-835D-76246010B069}"/>
               </a:ext>
             </a:extLst>
           </p:cNvPr>
@@ -894,7 +1146,7 @@
           <p:cNvPr id="6" name="Slide Number Placeholder 5">
             <a:extLst>
               <a:ext uri="{FF2B5EF4-FFF2-40B4-BE49-F238E27FC236}">
-                <a16:creationId xmlns:a16="http://schemas.microsoft.com/office/drawing/2014/main" id="{1AF4319E-B612-4F67-69EC-A7B2F55B7E59}"/>
+                <a16:creationId xmlns:a16="http://schemas.microsoft.com/office/drawing/2014/main" id="{3A922BA3-033C-491E-A045-F0052AC19A8C}"/>
               </a:ext>
             </a:extLst>
           </p:cNvPr>
@@ -910,7 +1162,7 @@
           <a:bodyPr/>
           <a:lstStyle/>
           <a:p>
-            <a:fld id="{E5F80103-A353-9143-ABE1-D1723BD49AAE}" type="slidenum">
+            <a:fld id="{C0722274-0FAA-4649-AA4E-4210F4F32167}" type="slidenum">
               <a:rPr lang="en-US" smtClean="0"/>
               <a:t>‹#›</a:t>
             </a:fld>
@@ -921,7 +1173,7 @@
     </p:spTree>
     <p:extLst>
       <p:ext uri="{BB962C8B-B14F-4D97-AF65-F5344CB8AC3E}">
-        <p14:creationId xmlns:p14="http://schemas.microsoft.com/office/powerpoint/2010/main" val="3392374829"/>
+        <p14:creationId xmlns:p14="http://schemas.microsoft.com/office/powerpoint/2010/main" val="2340469914"/>
       </p:ext>
     </p:extLst>
   </p:cSld>
@@ -953,7 +1205,7 @@
           <p:cNvPr id="2" name="Title 1">
             <a:extLst>
               <a:ext uri="{FF2B5EF4-FFF2-40B4-BE49-F238E27FC236}">
-                <a16:creationId xmlns:a16="http://schemas.microsoft.com/office/drawing/2014/main" id="{3BE6F831-03EC-72C7-7CA9-ED632D20E03C}"/>
+                <a16:creationId xmlns:a16="http://schemas.microsoft.com/office/drawing/2014/main" id="{A8FE19AD-2EDD-4B4F-9F9E-46A4441847A6}"/>
               </a:ext>
             </a:extLst>
           </p:cNvPr>
@@ -966,20 +1218,22 @@
         </p:nvSpPr>
         <p:spPr>
           <a:xfrm>
-            <a:off x="831850" y="1709738"/>
-            <a:ext cx="10515600" cy="2852737"/>
+            <a:off x="1143000" y="1709738"/>
+            <a:ext cx="8520952" cy="2852737"/>
           </a:xfrm>
         </p:spPr>
         <p:txBody>
-          <a:bodyPr anchor="b"/>
+          <a:bodyPr anchor="b">
+            <a:normAutofit/>
+          </a:bodyPr>
           <a:lstStyle>
             <a:lvl1pPr>
-              <a:defRPr sz="6000"/>
+              <a:defRPr sz="4800"/>
             </a:lvl1pPr>
           </a:lstStyle>
           <a:p>
             <a:r>
-              <a:rPr lang="en-US"/>
+              <a:rPr lang="en-US" dirty="0"/>
               <a:t>Click to edit Master title style</a:t>
             </a:r>
           </a:p>
@@ -990,7 +1244,7 @@
           <p:cNvPr id="3" name="Text Placeholder 2">
             <a:extLst>
               <a:ext uri="{FF2B5EF4-FFF2-40B4-BE49-F238E27FC236}">
-                <a16:creationId xmlns:a16="http://schemas.microsoft.com/office/drawing/2014/main" id="{6142D119-33FE-E4FB-6B41-76B92AC9C922}"/>
+                <a16:creationId xmlns:a16="http://schemas.microsoft.com/office/drawing/2014/main" id="{00EE5927-21D5-4EBA-A112-CAD1BD38BCB1}"/>
               </a:ext>
             </a:extLst>
           </p:cNvPr>
@@ -1003,20 +1257,20 @@
         </p:nvSpPr>
         <p:spPr>
           <a:xfrm>
-            <a:off x="831850" y="4589463"/>
-            <a:ext cx="10515600" cy="1500187"/>
+            <a:off x="1143000" y="4589466"/>
+            <a:ext cx="8520952" cy="813266"/>
           </a:xfrm>
         </p:spPr>
         <p:txBody>
-          <a:bodyPr/>
+          <a:bodyPr>
+            <a:normAutofit/>
+          </a:bodyPr>
           <a:lstStyle>
             <a:lvl1pPr marL="0" indent="0">
               <a:buNone/>
-              <a:defRPr sz="2400">
+              <a:defRPr sz="1800">
                 <a:solidFill>
-                  <a:schemeClr val="tx1">
-                    <a:tint val="75000"/>
-                  </a:schemeClr>
+                  <a:schemeClr val="tx1"/>
                 </a:solidFill>
               </a:defRPr>
             </a:lvl1pPr>
@@ -1104,7 +1358,7 @@
           <a:p>
             <a:pPr lvl="0"/>
             <a:r>
-              <a:rPr lang="en-US"/>
+              <a:rPr lang="en-US" dirty="0"/>
               <a:t>Click to edit Master text styles</a:t>
             </a:r>
           </a:p>
@@ -1115,7 +1369,7 @@
           <p:cNvPr id="4" name="Date Placeholder 3">
             <a:extLst>
               <a:ext uri="{FF2B5EF4-FFF2-40B4-BE49-F238E27FC236}">
-                <a16:creationId xmlns:a16="http://schemas.microsoft.com/office/drawing/2014/main" id="{F8EE4DA7-95F5-1932-16C7-E427E01872A2}"/>
+                <a16:creationId xmlns:a16="http://schemas.microsoft.com/office/drawing/2014/main" id="{4CEF0D16-9D87-4D76-A5A5-534E24B7DD25}"/>
               </a:ext>
             </a:extLst>
           </p:cNvPr>
@@ -1131,7 +1385,7 @@
           <a:bodyPr/>
           <a:lstStyle/>
           <a:p>
-            <a:fld id="{FE6A70BB-274E-3D43-8283-A9C170117839}" type="datetimeFigureOut">
+            <a:fld id="{3CADBD16-5BFB-4D9F-9646-C75D1B53BBB6}" type="datetimeFigureOut">
               <a:rPr lang="en-US" smtClean="0"/>
               <a:t>11/19/23</a:t>
             </a:fld>
@@ -1144,7 +1398,7 @@
           <p:cNvPr id="5" name="Footer Placeholder 4">
             <a:extLst>
               <a:ext uri="{FF2B5EF4-FFF2-40B4-BE49-F238E27FC236}">
-                <a16:creationId xmlns:a16="http://schemas.microsoft.com/office/drawing/2014/main" id="{0130EE4C-D1E3-6674-EF57-53E85FC2E522}"/>
+                <a16:creationId xmlns:a16="http://schemas.microsoft.com/office/drawing/2014/main" id="{5965F387-5AAC-45D0-ABCE-B1CF4BC7E0AC}"/>
               </a:ext>
             </a:extLst>
           </p:cNvPr>
@@ -1169,7 +1423,7 @@
           <p:cNvPr id="6" name="Slide Number Placeholder 5">
             <a:extLst>
               <a:ext uri="{FF2B5EF4-FFF2-40B4-BE49-F238E27FC236}">
-                <a16:creationId xmlns:a16="http://schemas.microsoft.com/office/drawing/2014/main" id="{09D4C372-192F-8DCF-7A87-A2DD19060205}"/>
+                <a16:creationId xmlns:a16="http://schemas.microsoft.com/office/drawing/2014/main" id="{798AF6FE-0006-4F40-A7FB-E0FDBADF7548}"/>
               </a:ext>
             </a:extLst>
           </p:cNvPr>
@@ -1185,7 +1439,7 @@
           <a:bodyPr/>
           <a:lstStyle/>
           <a:p>
-            <a:fld id="{E5F80103-A353-9143-ABE1-D1723BD49AAE}" type="slidenum">
+            <a:fld id="{C0722274-0FAA-4649-AA4E-4210F4F32167}" type="slidenum">
               <a:rPr lang="en-US" smtClean="0"/>
               <a:t>‹#›</a:t>
             </a:fld>
@@ -1196,7 +1450,7 @@
     </p:spTree>
     <p:extLst>
       <p:ext uri="{BB962C8B-B14F-4D97-AF65-F5344CB8AC3E}">
-        <p14:creationId xmlns:p14="http://schemas.microsoft.com/office/powerpoint/2010/main" val="1281434372"/>
+        <p14:creationId xmlns:p14="http://schemas.microsoft.com/office/powerpoint/2010/main" val="2332619964"/>
       </p:ext>
     </p:extLst>
   </p:cSld>
@@ -1228,7 +1482,7 @@
           <p:cNvPr id="2" name="Title 1">
             <a:extLst>
               <a:ext uri="{FF2B5EF4-FFF2-40B4-BE49-F238E27FC236}">
-                <a16:creationId xmlns:a16="http://schemas.microsoft.com/office/drawing/2014/main" id="{387B0C5C-0346-4158-D34A-A4AE2EC88AD6}"/>
+                <a16:creationId xmlns:a16="http://schemas.microsoft.com/office/drawing/2014/main" id="{B5E8AADE-587E-4574-B21B-7ABDE5A2364B}"/>
               </a:ext>
             </a:extLst>
           </p:cNvPr>
@@ -1256,7 +1510,7 @@
           <p:cNvPr id="3" name="Content Placeholder 2">
             <a:extLst>
               <a:ext uri="{FF2B5EF4-FFF2-40B4-BE49-F238E27FC236}">
-                <a16:creationId xmlns:a16="http://schemas.microsoft.com/office/drawing/2014/main" id="{49A618B0-D477-994F-AACC-2DC88304009B}"/>
+                <a16:creationId xmlns:a16="http://schemas.microsoft.com/office/drawing/2014/main" id="{AE2F9DA5-4DFB-4211-A58A-FFD842C27A65}"/>
               </a:ext>
             </a:extLst>
           </p:cNvPr>
@@ -1269,8 +1523,8 @@
         </p:nvSpPr>
         <p:spPr>
           <a:xfrm>
-            <a:off x="838200" y="1825625"/>
-            <a:ext cx="5181600" cy="4351338"/>
+            <a:off x="1143000" y="2339501"/>
+            <a:ext cx="4798979" cy="3550597"/>
           </a:xfrm>
         </p:spPr>
         <p:txBody>
@@ -1318,7 +1572,7 @@
           <p:cNvPr id="4" name="Content Placeholder 3">
             <a:extLst>
               <a:ext uri="{FF2B5EF4-FFF2-40B4-BE49-F238E27FC236}">
-                <a16:creationId xmlns:a16="http://schemas.microsoft.com/office/drawing/2014/main" id="{8E841745-9F9C-E80B-C142-AE24176349CE}"/>
+                <a16:creationId xmlns:a16="http://schemas.microsoft.com/office/drawing/2014/main" id="{1AA99F26-66AF-4614-91CE-C93A24BAC23A}"/>
               </a:ext>
             </a:extLst>
           </p:cNvPr>
@@ -1331,8 +1585,8 @@
         </p:nvSpPr>
         <p:spPr>
           <a:xfrm>
-            <a:off x="6172200" y="1825625"/>
-            <a:ext cx="5181600" cy="4351338"/>
+            <a:off x="6250020" y="2339501"/>
+            <a:ext cx="4798980" cy="3550597"/>
           </a:xfrm>
         </p:spPr>
         <p:txBody>
@@ -1341,35 +1595,35 @@
           <a:p>
             <a:pPr lvl="0"/>
             <a:r>
-              <a:rPr lang="en-US"/>
+              <a:rPr lang="en-US" dirty="0"/>
               <a:t>Click to edit Master text styles</a:t>
             </a:r>
           </a:p>
           <a:p>
             <a:pPr lvl="1"/>
             <a:r>
-              <a:rPr lang="en-US"/>
+              <a:rPr lang="en-US" dirty="0"/>
               <a:t>Second level</a:t>
             </a:r>
           </a:p>
           <a:p>
             <a:pPr lvl="2"/>
             <a:r>
-              <a:rPr lang="en-US"/>
+              <a:rPr lang="en-US" dirty="0"/>
               <a:t>Third level</a:t>
             </a:r>
           </a:p>
           <a:p>
             <a:pPr lvl="3"/>
             <a:r>
-              <a:rPr lang="en-US"/>
+              <a:rPr lang="en-US" dirty="0"/>
               <a:t>Fourth level</a:t>
             </a:r>
           </a:p>
           <a:p>
             <a:pPr lvl="4"/>
             <a:r>
-              <a:rPr lang="en-US"/>
+              <a:rPr lang="en-US" dirty="0"/>
               <a:t>Fifth level</a:t>
             </a:r>
           </a:p>
@@ -1380,7 +1634,7 @@
           <p:cNvPr id="5" name="Date Placeholder 4">
             <a:extLst>
               <a:ext uri="{FF2B5EF4-FFF2-40B4-BE49-F238E27FC236}">
-                <a16:creationId xmlns:a16="http://schemas.microsoft.com/office/drawing/2014/main" id="{DFBD5611-4A07-EC15-26F4-3ABE3D959500}"/>
+                <a16:creationId xmlns:a16="http://schemas.microsoft.com/office/drawing/2014/main" id="{7F8F678E-59B5-4DF9-ABCB-506B9CB701CC}"/>
               </a:ext>
             </a:extLst>
           </p:cNvPr>
@@ -1396,7 +1650,7 @@
           <a:bodyPr/>
           <a:lstStyle/>
           <a:p>
-            <a:fld id="{FE6A70BB-274E-3D43-8283-A9C170117839}" type="datetimeFigureOut">
+            <a:fld id="{3CADBD16-5BFB-4D9F-9646-C75D1B53BBB6}" type="datetimeFigureOut">
               <a:rPr lang="en-US" smtClean="0"/>
               <a:t>11/19/23</a:t>
             </a:fld>
@@ -1409,7 +1663,7 @@
           <p:cNvPr id="6" name="Footer Placeholder 5">
             <a:extLst>
               <a:ext uri="{FF2B5EF4-FFF2-40B4-BE49-F238E27FC236}">
-                <a16:creationId xmlns:a16="http://schemas.microsoft.com/office/drawing/2014/main" id="{302981A2-DDA5-7FCB-7485-507B4179A27C}"/>
+                <a16:creationId xmlns:a16="http://schemas.microsoft.com/office/drawing/2014/main" id="{18B50A53-317B-444A-9BA2-F69CDBF5DA64}"/>
               </a:ext>
             </a:extLst>
           </p:cNvPr>
@@ -1434,7 +1688,7 @@
           <p:cNvPr id="7" name="Slide Number Placeholder 6">
             <a:extLst>
               <a:ext uri="{FF2B5EF4-FFF2-40B4-BE49-F238E27FC236}">
-                <a16:creationId xmlns:a16="http://schemas.microsoft.com/office/drawing/2014/main" id="{C1F0DBC5-BB04-7DC5-BD1A-9BFFCACFCC85}"/>
+                <a16:creationId xmlns:a16="http://schemas.microsoft.com/office/drawing/2014/main" id="{D0B269A1-B0FB-4C8F-B6AA-0718C92D3D22}"/>
               </a:ext>
             </a:extLst>
           </p:cNvPr>
@@ -1450,7 +1704,7 @@
           <a:bodyPr/>
           <a:lstStyle/>
           <a:p>
-            <a:fld id="{E5F80103-A353-9143-ABE1-D1723BD49AAE}" type="slidenum">
+            <a:fld id="{C0722274-0FAA-4649-AA4E-4210F4F32167}" type="slidenum">
               <a:rPr lang="en-US" smtClean="0"/>
               <a:t>‹#›</a:t>
             </a:fld>
@@ -1461,7 +1715,7 @@
     </p:spTree>
     <p:extLst>
       <p:ext uri="{BB962C8B-B14F-4D97-AF65-F5344CB8AC3E}">
-        <p14:creationId xmlns:p14="http://schemas.microsoft.com/office/powerpoint/2010/main" val="768952308"/>
+        <p14:creationId xmlns:p14="http://schemas.microsoft.com/office/powerpoint/2010/main" val="4234348375"/>
       </p:ext>
     </p:extLst>
   </p:cSld>
@@ -1493,7 +1747,7 @@
           <p:cNvPr id="2" name="Title 1">
             <a:extLst>
               <a:ext uri="{FF2B5EF4-FFF2-40B4-BE49-F238E27FC236}">
-                <a16:creationId xmlns:a16="http://schemas.microsoft.com/office/drawing/2014/main" id="{C15100EB-A926-F3D1-FD3E-80E4E586E039}"/>
+                <a16:creationId xmlns:a16="http://schemas.microsoft.com/office/drawing/2014/main" id="{B112BBBF-42B2-4A5D-B145-46983A530170}"/>
               </a:ext>
             </a:extLst>
           </p:cNvPr>
@@ -1506,8 +1760,8 @@
         </p:nvSpPr>
         <p:spPr>
           <a:xfrm>
-            <a:off x="839788" y="365125"/>
-            <a:ext cx="10515600" cy="1325563"/>
+            <a:off x="1143000" y="1133272"/>
+            <a:ext cx="9905999" cy="846307"/>
           </a:xfrm>
         </p:spPr>
         <p:txBody>
@@ -1515,7 +1769,7 @@
           <a:lstStyle/>
           <a:p>
             <a:r>
-              <a:rPr lang="en-US"/>
+              <a:rPr lang="en-US" dirty="0"/>
               <a:t>Click to edit Master title style</a:t>
             </a:r>
           </a:p>
@@ -1526,7 +1780,7 @@
           <p:cNvPr id="3" name="Text Placeholder 2">
             <a:extLst>
               <a:ext uri="{FF2B5EF4-FFF2-40B4-BE49-F238E27FC236}">
-                <a16:creationId xmlns:a16="http://schemas.microsoft.com/office/drawing/2014/main" id="{B76F0E11-5BF8-A443-9D63-43E547D34562}"/>
+                <a16:creationId xmlns:a16="http://schemas.microsoft.com/office/drawing/2014/main" id="{E804BE44-5271-4B5D-B649-35E3AF20B48F}"/>
               </a:ext>
             </a:extLst>
           </p:cNvPr>
@@ -1539,16 +1793,18 @@
         </p:nvSpPr>
         <p:spPr>
           <a:xfrm>
-            <a:off x="839788" y="1681163"/>
-            <a:ext cx="5157787" cy="823912"/>
+            <a:off x="1142999" y="2067127"/>
+            <a:ext cx="4798980" cy="710119"/>
           </a:xfrm>
         </p:spPr>
         <p:txBody>
-          <a:bodyPr anchor="b"/>
+          <a:bodyPr anchor="b">
+            <a:normAutofit/>
+          </a:bodyPr>
           <a:lstStyle>
             <a:lvl1pPr marL="0" indent="0">
               <a:buNone/>
-              <a:defRPr sz="2400" b="1"/>
+              <a:defRPr sz="2000" b="0" cap="all" spc="300" baseline="0"/>
             </a:lvl1pPr>
             <a:lvl2pPr marL="457200" indent="0">
               <a:buNone/>
@@ -1586,7 +1842,7 @@
           <a:p>
             <a:pPr lvl="0"/>
             <a:r>
-              <a:rPr lang="en-US"/>
+              <a:rPr lang="en-US" dirty="0"/>
               <a:t>Click to edit Master text styles</a:t>
             </a:r>
           </a:p>
@@ -1597,7 +1853,7 @@
           <p:cNvPr id="4" name="Content Placeholder 3">
             <a:extLst>
               <a:ext uri="{FF2B5EF4-FFF2-40B4-BE49-F238E27FC236}">
-                <a16:creationId xmlns:a16="http://schemas.microsoft.com/office/drawing/2014/main" id="{FD3B17B9-49AA-0E41-760C-C3019C718AFB}"/>
+                <a16:creationId xmlns:a16="http://schemas.microsoft.com/office/drawing/2014/main" id="{24D7891E-0C0A-4688-97DD-C0715E322194}"/>
               </a:ext>
             </a:extLst>
           </p:cNvPr>
@@ -1610,8 +1866,8 @@
         </p:nvSpPr>
         <p:spPr>
           <a:xfrm>
-            <a:off x="839788" y="2505075"/>
-            <a:ext cx="5157787" cy="3684588"/>
+            <a:off x="1143001" y="2864795"/>
+            <a:ext cx="4798978" cy="3025304"/>
           </a:xfrm>
         </p:spPr>
         <p:txBody>
@@ -1620,35 +1876,35 @@
           <a:p>
             <a:pPr lvl="0"/>
             <a:r>
-              <a:rPr lang="en-US"/>
+              <a:rPr lang="en-US" dirty="0"/>
               <a:t>Click to edit Master text styles</a:t>
             </a:r>
           </a:p>
           <a:p>
             <a:pPr lvl="1"/>
             <a:r>
-              <a:rPr lang="en-US"/>
+              <a:rPr lang="en-US" dirty="0"/>
               <a:t>Second level</a:t>
             </a:r>
           </a:p>
           <a:p>
             <a:pPr lvl="2"/>
             <a:r>
-              <a:rPr lang="en-US"/>
+              <a:rPr lang="en-US" dirty="0"/>
               <a:t>Third level</a:t>
             </a:r>
           </a:p>
           <a:p>
             <a:pPr lvl="3"/>
             <a:r>
-              <a:rPr lang="en-US"/>
+              <a:rPr lang="en-US" dirty="0"/>
               <a:t>Fourth level</a:t>
             </a:r>
           </a:p>
           <a:p>
             <a:pPr lvl="4"/>
             <a:r>
-              <a:rPr lang="en-US"/>
+              <a:rPr lang="en-US" dirty="0"/>
               <a:t>Fifth level</a:t>
             </a:r>
           </a:p>
@@ -1659,7 +1915,7 @@
           <p:cNvPr id="5" name="Text Placeholder 4">
             <a:extLst>
               <a:ext uri="{FF2B5EF4-FFF2-40B4-BE49-F238E27FC236}">
-                <a16:creationId xmlns:a16="http://schemas.microsoft.com/office/drawing/2014/main" id="{3E4AF6D0-F550-1618-640F-50C820897A8E}"/>
+                <a16:creationId xmlns:a16="http://schemas.microsoft.com/office/drawing/2014/main" id="{875EAF30-3412-49B0-93D1-596CC2695B26}"/>
               </a:ext>
             </a:extLst>
           </p:cNvPr>
@@ -1672,16 +1928,18 @@
         </p:nvSpPr>
         <p:spPr>
           <a:xfrm>
-            <a:off x="6172200" y="1681163"/>
-            <a:ext cx="5183188" cy="823912"/>
+            <a:off x="6250018" y="2067127"/>
+            <a:ext cx="4798981" cy="710119"/>
           </a:xfrm>
         </p:spPr>
         <p:txBody>
-          <a:bodyPr anchor="b"/>
+          <a:bodyPr anchor="b">
+            <a:normAutofit/>
+          </a:bodyPr>
           <a:lstStyle>
             <a:lvl1pPr marL="0" indent="0">
               <a:buNone/>
-              <a:defRPr sz="2400" b="1"/>
+              <a:defRPr sz="2000" b="0" cap="all" spc="300" baseline="0"/>
             </a:lvl1pPr>
             <a:lvl2pPr marL="457200" indent="0">
               <a:buNone/>
@@ -1719,7 +1977,7 @@
           <a:p>
             <a:pPr lvl="0"/>
             <a:r>
-              <a:rPr lang="en-US"/>
+              <a:rPr lang="en-US" dirty="0"/>
               <a:t>Click to edit Master text styles</a:t>
             </a:r>
           </a:p>
@@ -1730,7 +1988,7 @@
           <p:cNvPr id="6" name="Content Placeholder 5">
             <a:extLst>
               <a:ext uri="{FF2B5EF4-FFF2-40B4-BE49-F238E27FC236}">
-                <a16:creationId xmlns:a16="http://schemas.microsoft.com/office/drawing/2014/main" id="{09827AAF-CAED-972F-104B-5CD511F6BB6C}"/>
+                <a16:creationId xmlns:a16="http://schemas.microsoft.com/office/drawing/2014/main" id="{F707B9B7-F41C-4314-9F0C-BB84547FB8CA}"/>
               </a:ext>
             </a:extLst>
           </p:cNvPr>
@@ -1743,8 +2001,8 @@
         </p:nvSpPr>
         <p:spPr>
           <a:xfrm>
-            <a:off x="6172200" y="2505075"/>
-            <a:ext cx="5183188" cy="3684588"/>
+            <a:off x="6250019" y="2864795"/>
+            <a:ext cx="4798982" cy="3025304"/>
           </a:xfrm>
         </p:spPr>
         <p:txBody>
@@ -1753,35 +2011,35 @@
           <a:p>
             <a:pPr lvl="0"/>
             <a:r>
-              <a:rPr lang="en-US"/>
+              <a:rPr lang="en-US" dirty="0"/>
               <a:t>Click to edit Master text styles</a:t>
             </a:r>
           </a:p>
           <a:p>
             <a:pPr lvl="1"/>
             <a:r>
-              <a:rPr lang="en-US"/>
+              <a:rPr lang="en-US" dirty="0"/>
               <a:t>Second level</a:t>
             </a:r>
           </a:p>
           <a:p>
             <a:pPr lvl="2"/>
             <a:r>
-              <a:rPr lang="en-US"/>
+              <a:rPr lang="en-US" dirty="0"/>
               <a:t>Third level</a:t>
             </a:r>
           </a:p>
           <a:p>
             <a:pPr lvl="3"/>
             <a:r>
-              <a:rPr lang="en-US"/>
+              <a:rPr lang="en-US" dirty="0"/>
               <a:t>Fourth level</a:t>
             </a:r>
           </a:p>
           <a:p>
             <a:pPr lvl="4"/>
             <a:r>
-              <a:rPr lang="en-US"/>
+              <a:rPr lang="en-US" dirty="0"/>
               <a:t>Fifth level</a:t>
             </a:r>
           </a:p>
@@ -1792,7 +2050,7 @@
           <p:cNvPr id="7" name="Date Placeholder 6">
             <a:extLst>
               <a:ext uri="{FF2B5EF4-FFF2-40B4-BE49-F238E27FC236}">
-                <a16:creationId xmlns:a16="http://schemas.microsoft.com/office/drawing/2014/main" id="{967743E6-4FEB-298F-7215-A51969949EE3}"/>
+                <a16:creationId xmlns:a16="http://schemas.microsoft.com/office/drawing/2014/main" id="{8421587F-6AFC-4906-86EB-6B0A86EEF300}"/>
               </a:ext>
             </a:extLst>
           </p:cNvPr>
@@ -1808,7 +2066,7 @@
           <a:bodyPr/>
           <a:lstStyle/>
           <a:p>
-            <a:fld id="{FE6A70BB-274E-3D43-8283-A9C170117839}" type="datetimeFigureOut">
+            <a:fld id="{3CADBD16-5BFB-4D9F-9646-C75D1B53BBB6}" type="datetimeFigureOut">
               <a:rPr lang="en-US" smtClean="0"/>
               <a:t>11/19/23</a:t>
             </a:fld>
@@ -1821,7 +2079,7 @@
           <p:cNvPr id="8" name="Footer Placeholder 7">
             <a:extLst>
               <a:ext uri="{FF2B5EF4-FFF2-40B4-BE49-F238E27FC236}">
-                <a16:creationId xmlns:a16="http://schemas.microsoft.com/office/drawing/2014/main" id="{DC86F1E6-4C9C-DBBE-061C-339DDEF39461}"/>
+                <a16:creationId xmlns:a16="http://schemas.microsoft.com/office/drawing/2014/main" id="{354BE2C5-583B-49BC-9864-B01EEF798742}"/>
               </a:ext>
             </a:extLst>
           </p:cNvPr>
@@ -1846,7 +2104,7 @@
           <p:cNvPr id="9" name="Slide Number Placeholder 8">
             <a:extLst>
               <a:ext uri="{FF2B5EF4-FFF2-40B4-BE49-F238E27FC236}">
-                <a16:creationId xmlns:a16="http://schemas.microsoft.com/office/drawing/2014/main" id="{A6F7A9EE-0B13-A2A1-B659-EFB8EB2BCDFA}"/>
+                <a16:creationId xmlns:a16="http://schemas.microsoft.com/office/drawing/2014/main" id="{5B39B236-45F5-4CC6-8D53-A6903A1CC8B3}"/>
               </a:ext>
             </a:extLst>
           </p:cNvPr>
@@ -1862,7 +2120,7 @@
           <a:bodyPr/>
           <a:lstStyle/>
           <a:p>
-            <a:fld id="{E5F80103-A353-9143-ABE1-D1723BD49AAE}" type="slidenum">
+            <a:fld id="{C0722274-0FAA-4649-AA4E-4210F4F32167}" type="slidenum">
               <a:rPr lang="en-US" smtClean="0"/>
               <a:t>‹#›</a:t>
             </a:fld>
@@ -1873,7 +2131,7 @@
     </p:spTree>
     <p:extLst>
       <p:ext uri="{BB962C8B-B14F-4D97-AF65-F5344CB8AC3E}">
-        <p14:creationId xmlns:p14="http://schemas.microsoft.com/office/powerpoint/2010/main" val="2999296785"/>
+        <p14:creationId xmlns:p14="http://schemas.microsoft.com/office/powerpoint/2010/main" val="2517258043"/>
       </p:ext>
     </p:extLst>
   </p:cSld>
@@ -1905,7 +2163,7 @@
           <p:cNvPr id="2" name="Title 1">
             <a:extLst>
               <a:ext uri="{FF2B5EF4-FFF2-40B4-BE49-F238E27FC236}">
-                <a16:creationId xmlns:a16="http://schemas.microsoft.com/office/drawing/2014/main" id="{CEFCDFEA-EFCE-F43B-9754-0B26922D6F06}"/>
+                <a16:creationId xmlns:a16="http://schemas.microsoft.com/office/drawing/2014/main" id="{CC36B206-0678-4577-B79F-760526A5FD76}"/>
               </a:ext>
             </a:extLst>
           </p:cNvPr>
@@ -1916,40 +2174,49 @@
             <p:ph type="title"/>
           </p:nvPr>
         </p:nvSpPr>
+        <p:spPr>
+          <a:xfrm>
+            <a:off x="2019300" y="1322615"/>
+            <a:ext cx="8175171" cy="4212771"/>
+          </a:xfrm>
+        </p:spPr>
+        <p:txBody>
+          <a:bodyPr/>
+          <a:lstStyle>
+            <a:lvl1pPr algn="ctr">
+              <a:defRPr/>
+            </a:lvl1pPr>
+          </a:lstStyle>
+          <a:p>
+            <a:r>
+              <a:rPr lang="en-US" dirty="0"/>
+              <a:t>Click to edit Master title style</a:t>
+            </a:r>
+          </a:p>
+        </p:txBody>
+      </p:sp>
+      <p:sp>
+        <p:nvSpPr>
+          <p:cNvPr id="3" name="Date Placeholder 2">
+            <a:extLst>
+              <a:ext uri="{FF2B5EF4-FFF2-40B4-BE49-F238E27FC236}">
+                <a16:creationId xmlns:a16="http://schemas.microsoft.com/office/drawing/2014/main" id="{E6D5FCB8-AFD3-4801-BBD6-9548F4CF7C86}"/>
+              </a:ext>
+            </a:extLst>
+          </p:cNvPr>
+          <p:cNvSpPr>
+            <a:spLocks noGrp="1"/>
+          </p:cNvSpPr>
+          <p:nvPr>
+            <p:ph type="dt" sz="half" idx="10"/>
+          </p:nvPr>
+        </p:nvSpPr>
         <p:spPr/>
         <p:txBody>
           <a:bodyPr/>
           <a:lstStyle/>
           <a:p>
-            <a:r>
-              <a:rPr lang="en-US"/>
-              <a:t>Click to edit Master title style</a:t>
-            </a:r>
-          </a:p>
-        </p:txBody>
-      </p:sp>
-      <p:sp>
-        <p:nvSpPr>
-          <p:cNvPr id="3" name="Date Placeholder 2">
-            <a:extLst>
-              <a:ext uri="{FF2B5EF4-FFF2-40B4-BE49-F238E27FC236}">
-                <a16:creationId xmlns:a16="http://schemas.microsoft.com/office/drawing/2014/main" id="{79C26FE1-76AA-A70C-2529-228DF0F69407}"/>
-              </a:ext>
-            </a:extLst>
-          </p:cNvPr>
-          <p:cNvSpPr>
-            <a:spLocks noGrp="1"/>
-          </p:cNvSpPr>
-          <p:nvPr>
-            <p:ph type="dt" sz="half" idx="10"/>
-          </p:nvPr>
-        </p:nvSpPr>
-        <p:spPr/>
-        <p:txBody>
-          <a:bodyPr/>
-          <a:lstStyle/>
-          <a:p>
-            <a:fld id="{FE6A70BB-274E-3D43-8283-A9C170117839}" type="datetimeFigureOut">
+            <a:fld id="{3CADBD16-5BFB-4D9F-9646-C75D1B53BBB6}" type="datetimeFigureOut">
               <a:rPr lang="en-US" smtClean="0"/>
               <a:t>11/19/23</a:t>
             </a:fld>
@@ -1962,7 +2229,7 @@
           <p:cNvPr id="4" name="Footer Placeholder 3">
             <a:extLst>
               <a:ext uri="{FF2B5EF4-FFF2-40B4-BE49-F238E27FC236}">
-                <a16:creationId xmlns:a16="http://schemas.microsoft.com/office/drawing/2014/main" id="{5B757D01-14B4-86A5-E44B-6E1C99A62544}"/>
+                <a16:creationId xmlns:a16="http://schemas.microsoft.com/office/drawing/2014/main" id="{0F6DACF8-CBC0-416B-B28E-EE18C42383B4}"/>
               </a:ext>
             </a:extLst>
           </p:cNvPr>
@@ -1987,7 +2254,7 @@
           <p:cNvPr id="5" name="Slide Number Placeholder 4">
             <a:extLst>
               <a:ext uri="{FF2B5EF4-FFF2-40B4-BE49-F238E27FC236}">
-                <a16:creationId xmlns:a16="http://schemas.microsoft.com/office/drawing/2014/main" id="{15F11CAF-2B46-A903-64CF-D11BCBC2E7BF}"/>
+                <a16:creationId xmlns:a16="http://schemas.microsoft.com/office/drawing/2014/main" id="{770C7421-FF49-4CE9-87D0-2B4FFE0E3DC4}"/>
               </a:ext>
             </a:extLst>
           </p:cNvPr>
@@ -2003,7 +2270,7 @@
           <a:bodyPr/>
           <a:lstStyle/>
           <a:p>
-            <a:fld id="{E5F80103-A353-9143-ABE1-D1723BD49AAE}" type="slidenum">
+            <a:fld id="{C0722274-0FAA-4649-AA4E-4210F4F32167}" type="slidenum">
               <a:rPr lang="en-US" smtClean="0"/>
               <a:t>‹#›</a:t>
             </a:fld>
@@ -2014,7 +2281,7 @@
     </p:spTree>
     <p:extLst>
       <p:ext uri="{BB962C8B-B14F-4D97-AF65-F5344CB8AC3E}">
-        <p14:creationId xmlns:p14="http://schemas.microsoft.com/office/powerpoint/2010/main" val="1646843749"/>
+        <p14:creationId xmlns:p14="http://schemas.microsoft.com/office/powerpoint/2010/main" val="1098350871"/>
       </p:ext>
     </p:extLst>
   </p:cSld>
@@ -2025,7 +2292,7 @@
 </file>
 
 <file path=ppt/slideLayouts/slideLayout7.xml><?xml version="1.0" encoding="utf-8"?>
-<p:sldLayout xmlns:a="http://schemas.openxmlformats.org/drawingml/2006/main" xmlns:r="http://schemas.openxmlformats.org/officeDocument/2006/relationships" xmlns:p="http://schemas.openxmlformats.org/presentationml/2006/main" type="blank" preserve="1">
+<p:sldLayout xmlns:a="http://schemas.openxmlformats.org/drawingml/2006/main" xmlns:r="http://schemas.openxmlformats.org/officeDocument/2006/relationships" xmlns:p="http://schemas.openxmlformats.org/presentationml/2006/main" showMasterSp="0" type="blank" preserve="1">
   <p:cSld name="Blank">
     <p:spTree>
       <p:nvGrpSpPr>
@@ -2046,7 +2313,7 @@
           <p:cNvPr id="2" name="Date Placeholder 1">
             <a:extLst>
               <a:ext uri="{FF2B5EF4-FFF2-40B4-BE49-F238E27FC236}">
-                <a16:creationId xmlns:a16="http://schemas.microsoft.com/office/drawing/2014/main" id="{04645DE2-AF29-F740-9A48-47E402A21F9E}"/>
+                <a16:creationId xmlns:a16="http://schemas.microsoft.com/office/drawing/2014/main" id="{3D19CBFE-15AA-4447-9F9C-D8B0BEB242DA}"/>
               </a:ext>
             </a:extLst>
           </p:cNvPr>
@@ -2062,7 +2329,7 @@
           <a:bodyPr/>
           <a:lstStyle/>
           <a:p>
-            <a:fld id="{FE6A70BB-274E-3D43-8283-A9C170117839}" type="datetimeFigureOut">
+            <a:fld id="{3CADBD16-5BFB-4D9F-9646-C75D1B53BBB6}" type="datetimeFigureOut">
               <a:rPr lang="en-US" smtClean="0"/>
               <a:t>11/19/23</a:t>
             </a:fld>
@@ -2075,7 +2342,7 @@
           <p:cNvPr id="3" name="Footer Placeholder 2">
             <a:extLst>
               <a:ext uri="{FF2B5EF4-FFF2-40B4-BE49-F238E27FC236}">
-                <a16:creationId xmlns:a16="http://schemas.microsoft.com/office/drawing/2014/main" id="{3F8FDD96-42F7-E4A5-B236-B159F8CC10A4}"/>
+                <a16:creationId xmlns:a16="http://schemas.microsoft.com/office/drawing/2014/main" id="{C6B48227-EC1E-4063-9682-891A2DB1A845}"/>
               </a:ext>
             </a:extLst>
           </p:cNvPr>
@@ -2100,7 +2367,7 @@
           <p:cNvPr id="4" name="Slide Number Placeholder 3">
             <a:extLst>
               <a:ext uri="{FF2B5EF4-FFF2-40B4-BE49-F238E27FC236}">
-                <a16:creationId xmlns:a16="http://schemas.microsoft.com/office/drawing/2014/main" id="{CB8A3132-EBD2-2C83-3BD5-742510FDEA5E}"/>
+                <a16:creationId xmlns:a16="http://schemas.microsoft.com/office/drawing/2014/main" id="{D22C6A63-C3F4-4563-A542-9A41AC946C32}"/>
               </a:ext>
             </a:extLst>
           </p:cNvPr>
@@ -2116,7 +2383,7 @@
           <a:bodyPr/>
           <a:lstStyle/>
           <a:p>
-            <a:fld id="{E5F80103-A353-9143-ABE1-D1723BD49AAE}" type="slidenum">
+            <a:fld id="{C0722274-0FAA-4649-AA4E-4210F4F32167}" type="slidenum">
               <a:rPr lang="en-US" smtClean="0"/>
               <a:t>‹#›</a:t>
             </a:fld>
@@ -2127,7 +2394,7 @@
     </p:spTree>
     <p:extLst>
       <p:ext uri="{BB962C8B-B14F-4D97-AF65-F5344CB8AC3E}">
-        <p14:creationId xmlns:p14="http://schemas.microsoft.com/office/powerpoint/2010/main" val="3332778319"/>
+        <p14:creationId xmlns:p14="http://schemas.microsoft.com/office/powerpoint/2010/main" val="3187955537"/>
       </p:ext>
     </p:extLst>
   </p:cSld>
@@ -2138,7 +2405,7 @@
 </file>
 
 <file path=ppt/slideLayouts/slideLayout8.xml><?xml version="1.0" encoding="utf-8"?>
-<p:sldLayout xmlns:a="http://schemas.openxmlformats.org/drawingml/2006/main" xmlns:r="http://schemas.openxmlformats.org/officeDocument/2006/relationships" xmlns:p="http://schemas.openxmlformats.org/presentationml/2006/main" type="objTx" preserve="1">
+<p:sldLayout xmlns:a="http://schemas.openxmlformats.org/drawingml/2006/main" xmlns:r="http://schemas.openxmlformats.org/officeDocument/2006/relationships" xmlns:p="http://schemas.openxmlformats.org/presentationml/2006/main" showMasterSp="0" type="objTx" preserve="1">
   <p:cSld name="Content with Caption">
     <p:spTree>
       <p:nvGrpSpPr>
@@ -2159,7 +2426,7 @@
           <p:cNvPr id="2" name="Title 1">
             <a:extLst>
               <a:ext uri="{FF2B5EF4-FFF2-40B4-BE49-F238E27FC236}">
-                <a16:creationId xmlns:a16="http://schemas.microsoft.com/office/drawing/2014/main" id="{46849646-4200-933C-F3D8-0B9025A8856A}"/>
+                <a16:creationId xmlns:a16="http://schemas.microsoft.com/office/drawing/2014/main" id="{186900C1-FE18-461C-801C-8626C7759861}"/>
               </a:ext>
             </a:extLst>
           </p:cNvPr>
@@ -2172,20 +2439,25 @@
         </p:nvSpPr>
         <p:spPr>
           <a:xfrm>
-            <a:off x="839788" y="457200"/>
-            <a:ext cx="3932237" cy="1600200"/>
+            <a:off x="1143000" y="1600200"/>
+            <a:ext cx="3932237" cy="1964986"/>
           </a:xfrm>
         </p:spPr>
         <p:txBody>
-          <a:bodyPr anchor="b"/>
+          <a:bodyPr anchor="b">
+            <a:normAutofit/>
+          </a:bodyPr>
           <a:lstStyle>
             <a:lvl1pPr>
-              <a:defRPr sz="3200"/>
+              <a:lnSpc>
+                <a:spcPct val="110000"/>
+              </a:lnSpc>
+              <a:defRPr sz="2400" cap="all" spc="300" baseline="0"/>
             </a:lvl1pPr>
           </a:lstStyle>
           <a:p>
             <a:r>
-              <a:rPr lang="en-US"/>
+              <a:rPr lang="en-US" dirty="0"/>
               <a:t>Click to edit Master title style</a:t>
             </a:r>
           </a:p>
@@ -2196,7 +2468,7 @@
           <p:cNvPr id="3" name="Content Placeholder 2">
             <a:extLst>
               <a:ext uri="{FF2B5EF4-FFF2-40B4-BE49-F238E27FC236}">
-                <a16:creationId xmlns:a16="http://schemas.microsoft.com/office/drawing/2014/main" id="{48812E30-0F78-98A9-23C4-219586B5ADC1}"/>
+                <a16:creationId xmlns:a16="http://schemas.microsoft.com/office/drawing/2014/main" id="{AB14CFF3-3406-49E3-9D5A-1BE90FFA508E}"/>
               </a:ext>
             </a:extLst>
           </p:cNvPr>
@@ -2209,8 +2481,8 @@
         </p:nvSpPr>
         <p:spPr>
           <a:xfrm>
-            <a:off x="5183188" y="987425"/>
-            <a:ext cx="6172200" cy="4873625"/>
+            <a:off x="5627451" y="987425"/>
+            <a:ext cx="5421548" cy="4873625"/>
           </a:xfrm>
         </p:spPr>
         <p:txBody>
@@ -2247,35 +2519,35 @@
           <a:p>
             <a:pPr lvl="0"/>
             <a:r>
-              <a:rPr lang="en-US"/>
+              <a:rPr lang="en-US" dirty="0"/>
               <a:t>Click to edit Master text styles</a:t>
             </a:r>
           </a:p>
           <a:p>
             <a:pPr lvl="1"/>
             <a:r>
-              <a:rPr lang="en-US"/>
+              <a:rPr lang="en-US" dirty="0"/>
               <a:t>Second level</a:t>
             </a:r>
           </a:p>
           <a:p>
             <a:pPr lvl="2"/>
             <a:r>
-              <a:rPr lang="en-US"/>
+              <a:rPr lang="en-US" dirty="0"/>
               <a:t>Third level</a:t>
             </a:r>
           </a:p>
           <a:p>
             <a:pPr lvl="3"/>
             <a:r>
-              <a:rPr lang="en-US"/>
+              <a:rPr lang="en-US" dirty="0"/>
               <a:t>Fourth level</a:t>
             </a:r>
           </a:p>
           <a:p>
             <a:pPr lvl="4"/>
             <a:r>
-              <a:rPr lang="en-US"/>
+              <a:rPr lang="en-US" dirty="0"/>
               <a:t>Fifth level</a:t>
             </a:r>
           </a:p>
@@ -2286,7 +2558,7 @@
           <p:cNvPr id="4" name="Text Placeholder 3">
             <a:extLst>
               <a:ext uri="{FF2B5EF4-FFF2-40B4-BE49-F238E27FC236}">
-                <a16:creationId xmlns:a16="http://schemas.microsoft.com/office/drawing/2014/main" id="{EA804047-50C4-95E3-7F77-D72453CFA26F}"/>
+                <a16:creationId xmlns:a16="http://schemas.microsoft.com/office/drawing/2014/main" id="{033D14FF-9082-4BBA-BC7A-F4C5B78599C5}"/>
               </a:ext>
             </a:extLst>
           </p:cNvPr>
@@ -2299,8 +2571,8 @@
         </p:nvSpPr>
         <p:spPr>
           <a:xfrm>
-            <a:off x="839788" y="2057400"/>
-            <a:ext cx="3932237" cy="3811588"/>
+            <a:off x="1143000" y="3662464"/>
+            <a:ext cx="3932237" cy="2206523"/>
           </a:xfrm>
         </p:spPr>
         <p:txBody>
@@ -2308,7 +2580,7 @@
           <a:lstStyle>
             <a:lvl1pPr marL="0" indent="0">
               <a:buNone/>
-              <a:defRPr sz="1600"/>
+              <a:defRPr sz="1600" i="1"/>
             </a:lvl1pPr>
             <a:lvl2pPr marL="457200" indent="0">
               <a:buNone/>
@@ -2346,7 +2618,7 @@
           <a:p>
             <a:pPr lvl="0"/>
             <a:r>
-              <a:rPr lang="en-US"/>
+              <a:rPr lang="en-US" dirty="0"/>
               <a:t>Click to edit Master text styles</a:t>
             </a:r>
           </a:p>
@@ -2357,7 +2629,7 @@
           <p:cNvPr id="5" name="Date Placeholder 4">
             <a:extLst>
               <a:ext uri="{FF2B5EF4-FFF2-40B4-BE49-F238E27FC236}">
-                <a16:creationId xmlns:a16="http://schemas.microsoft.com/office/drawing/2014/main" id="{564CCF7F-A88C-021B-EFFA-DE9E51E9E9B9}"/>
+                <a16:creationId xmlns:a16="http://schemas.microsoft.com/office/drawing/2014/main" id="{0D5A2726-EB8E-4DF7-9A1B-F03BD8C7179E}"/>
               </a:ext>
             </a:extLst>
           </p:cNvPr>
@@ -2373,7 +2645,7 @@
           <a:bodyPr/>
           <a:lstStyle/>
           <a:p>
-            <a:fld id="{FE6A70BB-274E-3D43-8283-A9C170117839}" type="datetimeFigureOut">
+            <a:fld id="{3CADBD16-5BFB-4D9F-9646-C75D1B53BBB6}" type="datetimeFigureOut">
               <a:rPr lang="en-US" smtClean="0"/>
               <a:t>11/19/23</a:t>
             </a:fld>
@@ -2386,7 +2658,7 @@
           <p:cNvPr id="6" name="Footer Placeholder 5">
             <a:extLst>
               <a:ext uri="{FF2B5EF4-FFF2-40B4-BE49-F238E27FC236}">
-                <a16:creationId xmlns:a16="http://schemas.microsoft.com/office/drawing/2014/main" id="{7C0D4AEB-8985-97FE-5BE2-F392B6F44D9C}"/>
+                <a16:creationId xmlns:a16="http://schemas.microsoft.com/office/drawing/2014/main" id="{8D9929BE-611C-4FE6-B0A5-E0FF9DF969EE}"/>
               </a:ext>
             </a:extLst>
           </p:cNvPr>
@@ -2411,7 +2683,7 @@
           <p:cNvPr id="7" name="Slide Number Placeholder 6">
             <a:extLst>
               <a:ext uri="{FF2B5EF4-FFF2-40B4-BE49-F238E27FC236}">
-                <a16:creationId xmlns:a16="http://schemas.microsoft.com/office/drawing/2014/main" id="{A2F7F743-0EEE-BFC9-044F-CF796A7CB9DF}"/>
+                <a16:creationId xmlns:a16="http://schemas.microsoft.com/office/drawing/2014/main" id="{17B90B32-1D0E-4BCD-8850-59EA235F7EB4}"/>
               </a:ext>
             </a:extLst>
           </p:cNvPr>
@@ -2427,7 +2699,7 @@
           <a:bodyPr/>
           <a:lstStyle/>
           <a:p>
-            <a:fld id="{E5F80103-A353-9143-ABE1-D1723BD49AAE}" type="slidenum">
+            <a:fld id="{C0722274-0FAA-4649-AA4E-4210F4F32167}" type="slidenum">
               <a:rPr lang="en-US" smtClean="0"/>
               <a:t>‹#›</a:t>
             </a:fld>
@@ -2438,7 +2710,7 @@
     </p:spTree>
     <p:extLst>
       <p:ext uri="{BB962C8B-B14F-4D97-AF65-F5344CB8AC3E}">
-        <p14:creationId xmlns:p14="http://schemas.microsoft.com/office/powerpoint/2010/main" val="2899289687"/>
+        <p14:creationId xmlns:p14="http://schemas.microsoft.com/office/powerpoint/2010/main" val="2130243228"/>
       </p:ext>
     </p:extLst>
   </p:cSld>
@@ -2449,7 +2721,7 @@
 </file>
 
 <file path=ppt/slideLayouts/slideLayout9.xml><?xml version="1.0" encoding="utf-8"?>
-<p:sldLayout xmlns:a="http://schemas.openxmlformats.org/drawingml/2006/main" xmlns:r="http://schemas.openxmlformats.org/officeDocument/2006/relationships" xmlns:p="http://schemas.openxmlformats.org/presentationml/2006/main" type="picTx" preserve="1">
+<p:sldLayout xmlns:a="http://schemas.openxmlformats.org/drawingml/2006/main" xmlns:r="http://schemas.openxmlformats.org/officeDocument/2006/relationships" xmlns:p="http://schemas.openxmlformats.org/presentationml/2006/main" showMasterSp="0" type="picTx" preserve="1">
   <p:cSld name="Picture with Caption">
     <p:spTree>
       <p:nvGrpSpPr>
@@ -2467,61 +2739,24 @@
       </p:grpSpPr>
       <p:sp>
         <p:nvSpPr>
-          <p:cNvPr id="2" name="Title 1">
-            <a:extLst>
-              <a:ext uri="{FF2B5EF4-FFF2-40B4-BE49-F238E27FC236}">
-                <a16:creationId xmlns:a16="http://schemas.microsoft.com/office/drawing/2014/main" id="{358AEA2F-984E-E464-B30B-4BD4843315DC}"/>
-              </a:ext>
-            </a:extLst>
-          </p:cNvPr>
-          <p:cNvSpPr>
-            <a:spLocks noGrp="1"/>
-          </p:cNvSpPr>
-          <p:nvPr>
-            <p:ph type="title"/>
+          <p:cNvPr id="3" name="Picture Placeholder 2">
+            <a:extLst>
+              <a:ext uri="{FF2B5EF4-FFF2-40B4-BE49-F238E27FC236}">
+                <a16:creationId xmlns:a16="http://schemas.microsoft.com/office/drawing/2014/main" id="{1CA1460E-1069-4FCA-B04E-28F77C861046}"/>
+              </a:ext>
+            </a:extLst>
+          </p:cNvPr>
+          <p:cNvSpPr>
+            <a:spLocks noGrp="1"/>
+          </p:cNvSpPr>
+          <p:nvPr>
+            <p:ph type="pic" idx="1"/>
           </p:nvPr>
         </p:nvSpPr>
         <p:spPr>
           <a:xfrm>
-            <a:off x="839788" y="457200"/>
-            <a:ext cx="3932237" cy="1600200"/>
-          </a:xfrm>
-        </p:spPr>
-        <p:txBody>
-          <a:bodyPr anchor="b"/>
-          <a:lstStyle>
-            <a:lvl1pPr>
-              <a:defRPr sz="3200"/>
-            </a:lvl1pPr>
-          </a:lstStyle>
-          <a:p>
-            <a:r>
-              <a:rPr lang="en-US"/>
-              <a:t>Click to edit Master title style</a:t>
-            </a:r>
-          </a:p>
-        </p:txBody>
-      </p:sp>
-      <p:sp>
-        <p:nvSpPr>
-          <p:cNvPr id="3" name="Picture Placeholder 2">
-            <a:extLst>
-              <a:ext uri="{FF2B5EF4-FFF2-40B4-BE49-F238E27FC236}">
-                <a16:creationId xmlns:a16="http://schemas.microsoft.com/office/drawing/2014/main" id="{3C139C78-34D1-A891-4ECB-4231D778D887}"/>
-              </a:ext>
-            </a:extLst>
-          </p:cNvPr>
-          <p:cNvSpPr>
-            <a:spLocks noGrp="1"/>
-          </p:cNvSpPr>
-          <p:nvPr>
-            <p:ph type="pic" idx="1"/>
-          </p:nvPr>
-        </p:nvSpPr>
-        <p:spPr>
-          <a:xfrm>
-            <a:off x="5183188" y="987425"/>
-            <a:ext cx="6172200" cy="4873625"/>
+            <a:off x="5513614" y="987425"/>
+            <a:ext cx="5535386" cy="4873625"/>
           </a:xfrm>
         </p:spPr>
         <p:txBody>
@@ -2565,7 +2800,7 @@
             </a:lvl9pPr>
           </a:lstStyle>
           <a:p>
-            <a:endParaRPr lang="en-US"/>
+            <a:endParaRPr lang="en-US" dirty="0"/>
           </a:p>
         </p:txBody>
       </p:sp>
@@ -2574,7 +2809,7 @@
           <p:cNvPr id="4" name="Text Placeholder 3">
             <a:extLst>
               <a:ext uri="{FF2B5EF4-FFF2-40B4-BE49-F238E27FC236}">
-                <a16:creationId xmlns:a16="http://schemas.microsoft.com/office/drawing/2014/main" id="{CE85268B-0501-19D0-CB60-C2EB26D90060}"/>
+                <a16:creationId xmlns:a16="http://schemas.microsoft.com/office/drawing/2014/main" id="{66138C1E-867B-4FE9-8783-9B1246AEB797}"/>
               </a:ext>
             </a:extLst>
           </p:cNvPr>
@@ -2587,8 +2822,8 @@
         </p:nvSpPr>
         <p:spPr>
           <a:xfrm>
-            <a:off x="839788" y="2057400"/>
-            <a:ext cx="3932237" cy="3811588"/>
+            <a:off x="1143000" y="3657601"/>
+            <a:ext cx="3932236" cy="2211388"/>
           </a:xfrm>
         </p:spPr>
         <p:txBody>
@@ -2596,7 +2831,7 @@
           <a:lstStyle>
             <a:lvl1pPr marL="0" indent="0">
               <a:buNone/>
-              <a:defRPr sz="1600"/>
+              <a:defRPr sz="1600" i="1"/>
             </a:lvl1pPr>
             <a:lvl2pPr marL="457200" indent="0">
               <a:buNone/>
@@ -2634,7 +2869,7 @@
           <a:p>
             <a:pPr lvl="0"/>
             <a:r>
-              <a:rPr lang="en-US"/>
+              <a:rPr lang="en-US" dirty="0"/>
               <a:t>Click to edit Master text styles</a:t>
             </a:r>
           </a:p>
@@ -2645,7 +2880,7 @@
           <p:cNvPr id="5" name="Date Placeholder 4">
             <a:extLst>
               <a:ext uri="{FF2B5EF4-FFF2-40B4-BE49-F238E27FC236}">
-                <a16:creationId xmlns:a16="http://schemas.microsoft.com/office/drawing/2014/main" id="{FE5D69C4-8EC6-02F7-3F42-3DE48ECED968}"/>
+                <a16:creationId xmlns:a16="http://schemas.microsoft.com/office/drawing/2014/main" id="{00721568-4870-46F2-9F7E-F410702012D9}"/>
               </a:ext>
             </a:extLst>
           </p:cNvPr>
@@ -2661,7 +2896,7 @@
           <a:bodyPr/>
           <a:lstStyle/>
           <a:p>
-            <a:fld id="{FE6A70BB-274E-3D43-8283-A9C170117839}" type="datetimeFigureOut">
+            <a:fld id="{3CADBD16-5BFB-4D9F-9646-C75D1B53BBB6}" type="datetimeFigureOut">
               <a:rPr lang="en-US" smtClean="0"/>
               <a:t>11/19/23</a:t>
             </a:fld>
@@ -2674,7 +2909,7 @@
           <p:cNvPr id="6" name="Footer Placeholder 5">
             <a:extLst>
               <a:ext uri="{FF2B5EF4-FFF2-40B4-BE49-F238E27FC236}">
-                <a16:creationId xmlns:a16="http://schemas.microsoft.com/office/drawing/2014/main" id="{EF919911-6756-09D7-ECD6-C08CCB36F39D}"/>
+                <a16:creationId xmlns:a16="http://schemas.microsoft.com/office/drawing/2014/main" id="{0BB3CC65-0E73-45A1-9D4F-3F4559B3B659}"/>
               </a:ext>
             </a:extLst>
           </p:cNvPr>
@@ -2699,7 +2934,7 @@
           <p:cNvPr id="7" name="Slide Number Placeholder 6">
             <a:extLst>
               <a:ext uri="{FF2B5EF4-FFF2-40B4-BE49-F238E27FC236}">
-                <a16:creationId xmlns:a16="http://schemas.microsoft.com/office/drawing/2014/main" id="{42E0FB65-9D2D-8DBA-4B1B-0B570A3553CA}"/>
+                <a16:creationId xmlns:a16="http://schemas.microsoft.com/office/drawing/2014/main" id="{B58C58CD-9BC3-431E-A7B4-D596A7F06C5E}"/>
               </a:ext>
             </a:extLst>
           </p:cNvPr>
@@ -2715,7 +2950,7 @@
           <a:bodyPr/>
           <a:lstStyle/>
           <a:p>
-            <a:fld id="{E5F80103-A353-9143-ABE1-D1723BD49AAE}" type="slidenum">
+            <a:fld id="{C0722274-0FAA-4649-AA4E-4210F4F32167}" type="slidenum">
               <a:rPr lang="en-US" smtClean="0"/>
               <a:t>‹#›</a:t>
             </a:fld>
@@ -2723,10 +2958,52 @@
           </a:p>
         </p:txBody>
       </p:sp>
+      <p:sp>
+        <p:nvSpPr>
+          <p:cNvPr id="2" name="Title 1">
+            <a:extLst>
+              <a:ext uri="{FF2B5EF4-FFF2-40B4-BE49-F238E27FC236}">
+                <a16:creationId xmlns:a16="http://schemas.microsoft.com/office/drawing/2014/main" id="{2368F756-D171-474C-8B1A-C818032F6F78}"/>
+              </a:ext>
+            </a:extLst>
+          </p:cNvPr>
+          <p:cNvSpPr>
+            <a:spLocks noGrp="1"/>
+          </p:cNvSpPr>
+          <p:nvPr>
+            <p:ph type="title"/>
+          </p:nvPr>
+        </p:nvSpPr>
+        <p:spPr>
+          <a:xfrm>
+            <a:off x="1143000" y="1600201"/>
+            <a:ext cx="3932236" cy="1959428"/>
+          </a:xfrm>
+        </p:spPr>
+        <p:txBody>
+          <a:bodyPr anchor="b">
+            <a:normAutofit/>
+          </a:bodyPr>
+          <a:lstStyle>
+            <a:lvl1pPr>
+              <a:lnSpc>
+                <a:spcPct val="110000"/>
+              </a:lnSpc>
+              <a:defRPr sz="2400" cap="all" spc="300" baseline="0"/>
+            </a:lvl1pPr>
+          </a:lstStyle>
+          <a:p>
+            <a:r>
+              <a:rPr lang="en-US" dirty="0"/>
+              <a:t>Click to edit Master title style</a:t>
+            </a:r>
+          </a:p>
+        </p:txBody>
+      </p:sp>
     </p:spTree>
     <p:extLst>
       <p:ext uri="{BB962C8B-B14F-4D97-AF65-F5344CB8AC3E}">
-        <p14:creationId xmlns:p14="http://schemas.microsoft.com/office/powerpoint/2010/main" val="582577088"/>
+        <p14:creationId xmlns:p14="http://schemas.microsoft.com/office/powerpoint/2010/main" val="4137005638"/>
       </p:ext>
     </p:extLst>
   </p:cSld>
@@ -2760,24 +3037,251 @@
       </p:grpSpPr>
       <p:sp>
         <p:nvSpPr>
-          <p:cNvPr id="2" name="Title Placeholder 1">
-            <a:extLst>
-              <a:ext uri="{FF2B5EF4-FFF2-40B4-BE49-F238E27FC236}">
-                <a16:creationId xmlns:a16="http://schemas.microsoft.com/office/drawing/2014/main" id="{556699DC-302D-81C9-B036-E990A5D30DFD}"/>
-              </a:ext>
-            </a:extLst>
-          </p:cNvPr>
-          <p:cNvSpPr>
-            <a:spLocks noGrp="1"/>
-          </p:cNvSpPr>
-          <p:nvPr>
-            <p:ph type="title"/>
-          </p:nvPr>
+          <p:cNvPr id="8" name="Freeform: Shape 7">
+            <a:extLst>
+              <a:ext uri="{FF2B5EF4-FFF2-40B4-BE49-F238E27FC236}">
+                <a16:creationId xmlns:a16="http://schemas.microsoft.com/office/drawing/2014/main" id="{91C2F78B-DEE8-4195-A196-DFC51BDADFF9}"/>
+              </a:ext>
+            </a:extLst>
+          </p:cNvPr>
+          <p:cNvSpPr/>
+          <p:nvPr/>
         </p:nvSpPr>
         <p:spPr>
           <a:xfrm>
-            <a:off x="838200" y="365125"/>
-            <a:ext cx="10515600" cy="1325563"/>
+            <a:off x="9749268" y="4070878"/>
+            <a:ext cx="2442733" cy="2787123"/>
+          </a:xfrm>
+          <a:custGeom>
+            <a:avLst/>
+            <a:gdLst>
+              <a:gd name="connsiteX0" fmla="*/ 2442733 w 2442733"/>
+              <a:gd name="connsiteY0" fmla="*/ 0 h 2787123"/>
+              <a:gd name="connsiteX1" fmla="*/ 2442733 w 2442733"/>
+              <a:gd name="connsiteY1" fmla="*/ 2787123 h 2787123"/>
+              <a:gd name="connsiteX2" fmla="*/ 0 w 2442733"/>
+              <a:gd name="connsiteY2" fmla="*/ 2787123 h 2787123"/>
+            </a:gdLst>
+            <a:ahLst/>
+            <a:cxnLst>
+              <a:cxn ang="0">
+                <a:pos x="connsiteX0" y="connsiteY0"/>
+              </a:cxn>
+              <a:cxn ang="0">
+                <a:pos x="connsiteX1" y="connsiteY1"/>
+              </a:cxn>
+              <a:cxn ang="0">
+                <a:pos x="connsiteX2" y="connsiteY2"/>
+              </a:cxn>
+            </a:cxnLst>
+            <a:rect l="l" t="t" r="r" b="b"/>
+            <a:pathLst>
+              <a:path w="2442733" h="2787123">
+                <a:moveTo>
+                  <a:pt x="2442733" y="0"/>
+                </a:moveTo>
+                <a:lnTo>
+                  <a:pt x="2442733" y="2787123"/>
+                </a:lnTo>
+                <a:lnTo>
+                  <a:pt x="0" y="2787123"/>
+                </a:lnTo>
+                <a:close/>
+              </a:path>
+            </a:pathLst>
+          </a:custGeom>
+          <a:solidFill>
+            <a:schemeClr val="bg2"/>
+          </a:solidFill>
+          <a:ln w="12700" cap="flat" cmpd="sng" algn="ctr">
+            <a:noFill/>
+            <a:prstDash val="solid"/>
+            <a:miter lim="800000"/>
+          </a:ln>
+          <a:effectLst/>
+        </p:spPr>
+        <p:style>
+          <a:lnRef idx="2">
+            <a:schemeClr val="accent1">
+              <a:shade val="50000"/>
+            </a:schemeClr>
+          </a:lnRef>
+          <a:fillRef idx="1">
+            <a:schemeClr val="accent1"/>
+          </a:fillRef>
+          <a:effectRef idx="0">
+            <a:schemeClr val="accent1"/>
+          </a:effectRef>
+          <a:fontRef idx="minor">
+            <a:schemeClr val="lt1"/>
+          </a:fontRef>
+        </p:style>
+        <p:txBody>
+          <a:bodyPr wrap="square" rtlCol="0" anchor="ctr">
+            <a:noAutofit/>
+          </a:bodyPr>
+          <a:lstStyle/>
+          <a:p>
+            <a:pPr algn="ctr"/>
+            <a:endParaRPr lang="en-US"/>
+          </a:p>
+        </p:txBody>
+      </p:sp>
+      <p:sp>
+        <p:nvSpPr>
+          <p:cNvPr id="10" name="Freeform: Shape 9">
+            <a:extLst>
+              <a:ext uri="{FF2B5EF4-FFF2-40B4-BE49-F238E27FC236}">
+                <a16:creationId xmlns:a16="http://schemas.microsoft.com/office/drawing/2014/main" id="{A1D79D08-4BE8-4799-BE09-5078DFEE2256}"/>
+              </a:ext>
+            </a:extLst>
+          </p:cNvPr>
+          <p:cNvSpPr/>
+          <p:nvPr/>
+        </p:nvSpPr>
+        <p:spPr>
+          <a:xfrm rot="10800000">
+            <a:off x="0" y="0"/>
+            <a:ext cx="2442733" cy="2787123"/>
+          </a:xfrm>
+          <a:custGeom>
+            <a:avLst/>
+            <a:gdLst>
+              <a:gd name="connsiteX0" fmla="*/ 2442733 w 2442733"/>
+              <a:gd name="connsiteY0" fmla="*/ 0 h 2787123"/>
+              <a:gd name="connsiteX1" fmla="*/ 2442733 w 2442733"/>
+              <a:gd name="connsiteY1" fmla="*/ 2787123 h 2787123"/>
+              <a:gd name="connsiteX2" fmla="*/ 0 w 2442733"/>
+              <a:gd name="connsiteY2" fmla="*/ 2787123 h 2787123"/>
+            </a:gdLst>
+            <a:ahLst/>
+            <a:cxnLst>
+              <a:cxn ang="0">
+                <a:pos x="connsiteX0" y="connsiteY0"/>
+              </a:cxn>
+              <a:cxn ang="0">
+                <a:pos x="connsiteX1" y="connsiteY1"/>
+              </a:cxn>
+              <a:cxn ang="0">
+                <a:pos x="connsiteX2" y="connsiteY2"/>
+              </a:cxn>
+            </a:cxnLst>
+            <a:rect l="l" t="t" r="r" b="b"/>
+            <a:pathLst>
+              <a:path w="2442733" h="2787123">
+                <a:moveTo>
+                  <a:pt x="2442733" y="0"/>
+                </a:moveTo>
+                <a:lnTo>
+                  <a:pt x="2442733" y="2787123"/>
+                </a:lnTo>
+                <a:lnTo>
+                  <a:pt x="0" y="2787123"/>
+                </a:lnTo>
+                <a:close/>
+              </a:path>
+            </a:pathLst>
+          </a:custGeom>
+          <a:solidFill>
+            <a:schemeClr val="bg2"/>
+          </a:solidFill>
+          <a:ln w="12700" cap="flat" cmpd="sng" algn="ctr">
+            <a:noFill/>
+            <a:prstDash val="solid"/>
+            <a:miter lim="800000"/>
+          </a:ln>
+          <a:effectLst/>
+        </p:spPr>
+        <p:style>
+          <a:lnRef idx="2">
+            <a:schemeClr val="accent1">
+              <a:shade val="50000"/>
+            </a:schemeClr>
+          </a:lnRef>
+          <a:fillRef idx="1">
+            <a:schemeClr val="accent1"/>
+          </a:fillRef>
+          <a:effectRef idx="0">
+            <a:schemeClr val="accent1"/>
+          </a:effectRef>
+          <a:fontRef idx="minor">
+            <a:schemeClr val="lt1"/>
+          </a:fontRef>
+        </p:style>
+        <p:txBody>
+          <a:bodyPr wrap="square" rtlCol="0" anchor="ctr">
+            <a:noAutofit/>
+          </a:bodyPr>
+          <a:lstStyle/>
+          <a:p>
+            <a:pPr algn="ctr"/>
+            <a:endParaRPr lang="en-US"/>
+          </a:p>
+        </p:txBody>
+      </p:sp>
+      <p:cxnSp>
+        <p:nvCxnSpPr>
+          <p:cNvPr id="12" name="Straight Connector 11">
+            <a:extLst>
+              <a:ext uri="{FF2B5EF4-FFF2-40B4-BE49-F238E27FC236}">
+                <a16:creationId xmlns:a16="http://schemas.microsoft.com/office/drawing/2014/main" id="{C95D65A1-16CB-407F-993F-2A6D59BCC0C8}"/>
+              </a:ext>
+            </a:extLst>
+          </p:cNvPr>
+          <p:cNvCxnSpPr>
+            <a:cxnSpLocks/>
+          </p:cNvCxnSpPr>
+          <p:nvPr/>
+        </p:nvCxnSpPr>
+        <p:spPr>
+          <a:xfrm>
+            <a:off x="1233837" y="6172200"/>
+            <a:ext cx="9760638" cy="0"/>
+          </a:xfrm>
+          <a:prstGeom prst="line">
+            <a:avLst/>
+          </a:prstGeom>
+          <a:ln w="12700">
+            <a:solidFill>
+              <a:schemeClr val="tx1"/>
+            </a:solidFill>
+          </a:ln>
+        </p:spPr>
+        <p:style>
+          <a:lnRef idx="1">
+            <a:schemeClr val="accent1"/>
+          </a:lnRef>
+          <a:fillRef idx="0">
+            <a:schemeClr val="accent1"/>
+          </a:fillRef>
+          <a:effectRef idx="0">
+            <a:schemeClr val="accent1"/>
+          </a:effectRef>
+          <a:fontRef idx="minor">
+            <a:schemeClr val="tx1"/>
+          </a:fontRef>
+        </p:style>
+      </p:cxnSp>
+      <p:sp>
+        <p:nvSpPr>
+          <p:cNvPr id="2" name="Title Placeholder 1">
+            <a:extLst>
+              <a:ext uri="{FF2B5EF4-FFF2-40B4-BE49-F238E27FC236}">
+                <a16:creationId xmlns:a16="http://schemas.microsoft.com/office/drawing/2014/main" id="{0BA018A2-815D-41B0-A189-FDF7A5E88891}"/>
+              </a:ext>
+            </a:extLst>
+          </p:cNvPr>
+          <p:cNvSpPr>
+            <a:spLocks noGrp="1"/>
+          </p:cNvSpPr>
+          <p:nvPr>
+            <p:ph type="title"/>
+          </p:nvPr>
+        </p:nvSpPr>
+        <p:spPr>
+          <a:xfrm>
+            <a:off x="1143000" y="872935"/>
+            <a:ext cx="9905999" cy="1360898"/>
           </a:xfrm>
           <a:prstGeom prst="rect">
             <a:avLst/>
@@ -2790,7 +3294,7 @@
           <a:lstStyle/>
           <a:p>
             <a:r>
-              <a:rPr lang="en-US"/>
+              <a:rPr lang="en-US" dirty="0"/>
               <a:t>Click to edit Master title style</a:t>
             </a:r>
           </a:p>
@@ -2801,7 +3305,7 @@
           <p:cNvPr id="3" name="Text Placeholder 2">
             <a:extLst>
               <a:ext uri="{FF2B5EF4-FFF2-40B4-BE49-F238E27FC236}">
-                <a16:creationId xmlns:a16="http://schemas.microsoft.com/office/drawing/2014/main" id="{27A802B5-11E9-8101-C353-C46210852214}"/>
+                <a16:creationId xmlns:a16="http://schemas.microsoft.com/office/drawing/2014/main" id="{36DFAE63-1276-4C7C-BFF5-F5DF1CDB23E5}"/>
               </a:ext>
             </a:extLst>
           </p:cNvPr>
@@ -2814,8 +3318,8 @@
         </p:nvSpPr>
         <p:spPr>
           <a:xfrm>
-            <a:off x="838200" y="1825625"/>
-            <a:ext cx="10515600" cy="4351338"/>
+            <a:off x="1143000" y="2332026"/>
+            <a:ext cx="9905999" cy="3567118"/>
           </a:xfrm>
           <a:prstGeom prst="rect">
             <a:avLst/>
@@ -2829,35 +3333,35 @@
           <a:p>
             <a:pPr lvl="0"/>
             <a:r>
-              <a:rPr lang="en-US"/>
+              <a:rPr lang="en-US" dirty="0"/>
               <a:t>Click to edit Master text styles</a:t>
             </a:r>
           </a:p>
           <a:p>
             <a:pPr lvl="1"/>
             <a:r>
-              <a:rPr lang="en-US"/>
+              <a:rPr lang="en-US" dirty="0"/>
               <a:t>Second level</a:t>
             </a:r>
           </a:p>
           <a:p>
             <a:pPr lvl="2"/>
             <a:r>
-              <a:rPr lang="en-US"/>
+              <a:rPr lang="en-US" dirty="0"/>
               <a:t>Third level</a:t>
             </a:r>
           </a:p>
           <a:p>
             <a:pPr lvl="3"/>
             <a:r>
-              <a:rPr lang="en-US"/>
+              <a:rPr lang="en-US" dirty="0"/>
               <a:t>Fourth level</a:t>
             </a:r>
           </a:p>
           <a:p>
             <a:pPr lvl="4"/>
             <a:r>
-              <a:rPr lang="en-US"/>
+              <a:rPr lang="en-US" dirty="0"/>
               <a:t>Fifth level</a:t>
             </a:r>
           </a:p>
@@ -2868,7 +3372,7 @@
           <p:cNvPr id="4" name="Date Placeholder 3">
             <a:extLst>
               <a:ext uri="{FF2B5EF4-FFF2-40B4-BE49-F238E27FC236}">
-                <a16:creationId xmlns:a16="http://schemas.microsoft.com/office/drawing/2014/main" id="{C00FFB40-7A6C-321D-0603-0FDD5788E916}"/>
+                <a16:creationId xmlns:a16="http://schemas.microsoft.com/office/drawing/2014/main" id="{55380268-2D73-487C-843B-51648AE18194}"/>
               </a:ext>
             </a:extLst>
           </p:cNvPr>
@@ -2881,8 +3385,8 @@
         </p:nvSpPr>
         <p:spPr>
           <a:xfrm>
-            <a:off x="838200" y="6356350"/>
-            <a:ext cx="2743200" cy="365125"/>
+            <a:off x="7388157" y="6356350"/>
+            <a:ext cx="3093395" cy="365125"/>
           </a:xfrm>
           <a:prstGeom prst="rect">
             <a:avLst/>
@@ -2891,22 +3395,21 @@
         <p:txBody>
           <a:bodyPr vert="horz" lIns="91440" tIns="45720" rIns="91440" bIns="45720" rtlCol="0" anchor="ctr"/>
           <a:lstStyle>
-            <a:lvl1pPr algn="l">
-              <a:defRPr sz="1200">
+            <a:lvl1pPr algn="r">
+              <a:defRPr sz="1050">
                 <a:solidFill>
-                  <a:schemeClr val="tx1">
-                    <a:tint val="75000"/>
-                  </a:schemeClr>
+                  <a:schemeClr val="tx1"/>
                 </a:solidFill>
               </a:defRPr>
             </a:lvl1pPr>
           </a:lstStyle>
           <a:p>
-            <a:fld id="{FE6A70BB-274E-3D43-8283-A9C170117839}" type="datetimeFigureOut">
+            <a:fld id="{3CADBD16-5BFB-4D9F-9646-C75D1B53BBB6}" type="datetimeFigureOut">
               <a:rPr lang="en-US" smtClean="0"/>
+              <a:pPr/>
               <a:t>11/19/23</a:t>
             </a:fld>
-            <a:endParaRPr lang="en-US"/>
+            <a:endParaRPr lang="en-US" dirty="0"/>
           </a:p>
         </p:txBody>
       </p:sp>
@@ -2915,7 +3418,7 @@
           <p:cNvPr id="5" name="Footer Placeholder 4">
             <a:extLst>
               <a:ext uri="{FF2B5EF4-FFF2-40B4-BE49-F238E27FC236}">
-                <a16:creationId xmlns:a16="http://schemas.microsoft.com/office/drawing/2014/main" id="{17CE63CC-EB5A-4D4F-3AD9-67BD93570E0A}"/>
+                <a16:creationId xmlns:a16="http://schemas.microsoft.com/office/drawing/2014/main" id="{99F61E6D-D51F-4BD7-B59D-19AF179177B8}"/>
               </a:ext>
             </a:extLst>
           </p:cNvPr>
@@ -2928,8 +3431,8 @@
         </p:nvSpPr>
         <p:spPr>
           <a:xfrm>
-            <a:off x="4038600" y="6356350"/>
-            <a:ext cx="4114800" cy="365125"/>
+            <a:off x="1143000" y="6356350"/>
+            <a:ext cx="3959157" cy="365125"/>
           </a:xfrm>
           <a:prstGeom prst="rect">
             <a:avLst/>
@@ -2938,18 +3441,16 @@
         <p:txBody>
           <a:bodyPr vert="horz" lIns="91440" tIns="45720" rIns="91440" bIns="45720" rtlCol="0" anchor="ctr"/>
           <a:lstStyle>
-            <a:lvl1pPr algn="ctr">
-              <a:defRPr sz="1200">
+            <a:lvl1pPr algn="l">
+              <a:defRPr sz="1050">
                 <a:solidFill>
-                  <a:schemeClr val="tx1">
-                    <a:tint val="75000"/>
-                  </a:schemeClr>
+                  <a:schemeClr val="tx1"/>
                 </a:solidFill>
               </a:defRPr>
             </a:lvl1pPr>
           </a:lstStyle>
           <a:p>
-            <a:endParaRPr lang="en-US"/>
+            <a:endParaRPr lang="en-US" dirty="0"/>
           </a:p>
         </p:txBody>
       </p:sp>
@@ -2958,7 +3459,7 @@
           <p:cNvPr id="6" name="Slide Number Placeholder 5">
             <a:extLst>
               <a:ext uri="{FF2B5EF4-FFF2-40B4-BE49-F238E27FC236}">
-                <a16:creationId xmlns:a16="http://schemas.microsoft.com/office/drawing/2014/main" id="{C99C04E0-9EA2-D675-C11D-98FEFC46217D}"/>
+                <a16:creationId xmlns:a16="http://schemas.microsoft.com/office/drawing/2014/main" id="{127701B1-1C93-41C2-AEE1-815DEA51B962}"/>
               </a:ext>
             </a:extLst>
           </p:cNvPr>
@@ -2971,8 +3472,8 @@
         </p:nvSpPr>
         <p:spPr>
           <a:xfrm>
-            <a:off x="8610600" y="6356350"/>
-            <a:ext cx="2743200" cy="365125"/>
+            <a:off x="10423186" y="6356350"/>
+            <a:ext cx="625813" cy="365125"/>
           </a:xfrm>
           <a:prstGeom prst="rect">
             <a:avLst/>
@@ -2982,56 +3483,55 @@
           <a:bodyPr vert="horz" lIns="91440" tIns="45720" rIns="91440" bIns="45720" rtlCol="0" anchor="ctr"/>
           <a:lstStyle>
             <a:lvl1pPr algn="r">
-              <a:defRPr sz="1200">
+              <a:defRPr sz="1050">
                 <a:solidFill>
-                  <a:schemeClr val="tx1">
-                    <a:tint val="75000"/>
-                  </a:schemeClr>
+                  <a:schemeClr val="tx1"/>
                 </a:solidFill>
               </a:defRPr>
             </a:lvl1pPr>
           </a:lstStyle>
           <a:p>
-            <a:fld id="{E5F80103-A353-9143-ABE1-D1723BD49AAE}" type="slidenum">
+            <a:fld id="{C0722274-0FAA-4649-AA4E-4210F4F32167}" type="slidenum">
               <a:rPr lang="en-US" smtClean="0"/>
+              <a:pPr/>
               <a:t>‹#›</a:t>
             </a:fld>
-            <a:endParaRPr lang="en-US"/>
+            <a:endParaRPr lang="en-US" dirty="0"/>
           </a:p>
         </p:txBody>
       </p:sp>
     </p:spTree>
     <p:extLst>
       <p:ext uri="{BB962C8B-B14F-4D97-AF65-F5344CB8AC3E}">
-        <p14:creationId xmlns:p14="http://schemas.microsoft.com/office/powerpoint/2010/main" val="2344133081"/>
+        <p14:creationId xmlns:p14="http://schemas.microsoft.com/office/powerpoint/2010/main" val="862751173"/>
       </p:ext>
     </p:extLst>
   </p:cSld>
-  <p:clrMap bg1="lt1" tx1="dk1" bg2="lt2" tx2="dk2" accent1="accent1" accent2="accent2" accent3="accent3" accent4="accent4" accent5="accent5" accent6="accent6" hlink="hlink" folHlink="folHlink"/>
+  <p:clrMap bg1="dk1" tx1="lt1" bg2="dk2" tx2="lt2" accent1="accent1" accent2="accent2" accent3="accent3" accent4="accent4" accent5="accent5" accent6="accent6" hlink="hlink" folHlink="folHlink"/>
   <p:sldLayoutIdLst>
-    <p:sldLayoutId id="2147483649" r:id="rId1"/>
-    <p:sldLayoutId id="2147483650" r:id="rId2"/>
-    <p:sldLayoutId id="2147483651" r:id="rId3"/>
-    <p:sldLayoutId id="2147483652" r:id="rId4"/>
-    <p:sldLayoutId id="2147483653" r:id="rId5"/>
-    <p:sldLayoutId id="2147483654" r:id="rId6"/>
-    <p:sldLayoutId id="2147483655" r:id="rId7"/>
-    <p:sldLayoutId id="2147483656" r:id="rId8"/>
-    <p:sldLayoutId id="2147483657" r:id="rId9"/>
-    <p:sldLayoutId id="2147483658" r:id="rId10"/>
-    <p:sldLayoutId id="2147483659" r:id="rId11"/>
+    <p:sldLayoutId id="2147483675" r:id="rId1"/>
+    <p:sldLayoutId id="2147483676" r:id="rId2"/>
+    <p:sldLayoutId id="2147483677" r:id="rId3"/>
+    <p:sldLayoutId id="2147483678" r:id="rId4"/>
+    <p:sldLayoutId id="2147483679" r:id="rId5"/>
+    <p:sldLayoutId id="2147483685" r:id="rId6"/>
+    <p:sldLayoutId id="2147483680" r:id="rId7"/>
+    <p:sldLayoutId id="2147483681" r:id="rId8"/>
+    <p:sldLayoutId id="2147483682" r:id="rId9"/>
+    <p:sldLayoutId id="2147483684" r:id="rId10"/>
+    <p:sldLayoutId id="2147483683" r:id="rId11"/>
   </p:sldLayoutIdLst>
   <p:txStyles>
     <p:titleStyle>
       <a:lvl1pPr algn="l" defTabSz="914400" rtl="0" eaLnBrk="1" latinLnBrk="0" hangingPunct="1">
         <a:lnSpc>
-          <a:spcPct val="90000"/>
+          <a:spcPct val="100000"/>
         </a:lnSpc>
         <a:spcBef>
           <a:spcPct val="0"/>
         </a:spcBef>
         <a:buNone/>
-        <a:defRPr sz="4400" kern="1200">
+        <a:defRPr sz="4000" kern="1200">
           <a:solidFill>
             <a:schemeClr val="tx1"/>
           </a:solidFill>
@@ -3044,46 +3544,10 @@
     <p:bodyStyle>
       <a:lvl1pPr marL="228600" indent="-228600" algn="l" defTabSz="914400" rtl="0" eaLnBrk="1" latinLnBrk="0" hangingPunct="1">
         <a:lnSpc>
-          <a:spcPct val="90000"/>
+          <a:spcPct val="120000"/>
         </a:lnSpc>
         <a:spcBef>
           <a:spcPts val="1000"/>
-        </a:spcBef>
-        <a:buFont typeface="Arial" panose="020B0604020202020204" pitchFamily="34" charset="0"/>
-        <a:buChar char="•"/>
-        <a:defRPr sz="2800" kern="1200">
-          <a:solidFill>
-            <a:schemeClr val="tx1"/>
-          </a:solidFill>
-          <a:latin typeface="+mn-lt"/>
-          <a:ea typeface="+mn-ea"/>
-          <a:cs typeface="+mn-cs"/>
-        </a:defRPr>
-      </a:lvl1pPr>
-      <a:lvl2pPr marL="685800" indent="-228600" algn="l" defTabSz="914400" rtl="0" eaLnBrk="1" latinLnBrk="0" hangingPunct="1">
-        <a:lnSpc>
-          <a:spcPct val="90000"/>
-        </a:lnSpc>
-        <a:spcBef>
-          <a:spcPts val="500"/>
-        </a:spcBef>
-        <a:buFont typeface="Arial" panose="020B0604020202020204" pitchFamily="34" charset="0"/>
-        <a:buChar char="•"/>
-        <a:defRPr sz="2400" kern="1200">
-          <a:solidFill>
-            <a:schemeClr val="tx1"/>
-          </a:solidFill>
-          <a:latin typeface="+mn-lt"/>
-          <a:ea typeface="+mn-ea"/>
-          <a:cs typeface="+mn-cs"/>
-        </a:defRPr>
-      </a:lvl2pPr>
-      <a:lvl3pPr marL="1143000" indent="-228600" algn="l" defTabSz="914400" rtl="0" eaLnBrk="1" latinLnBrk="0" hangingPunct="1">
-        <a:lnSpc>
-          <a:spcPct val="90000"/>
-        </a:lnSpc>
-        <a:spcBef>
-          <a:spcPts val="500"/>
         </a:spcBef>
         <a:buFont typeface="Arial" panose="020B0604020202020204" pitchFamily="34" charset="0"/>
         <a:buChar char="•"/>
@@ -3095,17 +3559,53 @@
           <a:ea typeface="+mn-ea"/>
           <a:cs typeface="+mn-cs"/>
         </a:defRPr>
-      </a:lvl3pPr>
-      <a:lvl4pPr marL="1600200" indent="-228600" algn="l" defTabSz="914400" rtl="0" eaLnBrk="1" latinLnBrk="0" hangingPunct="1">
+      </a:lvl1pPr>
+      <a:lvl2pPr marL="228600" indent="0" algn="l" defTabSz="914400" rtl="0" eaLnBrk="1" latinLnBrk="0" hangingPunct="1">
         <a:lnSpc>
-          <a:spcPct val="90000"/>
+          <a:spcPct val="120000"/>
+        </a:lnSpc>
+        <a:spcBef>
+          <a:spcPts val="500"/>
+        </a:spcBef>
+        <a:buFontTx/>
+        <a:buNone/>
+        <a:defRPr sz="1800" i="1" kern="1200">
+          <a:solidFill>
+            <a:schemeClr val="tx1"/>
+          </a:solidFill>
+          <a:latin typeface="+mn-lt"/>
+          <a:ea typeface="+mn-ea"/>
+          <a:cs typeface="+mn-cs"/>
+        </a:defRPr>
+      </a:lvl2pPr>
+      <a:lvl3pPr marL="457200" indent="-228600" algn="l" defTabSz="914400" rtl="0" eaLnBrk="1" latinLnBrk="0" hangingPunct="1">
+        <a:lnSpc>
+          <a:spcPct val="120000"/>
         </a:lnSpc>
         <a:spcBef>
           <a:spcPts val="500"/>
         </a:spcBef>
         <a:buFont typeface="Arial" panose="020B0604020202020204" pitchFamily="34" charset="0"/>
         <a:buChar char="•"/>
-        <a:defRPr sz="1800" kern="1200">
+        <a:defRPr sz="1600" kern="1200">
+          <a:solidFill>
+            <a:schemeClr val="tx1"/>
+          </a:solidFill>
+          <a:latin typeface="+mn-lt"/>
+          <a:ea typeface="+mn-ea"/>
+          <a:cs typeface="+mn-cs"/>
+        </a:defRPr>
+      </a:lvl3pPr>
+      <a:lvl4pPr marL="502920" indent="0" algn="l" defTabSz="914400" rtl="0" eaLnBrk="1" latinLnBrk="0" hangingPunct="1">
+        <a:lnSpc>
+          <a:spcPct val="120000"/>
+        </a:lnSpc>
+        <a:spcBef>
+          <a:spcPts val="500"/>
+        </a:spcBef>
+        <a:buFontTx/>
+        <a:buNone/>
+        <a:defRPr sz="1400" i="1" kern="1200">
           <a:solidFill>
             <a:schemeClr val="tx1"/>
           </a:solidFill>
@@ -3114,16 +3614,16 @@
           <a:cs typeface="+mn-cs"/>
         </a:defRPr>
       </a:lvl4pPr>
-      <a:lvl5pPr marL="2057400" indent="-228600" algn="l" defTabSz="914400" rtl="0" eaLnBrk="1" latinLnBrk="0" hangingPunct="1">
+      <a:lvl5pPr marL="731520" indent="-228600" algn="l" defTabSz="914400" rtl="0" eaLnBrk="1" latinLnBrk="0" hangingPunct="1">
         <a:lnSpc>
-          <a:spcPct val="90000"/>
+          <a:spcPct val="120000"/>
         </a:lnSpc>
         <a:spcBef>
           <a:spcPts val="500"/>
         </a:spcBef>
         <a:buFont typeface="Arial" panose="020B0604020202020204" pitchFamily="34" charset="0"/>
         <a:buChar char="•"/>
-        <a:defRPr sz="1800" kern="1200">
+        <a:defRPr sz="1400" kern="1200">
           <a:solidFill>
             <a:schemeClr val="tx1"/>
           </a:solidFill>
@@ -3307,6 +3807,14 @@
 <file path=ppt/slides/slide1.xml><?xml version="1.0" encoding="utf-8"?>
 <p:sld xmlns:a="http://schemas.openxmlformats.org/drawingml/2006/main" xmlns:r="http://schemas.openxmlformats.org/officeDocument/2006/relationships" xmlns:p="http://schemas.openxmlformats.org/presentationml/2006/main">
   <p:cSld>
+    <p:bg>
+      <p:bgPr>
+        <a:solidFill>
+          <a:schemeClr val="bg1"/>
+        </a:solidFill>
+        <a:effectLst/>
+      </p:bgPr>
+    </p:bg>
     <p:spTree>
       <p:nvGrpSpPr>
         <p:cNvPr id="1" name=""/>
@@ -3321,6 +3829,518 @@
           <a:chExt cx="0" cy="0"/>
         </a:xfrm>
       </p:grpSpPr>
+      <p:sp useBgFill="1">
+        <p:nvSpPr>
+          <p:cNvPr id="24" name="Rectangle 23">
+            <a:extLst>
+              <a:ext uri="{FF2B5EF4-FFF2-40B4-BE49-F238E27FC236}">
+                <a16:creationId xmlns:a16="http://schemas.microsoft.com/office/drawing/2014/main" id="{37D505C3-540C-4E1B-AFF5-74A9D9BD3E44}"/>
+              </a:ext>
+              <a:ext uri="{C183D7F6-B498-43B3-948B-1728B52AA6E4}">
+                <adec:decorative xmlns:adec="http://schemas.microsoft.com/office/drawing/2017/decorative" val="1"/>
+              </a:ext>
+            </a:extLst>
+          </p:cNvPr>
+          <p:cNvSpPr>
+            <a:spLocks noGrp="1" noRot="1" noChangeAspect="1" noMove="1" noResize="1" noEditPoints="1" noAdjustHandles="1" noChangeArrowheads="1" noChangeShapeType="1" noTextEdit="1"/>
+          </p:cNvSpPr>
+          <p:nvPr>
+            <p:extLst>
+              <p:ext uri="{386F3935-93C4-4BCD-93E2-E3B085C9AB24}">
+                <p16:designElem xmlns:p16="http://schemas.microsoft.com/office/powerpoint/2015/main" val="1"/>
+              </p:ext>
+            </p:extLst>
+          </p:nvPr>
+        </p:nvSpPr>
+        <p:spPr>
+          <a:xfrm>
+            <a:off x="0" y="0"/>
+            <a:ext cx="12192000" cy="6858000"/>
+          </a:xfrm>
+          <a:prstGeom prst="rect">
+            <a:avLst/>
+          </a:prstGeom>
+          <a:ln w="12700" cap="flat" cmpd="sng" algn="ctr">
+            <a:noFill/>
+            <a:prstDash val="solid"/>
+            <a:miter lim="800000"/>
+          </a:ln>
+          <a:effectLst/>
+          <a:extLst>
+            <a:ext uri="{91240B29-F687-4F45-9708-019B960494DF}">
+              <a14:hiddenLine xmlns:a14="http://schemas.microsoft.com/office/drawing/2010/main" w="12700" cap="flat" cmpd="sng" algn="ctr">
+                <a:solidFill>
+                  <a:schemeClr val="accent1">
+                    <a:shade val="50000"/>
+                  </a:schemeClr>
+                </a:solidFill>
+                <a:prstDash val="solid"/>
+                <a:miter lim="800000"/>
+              </a14:hiddenLine>
+            </a:ext>
+          </a:extLst>
+        </p:spPr>
+        <p:style>
+          <a:lnRef idx="2">
+            <a:schemeClr val="accent1">
+              <a:shade val="50000"/>
+            </a:schemeClr>
+          </a:lnRef>
+          <a:fillRef idx="1">
+            <a:schemeClr val="accent1"/>
+          </a:fillRef>
+          <a:effectRef idx="0">
+            <a:schemeClr val="accent1"/>
+          </a:effectRef>
+          <a:fontRef idx="minor">
+            <a:schemeClr val="lt1"/>
+          </a:fontRef>
+        </p:style>
+        <p:txBody>
+          <a:bodyPr rtlCol="0" anchor="ctr"/>
+          <a:lstStyle/>
+          <a:p>
+            <a:pPr algn="ctr"/>
+            <a:endParaRPr lang="en-US"/>
+          </a:p>
+        </p:txBody>
+      </p:sp>
+      <p:pic>
+        <p:nvPicPr>
+          <p:cNvPr id="25" name="Picture 24" descr="Connected sticks shaping polygons background">
+            <a:extLst>
+              <a:ext uri="{FF2B5EF4-FFF2-40B4-BE49-F238E27FC236}">
+                <a16:creationId xmlns:a16="http://schemas.microsoft.com/office/drawing/2014/main" id="{42112CEC-8218-E2EE-9F0B-1EFCBB317B56}"/>
+              </a:ext>
+            </a:extLst>
+          </p:cNvPr>
+          <p:cNvPicPr>
+            <a:picLocks noChangeAspect="1"/>
+          </p:cNvPicPr>
+          <p:nvPr/>
+        </p:nvPicPr>
+        <p:blipFill rotWithShape="1">
+          <a:blip r:embed="rId2"/>
+          <a:srcRect t="10016" b="5715"/>
+          <a:stretch/>
+        </p:blipFill>
+        <p:spPr>
+          <a:xfrm>
+            <a:off x="20" y="10"/>
+            <a:ext cx="12191980" cy="6857990"/>
+          </a:xfrm>
+          <a:prstGeom prst="rect">
+            <a:avLst/>
+          </a:prstGeom>
+        </p:spPr>
+      </p:pic>
+      <p:sp>
+        <p:nvSpPr>
+          <p:cNvPr id="26" name="Freeform: Shape 10">
+            <a:extLst>
+              <a:ext uri="{FF2B5EF4-FFF2-40B4-BE49-F238E27FC236}">
+                <a16:creationId xmlns:a16="http://schemas.microsoft.com/office/drawing/2014/main" id="{C5C14909-AFB2-4E07-A65C-633954901FC1}"/>
+              </a:ext>
+              <a:ext uri="{C183D7F6-B498-43B3-948B-1728B52AA6E4}">
+                <adec:decorative xmlns:adec="http://schemas.microsoft.com/office/drawing/2017/decorative" val="1"/>
+              </a:ext>
+            </a:extLst>
+          </p:cNvPr>
+          <p:cNvSpPr>
+            <a:spLocks noGrp="1" noRot="1" noChangeAspect="1" noMove="1" noResize="1" noEditPoints="1" noAdjustHandles="1" noChangeArrowheads="1" noChangeShapeType="1" noTextEdit="1"/>
+          </p:cNvSpPr>
+          <p:nvPr>
+            <p:extLst>
+              <p:ext uri="{386F3935-93C4-4BCD-93E2-E3B085C9AB24}">
+                <p16:designElem xmlns:p16="http://schemas.microsoft.com/office/powerpoint/2015/main" val="1"/>
+              </p:ext>
+            </p:extLst>
+          </p:nvPr>
+        </p:nvSpPr>
+        <p:spPr>
+          <a:xfrm rot="16200000" flipH="1" flipV="1">
+            <a:off x="1127553" y="-1127553"/>
+            <a:ext cx="6858000" cy="9113106"/>
+          </a:xfrm>
+          <a:custGeom>
+            <a:avLst/>
+            <a:gdLst>
+              <a:gd name="connsiteX0" fmla="*/ 0 w 6858000"/>
+              <a:gd name="connsiteY0" fmla="*/ 7143270 h 9113106"/>
+              <a:gd name="connsiteX1" fmla="*/ 0 w 6858000"/>
+              <a:gd name="connsiteY1" fmla="*/ 6878623 h 9113106"/>
+              <a:gd name="connsiteX2" fmla="*/ 1 w 6858000"/>
+              <a:gd name="connsiteY2" fmla="*/ 6878623 h 9113106"/>
+              <a:gd name="connsiteX3" fmla="*/ 0 w 6858000"/>
+              <a:gd name="connsiteY3" fmla="*/ 4319945 h 9113106"/>
+              <a:gd name="connsiteX4" fmla="*/ 1 w 6858000"/>
+              <a:gd name="connsiteY4" fmla="*/ 4319945 h 9113106"/>
+              <a:gd name="connsiteX5" fmla="*/ 1 w 6858000"/>
+              <a:gd name="connsiteY5" fmla="*/ 13542 h 9113106"/>
+              <a:gd name="connsiteX6" fmla="*/ 0 w 6858000"/>
+              <a:gd name="connsiteY6" fmla="*/ 13540 h 9113106"/>
+              <a:gd name="connsiteX7" fmla="*/ 0 w 6858000"/>
+              <a:gd name="connsiteY7" fmla="*/ 0 h 9113106"/>
+              <a:gd name="connsiteX8" fmla="*/ 6858000 w 6858000"/>
+              <a:gd name="connsiteY8" fmla="*/ 6010591 h 9113106"/>
+              <a:gd name="connsiteX9" fmla="*/ 6858000 w 6858000"/>
+              <a:gd name="connsiteY9" fmla="*/ 3794798 h 9113106"/>
+              <a:gd name="connsiteX10" fmla="*/ 6858000 w 6858000"/>
+              <a:gd name="connsiteY10" fmla="*/ 3794798 h 9113106"/>
+              <a:gd name="connsiteX11" fmla="*/ 6858000 w 6858000"/>
+              <a:gd name="connsiteY11" fmla="*/ 3837120 h 9113106"/>
+              <a:gd name="connsiteX12" fmla="*/ 6858000 w 6858000"/>
+              <a:gd name="connsiteY12" fmla="*/ 6838049 h 9113106"/>
+              <a:gd name="connsiteX13" fmla="*/ 6858000 w 6858000"/>
+              <a:gd name="connsiteY13" fmla="*/ 9113106 h 9113106"/>
+              <a:gd name="connsiteX14" fmla="*/ 1 w 6858000"/>
+              <a:gd name="connsiteY14" fmla="*/ 9113106 h 9113106"/>
+              <a:gd name="connsiteX15" fmla="*/ 1 w 6858000"/>
+              <a:gd name="connsiteY15" fmla="*/ 7143270 h 9113106"/>
+            </a:gdLst>
+            <a:ahLst/>
+            <a:cxnLst>
+              <a:cxn ang="0">
+                <a:pos x="connsiteX0" y="connsiteY0"/>
+              </a:cxn>
+              <a:cxn ang="0">
+                <a:pos x="connsiteX1" y="connsiteY1"/>
+              </a:cxn>
+              <a:cxn ang="0">
+                <a:pos x="connsiteX2" y="connsiteY2"/>
+              </a:cxn>
+              <a:cxn ang="0">
+                <a:pos x="connsiteX3" y="connsiteY3"/>
+              </a:cxn>
+              <a:cxn ang="0">
+                <a:pos x="connsiteX4" y="connsiteY4"/>
+              </a:cxn>
+              <a:cxn ang="0">
+                <a:pos x="connsiteX5" y="connsiteY5"/>
+              </a:cxn>
+              <a:cxn ang="0">
+                <a:pos x="connsiteX6" y="connsiteY6"/>
+              </a:cxn>
+              <a:cxn ang="0">
+                <a:pos x="connsiteX7" y="connsiteY7"/>
+              </a:cxn>
+              <a:cxn ang="0">
+                <a:pos x="connsiteX8" y="connsiteY8"/>
+              </a:cxn>
+              <a:cxn ang="0">
+                <a:pos x="connsiteX9" y="connsiteY9"/>
+              </a:cxn>
+              <a:cxn ang="0">
+                <a:pos x="connsiteX10" y="connsiteY10"/>
+              </a:cxn>
+              <a:cxn ang="0">
+                <a:pos x="connsiteX11" y="connsiteY11"/>
+              </a:cxn>
+              <a:cxn ang="0">
+                <a:pos x="connsiteX12" y="connsiteY12"/>
+              </a:cxn>
+              <a:cxn ang="0">
+                <a:pos x="connsiteX13" y="connsiteY13"/>
+              </a:cxn>
+              <a:cxn ang="0">
+                <a:pos x="connsiteX14" y="connsiteY14"/>
+              </a:cxn>
+              <a:cxn ang="0">
+                <a:pos x="connsiteX15" y="connsiteY15"/>
+              </a:cxn>
+            </a:cxnLst>
+            <a:rect l="l" t="t" r="r" b="b"/>
+            <a:pathLst>
+              <a:path w="6858000" h="9113106">
+                <a:moveTo>
+                  <a:pt x="0" y="7143270"/>
+                </a:moveTo>
+                <a:lnTo>
+                  <a:pt x="0" y="6878623"/>
+                </a:lnTo>
+                <a:lnTo>
+                  <a:pt x="1" y="6878623"/>
+                </a:lnTo>
+                <a:lnTo>
+                  <a:pt x="0" y="4319945"/>
+                </a:lnTo>
+                <a:lnTo>
+                  <a:pt x="1" y="4319945"/>
+                </a:lnTo>
+                <a:lnTo>
+                  <a:pt x="1" y="13542"/>
+                </a:lnTo>
+                <a:lnTo>
+                  <a:pt x="0" y="13540"/>
+                </a:lnTo>
+                <a:lnTo>
+                  <a:pt x="0" y="0"/>
+                </a:lnTo>
+                <a:lnTo>
+                  <a:pt x="6858000" y="6010591"/>
+                </a:lnTo>
+                <a:lnTo>
+                  <a:pt x="6858000" y="3794798"/>
+                </a:lnTo>
+                <a:lnTo>
+                  <a:pt x="6858000" y="3794798"/>
+                </a:lnTo>
+                <a:lnTo>
+                  <a:pt x="6858000" y="3837120"/>
+                </a:lnTo>
+                <a:lnTo>
+                  <a:pt x="6858000" y="6838049"/>
+                </a:lnTo>
+                <a:lnTo>
+                  <a:pt x="6858000" y="9113106"/>
+                </a:lnTo>
+                <a:lnTo>
+                  <a:pt x="1" y="9113106"/>
+                </a:lnTo>
+                <a:lnTo>
+                  <a:pt x="1" y="7143270"/>
+                </a:lnTo>
+                <a:close/>
+              </a:path>
+            </a:pathLst>
+          </a:custGeom>
+          <a:solidFill>
+            <a:srgbClr val="000000">
+              <a:alpha val="60000"/>
+            </a:srgbClr>
+          </a:solidFill>
+          <a:ln>
+            <a:noFill/>
+          </a:ln>
+        </p:spPr>
+        <p:style>
+          <a:lnRef idx="2">
+            <a:schemeClr val="accent1">
+              <a:shade val="50000"/>
+            </a:schemeClr>
+          </a:lnRef>
+          <a:fillRef idx="1">
+            <a:schemeClr val="accent1"/>
+          </a:fillRef>
+          <a:effectRef idx="0">
+            <a:schemeClr val="accent1"/>
+          </a:effectRef>
+          <a:fontRef idx="minor">
+            <a:schemeClr val="lt1"/>
+          </a:fontRef>
+        </p:style>
+        <p:txBody>
+          <a:bodyPr wrap="square" rtlCol="0" anchor="ctr">
+            <a:noAutofit/>
+          </a:bodyPr>
+          <a:lstStyle/>
+          <a:p>
+            <a:pPr algn="ctr"/>
+            <a:endParaRPr lang="en-US"/>
+          </a:p>
+        </p:txBody>
+      </p:sp>
+      <p:sp>
+        <p:nvSpPr>
+          <p:cNvPr id="27" name="Freeform: Shape 12">
+            <a:extLst>
+              <a:ext uri="{FF2B5EF4-FFF2-40B4-BE49-F238E27FC236}">
+                <a16:creationId xmlns:a16="http://schemas.microsoft.com/office/drawing/2014/main" id="{5BC4B016-0848-4634-83F9-FBC4C80CAE8E}"/>
+              </a:ext>
+              <a:ext uri="{C183D7F6-B498-43B3-948B-1728B52AA6E4}">
+                <adec:decorative xmlns:adec="http://schemas.microsoft.com/office/drawing/2017/decorative" val="1"/>
+              </a:ext>
+            </a:extLst>
+          </p:cNvPr>
+          <p:cNvSpPr>
+            <a:spLocks noGrp="1" noRot="1" noChangeAspect="1" noMove="1" noResize="1" noEditPoints="1" noAdjustHandles="1" noChangeArrowheads="1" noChangeShapeType="1" noTextEdit="1"/>
+          </p:cNvSpPr>
+          <p:nvPr>
+            <p:extLst>
+              <p:ext uri="{386F3935-93C4-4BCD-93E2-E3B085C9AB24}">
+                <p16:designElem xmlns:p16="http://schemas.microsoft.com/office/powerpoint/2015/main" val="1"/>
+              </p:ext>
+            </p:extLst>
+          </p:nvPr>
+        </p:nvSpPr>
+        <p:spPr>
+          <a:xfrm>
+            <a:off x="5318308" y="0"/>
+            <a:ext cx="6873692" cy="6858000"/>
+          </a:xfrm>
+          <a:custGeom>
+            <a:avLst/>
+            <a:gdLst>
+              <a:gd name="connsiteX0" fmla="*/ 11328900 w 12192000"/>
+              <a:gd name="connsiteY0" fmla="*/ 0 h 6858000"/>
+              <a:gd name="connsiteX1" fmla="*/ 12192000 w 12192000"/>
+              <a:gd name="connsiteY1" fmla="*/ 0 h 6858000"/>
+              <a:gd name="connsiteX2" fmla="*/ 12192000 w 12192000"/>
+              <a:gd name="connsiteY2" fmla="*/ 6858000 h 6858000"/>
+              <a:gd name="connsiteX3" fmla="*/ 5318308 w 12192000"/>
+              <a:gd name="connsiteY3" fmla="*/ 6858000 h 6858000"/>
+              <a:gd name="connsiteX4" fmla="*/ 11328897 w 12192000"/>
+              <a:gd name="connsiteY4" fmla="*/ 4 h 6858000"/>
+              <a:gd name="connsiteX5" fmla="*/ 11328898 w 12192000"/>
+              <a:gd name="connsiteY5" fmla="*/ 2 h 6858000"/>
+              <a:gd name="connsiteX6" fmla="*/ 0 w 12192000"/>
+              <a:gd name="connsiteY6" fmla="*/ 0 h 6858000"/>
+              <a:gd name="connsiteX7" fmla="*/ 6700 w 12192000"/>
+              <a:gd name="connsiteY7" fmla="*/ 0 h 6858000"/>
+              <a:gd name="connsiteX8" fmla="*/ 6700 w 12192000"/>
+              <a:gd name="connsiteY8" fmla="*/ 6858000 h 6858000"/>
+              <a:gd name="connsiteX9" fmla="*/ 0 w 12192000"/>
+              <a:gd name="connsiteY9" fmla="*/ 6858000 h 6858000"/>
+              <a:gd name="connsiteX0" fmla="*/ 11328900 w 12192000"/>
+              <a:gd name="connsiteY0" fmla="*/ 0 h 6858000"/>
+              <a:gd name="connsiteX1" fmla="*/ 12192000 w 12192000"/>
+              <a:gd name="connsiteY1" fmla="*/ 0 h 6858000"/>
+              <a:gd name="connsiteX2" fmla="*/ 12192000 w 12192000"/>
+              <a:gd name="connsiteY2" fmla="*/ 6858000 h 6858000"/>
+              <a:gd name="connsiteX3" fmla="*/ 5318308 w 12192000"/>
+              <a:gd name="connsiteY3" fmla="*/ 6858000 h 6858000"/>
+              <a:gd name="connsiteX4" fmla="*/ 11328897 w 12192000"/>
+              <a:gd name="connsiteY4" fmla="*/ 4 h 6858000"/>
+              <a:gd name="connsiteX5" fmla="*/ 11328898 w 12192000"/>
+              <a:gd name="connsiteY5" fmla="*/ 2 h 6858000"/>
+              <a:gd name="connsiteX6" fmla="*/ 11328900 w 12192000"/>
+              <a:gd name="connsiteY6" fmla="*/ 0 h 6858000"/>
+              <a:gd name="connsiteX7" fmla="*/ 0 w 12192000"/>
+              <a:gd name="connsiteY7" fmla="*/ 6858000 h 6858000"/>
+              <a:gd name="connsiteX8" fmla="*/ 6700 w 12192000"/>
+              <a:gd name="connsiteY8" fmla="*/ 0 h 6858000"/>
+              <a:gd name="connsiteX9" fmla="*/ 6700 w 12192000"/>
+              <a:gd name="connsiteY9" fmla="*/ 6858000 h 6858000"/>
+              <a:gd name="connsiteX10" fmla="*/ 0 w 12192000"/>
+              <a:gd name="connsiteY10" fmla="*/ 6858000 h 6858000"/>
+              <a:gd name="connsiteX0" fmla="*/ 11322200 w 12185300"/>
+              <a:gd name="connsiteY0" fmla="*/ 0 h 6858000"/>
+              <a:gd name="connsiteX1" fmla="*/ 12185300 w 12185300"/>
+              <a:gd name="connsiteY1" fmla="*/ 0 h 6858000"/>
+              <a:gd name="connsiteX2" fmla="*/ 12185300 w 12185300"/>
+              <a:gd name="connsiteY2" fmla="*/ 6858000 h 6858000"/>
+              <a:gd name="connsiteX3" fmla="*/ 5311608 w 12185300"/>
+              <a:gd name="connsiteY3" fmla="*/ 6858000 h 6858000"/>
+              <a:gd name="connsiteX4" fmla="*/ 11322197 w 12185300"/>
+              <a:gd name="connsiteY4" fmla="*/ 4 h 6858000"/>
+              <a:gd name="connsiteX5" fmla="*/ 11322198 w 12185300"/>
+              <a:gd name="connsiteY5" fmla="*/ 2 h 6858000"/>
+              <a:gd name="connsiteX6" fmla="*/ 11322200 w 12185300"/>
+              <a:gd name="connsiteY6" fmla="*/ 0 h 6858000"/>
+              <a:gd name="connsiteX7" fmla="*/ 0 w 12185300"/>
+              <a:gd name="connsiteY7" fmla="*/ 6858000 h 6858000"/>
+              <a:gd name="connsiteX8" fmla="*/ 0 w 12185300"/>
+              <a:gd name="connsiteY8" fmla="*/ 0 h 6858000"/>
+              <a:gd name="connsiteX9" fmla="*/ 0 w 12185300"/>
+              <a:gd name="connsiteY9" fmla="*/ 6858000 h 6858000"/>
+              <a:gd name="connsiteX0" fmla="*/ 6010592 w 6873692"/>
+              <a:gd name="connsiteY0" fmla="*/ 0 h 6858000"/>
+              <a:gd name="connsiteX1" fmla="*/ 6873692 w 6873692"/>
+              <a:gd name="connsiteY1" fmla="*/ 0 h 6858000"/>
+              <a:gd name="connsiteX2" fmla="*/ 6873692 w 6873692"/>
+              <a:gd name="connsiteY2" fmla="*/ 6858000 h 6858000"/>
+              <a:gd name="connsiteX3" fmla="*/ 0 w 6873692"/>
+              <a:gd name="connsiteY3" fmla="*/ 6858000 h 6858000"/>
+              <a:gd name="connsiteX4" fmla="*/ 6010589 w 6873692"/>
+              <a:gd name="connsiteY4" fmla="*/ 4 h 6858000"/>
+              <a:gd name="connsiteX5" fmla="*/ 6010590 w 6873692"/>
+              <a:gd name="connsiteY5" fmla="*/ 2 h 6858000"/>
+              <a:gd name="connsiteX6" fmla="*/ 6010592 w 6873692"/>
+              <a:gd name="connsiteY6" fmla="*/ 0 h 6858000"/>
+            </a:gdLst>
+            <a:ahLst/>
+            <a:cxnLst>
+              <a:cxn ang="0">
+                <a:pos x="connsiteX0" y="connsiteY0"/>
+              </a:cxn>
+              <a:cxn ang="0">
+                <a:pos x="connsiteX1" y="connsiteY1"/>
+              </a:cxn>
+              <a:cxn ang="0">
+                <a:pos x="connsiteX2" y="connsiteY2"/>
+              </a:cxn>
+              <a:cxn ang="0">
+                <a:pos x="connsiteX3" y="connsiteY3"/>
+              </a:cxn>
+              <a:cxn ang="0">
+                <a:pos x="connsiteX4" y="connsiteY4"/>
+              </a:cxn>
+              <a:cxn ang="0">
+                <a:pos x="connsiteX5" y="connsiteY5"/>
+              </a:cxn>
+              <a:cxn ang="0">
+                <a:pos x="connsiteX6" y="connsiteY6"/>
+              </a:cxn>
+            </a:cxnLst>
+            <a:rect l="l" t="t" r="r" b="b"/>
+            <a:pathLst>
+              <a:path w="6873692" h="6858000">
+                <a:moveTo>
+                  <a:pt x="6010592" y="0"/>
+                </a:moveTo>
+                <a:lnTo>
+                  <a:pt x="6873692" y="0"/>
+                </a:lnTo>
+                <a:lnTo>
+                  <a:pt x="6873692" y="6858000"/>
+                </a:lnTo>
+                <a:lnTo>
+                  <a:pt x="0" y="6858000"/>
+                </a:lnTo>
+                <a:lnTo>
+                  <a:pt x="6010589" y="4"/>
+                </a:lnTo>
+                <a:cubicBezTo>
+                  <a:pt x="6010589" y="3"/>
+                  <a:pt x="6010590" y="3"/>
+                  <a:pt x="6010590" y="2"/>
+                </a:cubicBezTo>
+                <a:lnTo>
+                  <a:pt x="6010592" y="0"/>
+                </a:lnTo>
+                <a:close/>
+              </a:path>
+            </a:pathLst>
+          </a:custGeom>
+          <a:solidFill>
+            <a:srgbClr val="000000">
+              <a:alpha val="60000"/>
+            </a:srgbClr>
+          </a:solidFill>
+          <a:ln w="12700" cap="flat" cmpd="sng" algn="ctr">
+            <a:noFill/>
+            <a:prstDash val="solid"/>
+            <a:miter lim="800000"/>
+          </a:ln>
+          <a:effectLst/>
+        </p:spPr>
+        <p:style>
+          <a:lnRef idx="2">
+            <a:schemeClr val="accent1">
+              <a:shade val="50000"/>
+            </a:schemeClr>
+          </a:lnRef>
+          <a:fillRef idx="1">
+            <a:schemeClr val="accent1"/>
+          </a:fillRef>
+          <a:effectRef idx="0">
+            <a:schemeClr val="accent1"/>
+          </a:effectRef>
+          <a:fontRef idx="minor">
+            <a:schemeClr val="lt1"/>
+          </a:fontRef>
+        </p:style>
+        <p:txBody>
+          <a:bodyPr wrap="square" rtlCol="0" anchor="ctr">
+            <a:noAutofit/>
+          </a:bodyPr>
+          <a:lstStyle/>
+          <a:p>
+            <a:pPr algn="ctr"/>
+            <a:endParaRPr lang="en-US"/>
+          </a:p>
+        </p:txBody>
+      </p:sp>
       <p:sp>
         <p:nvSpPr>
           <p:cNvPr id="2" name="Title 1">
@@ -3337,12 +4357,23 @@
             <p:ph type="ctrTitle"/>
           </p:nvPr>
         </p:nvSpPr>
-        <p:spPr/>
-        <p:txBody>
-          <a:bodyPr/>
-          <a:lstStyle/>
-          <a:p>
-            <a:endParaRPr lang="en-US"/>
+        <p:spPr>
+          <a:xfrm>
+            <a:off x="1143001" y="1181101"/>
+            <a:ext cx="4953000" cy="2247899"/>
+          </a:xfrm>
+        </p:spPr>
+        <p:txBody>
+          <a:bodyPr>
+            <a:normAutofit/>
+          </a:bodyPr>
+          <a:lstStyle/>
+          <a:p>
+            <a:endParaRPr lang="en-US">
+              <a:solidFill>
+                <a:srgbClr val="FFFFFF"/>
+              </a:solidFill>
+            </a:endParaRPr>
           </a:p>
         </p:txBody>
       </p:sp>
@@ -3362,12 +4393,24 @@
             <p:ph type="subTitle" idx="1"/>
           </p:nvPr>
         </p:nvSpPr>
-        <p:spPr/>
-        <p:txBody>
-          <a:bodyPr/>
-          <a:lstStyle/>
-          <a:p>
-            <a:endParaRPr lang="en-US"/>
+        <p:spPr>
+          <a:xfrm>
+            <a:off x="7881374" y="4541983"/>
+            <a:ext cx="3167626" cy="1280159"/>
+          </a:xfrm>
+        </p:spPr>
+        <p:txBody>
+          <a:bodyPr anchor="b">
+            <a:normAutofit/>
+          </a:bodyPr>
+          <a:lstStyle/>
+          <a:p>
+            <a:pPr algn="r"/>
+            <a:endParaRPr lang="en-US">
+              <a:solidFill>
+                <a:srgbClr val="FFFFFF"/>
+              </a:solidFill>
+            </a:endParaRPr>
           </a:p>
         </p:txBody>
       </p:sp>
@@ -3384,151 +4427,297 @@
 </p:sld>
 </file>
 
+<file path=ppt/slides/slide2.xml><?xml version="1.0" encoding="utf-8"?>
+<p:sld xmlns:a="http://schemas.openxmlformats.org/drawingml/2006/main" xmlns:r="http://schemas.openxmlformats.org/officeDocument/2006/relationships" xmlns:p="http://schemas.openxmlformats.org/presentationml/2006/main">
+  <p:cSld>
+    <p:spTree>
+      <p:nvGrpSpPr>
+        <p:cNvPr id="1" name=""/>
+        <p:cNvGrpSpPr/>
+        <p:nvPr/>
+      </p:nvGrpSpPr>
+      <p:grpSpPr>
+        <a:xfrm>
+          <a:off x="0" y="0"/>
+          <a:ext cx="0" cy="0"/>
+          <a:chOff x="0" y="0"/>
+          <a:chExt cx="0" cy="0"/>
+        </a:xfrm>
+      </p:grpSpPr>
+      <p:sp>
+        <p:nvSpPr>
+          <p:cNvPr id="2" name="Title 1">
+            <a:extLst>
+              <a:ext uri="{FF2B5EF4-FFF2-40B4-BE49-F238E27FC236}">
+                <a16:creationId xmlns:a16="http://schemas.microsoft.com/office/drawing/2014/main" id="{9C511CE3-BE54-4C1B-57E0-1E0647B8E3BC}"/>
+              </a:ext>
+            </a:extLst>
+          </p:cNvPr>
+          <p:cNvSpPr>
+            <a:spLocks noGrp="1"/>
+          </p:cNvSpPr>
+          <p:nvPr>
+            <p:ph type="title"/>
+          </p:nvPr>
+        </p:nvSpPr>
+        <p:spPr/>
+        <p:txBody>
+          <a:bodyPr/>
+          <a:lstStyle/>
+          <a:p>
+            <a:endParaRPr lang="en-US"/>
+          </a:p>
+        </p:txBody>
+      </p:sp>
+      <p:sp>
+        <p:nvSpPr>
+          <p:cNvPr id="3" name="Content Placeholder 2">
+            <a:extLst>
+              <a:ext uri="{FF2B5EF4-FFF2-40B4-BE49-F238E27FC236}">
+                <a16:creationId xmlns:a16="http://schemas.microsoft.com/office/drawing/2014/main" id="{DB767829-3796-14D2-A6B2-76F322F3D4A4}"/>
+              </a:ext>
+            </a:extLst>
+          </p:cNvPr>
+          <p:cNvSpPr>
+            <a:spLocks noGrp="1"/>
+          </p:cNvSpPr>
+          <p:nvPr>
+            <p:ph idx="1"/>
+          </p:nvPr>
+        </p:nvSpPr>
+        <p:spPr/>
+        <p:txBody>
+          <a:bodyPr/>
+          <a:lstStyle/>
+          <a:p>
+            <a:endParaRPr lang="en-US"/>
+          </a:p>
+        </p:txBody>
+      </p:sp>
+    </p:spTree>
+    <p:extLst>
+      <p:ext uri="{BB962C8B-B14F-4D97-AF65-F5344CB8AC3E}">
+        <p14:creationId xmlns:p14="http://schemas.microsoft.com/office/powerpoint/2010/main" val="3440257450"/>
+      </p:ext>
+    </p:extLst>
+  </p:cSld>
+  <p:clrMapOvr>
+    <a:masterClrMapping/>
+  </p:clrMapOvr>
+</p:sld>
+</file>
+
+<file path=ppt/slides/slide3.xml><?xml version="1.0" encoding="utf-8"?>
+<p:sld xmlns:a="http://schemas.openxmlformats.org/drawingml/2006/main" xmlns:r="http://schemas.openxmlformats.org/officeDocument/2006/relationships" xmlns:p="http://schemas.openxmlformats.org/presentationml/2006/main">
+  <p:cSld>
+    <p:spTree>
+      <p:nvGrpSpPr>
+        <p:cNvPr id="1" name=""/>
+        <p:cNvGrpSpPr/>
+        <p:nvPr/>
+      </p:nvGrpSpPr>
+      <p:grpSpPr>
+        <a:xfrm>
+          <a:off x="0" y="0"/>
+          <a:ext cx="0" cy="0"/>
+          <a:chOff x="0" y="0"/>
+          <a:chExt cx="0" cy="0"/>
+        </a:xfrm>
+      </p:grpSpPr>
+      <p:sp>
+        <p:nvSpPr>
+          <p:cNvPr id="2" name="Title 1">
+            <a:extLst>
+              <a:ext uri="{FF2B5EF4-FFF2-40B4-BE49-F238E27FC236}">
+                <a16:creationId xmlns:a16="http://schemas.microsoft.com/office/drawing/2014/main" id="{7B157CD5-3759-8117-DD64-6CFE82CD28BB}"/>
+              </a:ext>
+            </a:extLst>
+          </p:cNvPr>
+          <p:cNvSpPr>
+            <a:spLocks noGrp="1"/>
+          </p:cNvSpPr>
+          <p:nvPr>
+            <p:ph type="title"/>
+          </p:nvPr>
+        </p:nvSpPr>
+        <p:spPr/>
+        <p:txBody>
+          <a:bodyPr/>
+          <a:lstStyle/>
+          <a:p>
+            <a:endParaRPr lang="en-US"/>
+          </a:p>
+        </p:txBody>
+      </p:sp>
+      <p:sp>
+        <p:nvSpPr>
+          <p:cNvPr id="3" name="Content Placeholder 2">
+            <a:extLst>
+              <a:ext uri="{FF2B5EF4-FFF2-40B4-BE49-F238E27FC236}">
+                <a16:creationId xmlns:a16="http://schemas.microsoft.com/office/drawing/2014/main" id="{2624D0FB-92C6-2CF7-9C03-44CC2CE45311}"/>
+              </a:ext>
+            </a:extLst>
+          </p:cNvPr>
+          <p:cNvSpPr>
+            <a:spLocks noGrp="1"/>
+          </p:cNvSpPr>
+          <p:nvPr>
+            <p:ph idx="1"/>
+          </p:nvPr>
+        </p:nvSpPr>
+        <p:spPr/>
+        <p:txBody>
+          <a:bodyPr/>
+          <a:lstStyle/>
+          <a:p>
+            <a:endParaRPr lang="en-US"/>
+          </a:p>
+        </p:txBody>
+      </p:sp>
+    </p:spTree>
+    <p:extLst>
+      <p:ext uri="{BB962C8B-B14F-4D97-AF65-F5344CB8AC3E}">
+        <p14:creationId xmlns:p14="http://schemas.microsoft.com/office/powerpoint/2010/main" val="2191037891"/>
+      </p:ext>
+    </p:extLst>
+  </p:cSld>
+  <p:clrMapOvr>
+    <a:masterClrMapping/>
+  </p:clrMapOvr>
+</p:sld>
+</file>
+
+<file path=ppt/slides/slide4.xml><?xml version="1.0" encoding="utf-8"?>
+<p:sld xmlns:a="http://schemas.openxmlformats.org/drawingml/2006/main" xmlns:r="http://schemas.openxmlformats.org/officeDocument/2006/relationships" xmlns:p="http://schemas.openxmlformats.org/presentationml/2006/main">
+  <p:cSld>
+    <p:spTree>
+      <p:nvGrpSpPr>
+        <p:cNvPr id="1" name=""/>
+        <p:cNvGrpSpPr/>
+        <p:nvPr/>
+      </p:nvGrpSpPr>
+      <p:grpSpPr>
+        <a:xfrm>
+          <a:off x="0" y="0"/>
+          <a:ext cx="0" cy="0"/>
+          <a:chOff x="0" y="0"/>
+          <a:chExt cx="0" cy="0"/>
+        </a:xfrm>
+      </p:grpSpPr>
+      <p:sp>
+        <p:nvSpPr>
+          <p:cNvPr id="2" name="Title 1">
+            <a:extLst>
+              <a:ext uri="{FF2B5EF4-FFF2-40B4-BE49-F238E27FC236}">
+                <a16:creationId xmlns:a16="http://schemas.microsoft.com/office/drawing/2014/main" id="{BC127AB1-4120-4BF5-B9C9-8DFDE90545B1}"/>
+              </a:ext>
+            </a:extLst>
+          </p:cNvPr>
+          <p:cNvSpPr>
+            <a:spLocks noGrp="1"/>
+          </p:cNvSpPr>
+          <p:nvPr>
+            <p:ph type="title"/>
+          </p:nvPr>
+        </p:nvSpPr>
+        <p:spPr/>
+        <p:txBody>
+          <a:bodyPr/>
+          <a:lstStyle/>
+          <a:p>
+            <a:endParaRPr lang="en-US"/>
+          </a:p>
+        </p:txBody>
+      </p:sp>
+      <p:sp>
+        <p:nvSpPr>
+          <p:cNvPr id="3" name="Content Placeholder 2">
+            <a:extLst>
+              <a:ext uri="{FF2B5EF4-FFF2-40B4-BE49-F238E27FC236}">
+                <a16:creationId xmlns:a16="http://schemas.microsoft.com/office/drawing/2014/main" id="{D64F6F7B-BE5D-3948-2500-9D0C6991CCA3}"/>
+              </a:ext>
+            </a:extLst>
+          </p:cNvPr>
+          <p:cNvSpPr>
+            <a:spLocks noGrp="1"/>
+          </p:cNvSpPr>
+          <p:nvPr>
+            <p:ph idx="1"/>
+          </p:nvPr>
+        </p:nvSpPr>
+        <p:spPr/>
+        <p:txBody>
+          <a:bodyPr/>
+          <a:lstStyle/>
+          <a:p>
+            <a:endParaRPr lang="en-US"/>
+          </a:p>
+        </p:txBody>
+      </p:sp>
+    </p:spTree>
+    <p:extLst>
+      <p:ext uri="{BB962C8B-B14F-4D97-AF65-F5344CB8AC3E}">
+        <p14:creationId xmlns:p14="http://schemas.microsoft.com/office/powerpoint/2010/main" val="1608388297"/>
+      </p:ext>
+    </p:extLst>
+  </p:cSld>
+  <p:clrMapOvr>
+    <a:masterClrMapping/>
+  </p:clrMapOvr>
+</p:sld>
+</file>
+
 <file path=ppt/theme/theme1.xml><?xml version="1.0" encoding="utf-8"?>
-<a:theme xmlns:a="http://schemas.openxmlformats.org/drawingml/2006/main" name="Office Theme">
+<a:theme xmlns:a="http://schemas.openxmlformats.org/drawingml/2006/main" name="RegattaVTI">
   <a:themeElements>
-    <a:clrScheme name="Office">
+    <a:clrScheme name="AnalogousFromLightSeedRightStep">
       <a:dk1>
-        <a:sysClr val="windowText" lastClr="000000"/>
+        <a:srgbClr val="000000"/>
       </a:dk1>
       <a:lt1>
-        <a:sysClr val="window" lastClr="FFFFFF"/>
+        <a:srgbClr val="FFFFFF"/>
       </a:lt1>
       <a:dk2>
-        <a:srgbClr val="44546A"/>
+        <a:srgbClr val="412524"/>
       </a:dk2>
       <a:lt2>
-        <a:srgbClr val="E7E6E6"/>
+        <a:srgbClr val="E2E8E8"/>
       </a:lt2>
       <a:accent1>
-        <a:srgbClr val="4472C4"/>
+        <a:srgbClr val="C69896"/>
       </a:accent1>
       <a:accent2>
-        <a:srgbClr val="ED7D31"/>
+        <a:srgbClr val="BA997F"/>
       </a:accent2>
       <a:accent3>
-        <a:srgbClr val="A5A5A5"/>
+        <a:srgbClr val="AAA480"/>
       </a:accent3>
       <a:accent4>
-        <a:srgbClr val="FFC000"/>
+        <a:srgbClr val="9BAA74"/>
       </a:accent4>
       <a:accent5>
-        <a:srgbClr val="5B9BD5"/>
+        <a:srgbClr val="8FAC82"/>
       </a:accent5>
       <a:accent6>
-        <a:srgbClr val="70AD47"/>
+        <a:srgbClr val="78B07E"/>
       </a:accent6>
       <a:hlink>
-        <a:srgbClr val="0563C1"/>
+        <a:srgbClr val="568D8F"/>
       </a:hlink>
       <a:folHlink>
-        <a:srgbClr val="954F72"/>
+        <a:srgbClr val="7F7F7F"/>
       </a:folHlink>
     </a:clrScheme>
-    <a:fontScheme name="Office">
+    <a:fontScheme name="Walbaum Display">
       <a:majorFont>
-        <a:latin typeface="Calibri Light" panose="020F0302020204030204"/>
+        <a:latin typeface="Walbaum Display"/>
         <a:ea typeface=""/>
         <a:cs typeface=""/>
-        <a:font script="Jpan" typeface="游ゴシック Light"/>
-        <a:font script="Hang" typeface="맑은 고딕"/>
-        <a:font script="Hans" typeface="等线 Light"/>
-        <a:font script="Hant" typeface="新細明體"/>
-        <a:font script="Arab" typeface="Times New Roman"/>
-        <a:font script="Hebr" typeface="Times New Roman"/>
-        <a:font script="Thai" typeface="Angsana New"/>
-        <a:font script="Ethi" typeface="Nyala"/>
-        <a:font script="Beng" typeface="Vrinda"/>
-        <a:font script="Gujr" typeface="Shruti"/>
-        <a:font script="Khmr" typeface="MoolBoran"/>
-        <a:font script="Knda" typeface="Tunga"/>
-        <a:font script="Guru" typeface="Raavi"/>
-        <a:font script="Cans" typeface="Euphemia"/>
-        <a:font script="Cher" typeface="Plantagenet Cherokee"/>
-        <a:font script="Yiii" typeface="Microsoft Yi Baiti"/>
-        <a:font script="Tibt" typeface="Microsoft Himalaya"/>
-        <a:font script="Thaa" typeface="MV Boli"/>
-        <a:font script="Deva" typeface="Mangal"/>
-        <a:font script="Telu" typeface="Gautami"/>
-        <a:font script="Taml" typeface="Latha"/>
-        <a:font script="Syrc" typeface="Estrangelo Edessa"/>
-        <a:font script="Orya" typeface="Kalinga"/>
-        <a:font script="Mlym" typeface="Kartika"/>
-        <a:font script="Laoo" typeface="DokChampa"/>
-        <a:font script="Sinh" typeface="Iskoola Pota"/>
-        <a:font script="Mong" typeface="Mongolian Baiti"/>
-        <a:font script="Viet" typeface="Times New Roman"/>
-        <a:font script="Uigh" typeface="Microsoft Uighur"/>
-        <a:font script="Geor" typeface="Sylfaen"/>
-        <a:font script="Armn" typeface="Arial"/>
-        <a:font script="Bugi" typeface="Leelawadee UI"/>
-        <a:font script="Bopo" typeface="Microsoft JhengHei"/>
-        <a:font script="Java" typeface="Javanese Text"/>
-        <a:font script="Lisu" typeface="Segoe UI"/>
-        <a:font script="Mymr" typeface="Myanmar Text"/>
-        <a:font script="Nkoo" typeface="Ebrima"/>
-        <a:font script="Olck" typeface="Nirmala UI"/>
-        <a:font script="Osma" typeface="Ebrima"/>
-        <a:font script="Phag" typeface="Phagspa"/>
-        <a:font script="Syrn" typeface="Estrangelo Edessa"/>
-        <a:font script="Syrj" typeface="Estrangelo Edessa"/>
-        <a:font script="Syre" typeface="Estrangelo Edessa"/>
-        <a:font script="Sora" typeface="Nirmala UI"/>
-        <a:font script="Tale" typeface="Microsoft Tai Le"/>
-        <a:font script="Talu" typeface="Microsoft New Tai Lue"/>
-        <a:font script="Tfng" typeface="Ebrima"/>
       </a:majorFont>
       <a:minorFont>
-        <a:latin typeface="Calibri" panose="020F0502020204030204"/>
+        <a:latin typeface="Walbaum Display"/>
         <a:ea typeface=""/>
         <a:cs typeface=""/>
-        <a:font script="Jpan" typeface="游ゴシック"/>
-        <a:font script="Hang" typeface="맑은 고딕"/>
-        <a:font script="Hans" typeface="等线"/>
-        <a:font script="Hant" typeface="新細明體"/>
-        <a:font script="Arab" typeface="Arial"/>
-        <a:font script="Hebr" typeface="Arial"/>
-        <a:font script="Thai" typeface="Cordia New"/>
-        <a:font script="Ethi" typeface="Nyala"/>
-        <a:font script="Beng" typeface="Vrinda"/>
-        <a:font script="Gujr" typeface="Shruti"/>
-        <a:font script="Khmr" typeface="DaunPenh"/>
-        <a:font script="Knda" typeface="Tunga"/>
-        <a:font script="Guru" typeface="Raavi"/>
-        <a:font script="Cans" typeface="Euphemia"/>
-        <a:font script="Cher" typeface="Plantagenet Cherokee"/>
-        <a:font script="Yiii" typeface="Microsoft Yi Baiti"/>
-        <a:font script="Tibt" typeface="Microsoft Himalaya"/>
-        <a:font script="Thaa" typeface="MV Boli"/>
-        <a:font script="Deva" typeface="Mangal"/>
-        <a:font script="Telu" typeface="Gautami"/>
-        <a:font script="Taml" typeface="Latha"/>
-        <a:font script="Syrc" typeface="Estrangelo Edessa"/>
-        <a:font script="Orya" typeface="Kalinga"/>
-        <a:font script="Mlym" typeface="Kartika"/>
-        <a:font script="Laoo" typeface="DokChampa"/>
-        <a:font script="Sinh" typeface="Iskoola Pota"/>
-        <a:font script="Mong" typeface="Mongolian Baiti"/>
-        <a:font script="Viet" typeface="Arial"/>
-        <a:font script="Uigh" typeface="Microsoft Uighur"/>
-        <a:font script="Geor" typeface="Sylfaen"/>
-        <a:font script="Armn" typeface="Arial"/>
-        <a:font script="Bugi" typeface="Leelawadee UI"/>
-        <a:font script="Bopo" typeface="Microsoft JhengHei"/>
-        <a:font script="Java" typeface="Javanese Text"/>
-        <a:font script="Lisu" typeface="Segoe UI"/>
-        <a:font script="Mymr" typeface="Myanmar Text"/>
-        <a:font script="Nkoo" typeface="Ebrima"/>
-        <a:font script="Olck" typeface="Nirmala UI"/>
-        <a:font script="Osma" typeface="Ebrima"/>
-        <a:font script="Phag" typeface="Phagspa"/>
-        <a:font script="Syrn" typeface="Estrangelo Edessa"/>
-        <a:font script="Syrj" typeface="Estrangelo Edessa"/>
-        <a:font script="Syre" typeface="Estrangelo Edessa"/>
-        <a:font script="Sora" typeface="Nirmala UI"/>
-        <a:font script="Tale" typeface="Microsoft Tai Le"/>
-        <a:font script="Talu" typeface="Microsoft New Tai Lue"/>
-        <a:font script="Tfng" typeface="Ebrima"/>
       </a:minorFont>
     </a:fontScheme>
     <a:fmtScheme name="Office">
@@ -3673,7 +4862,7 @@
   <a:extraClrSchemeLst/>
   <a:extLst>
     <a:ext uri="{05A4C25C-085E-4340-85A3-A5531E510DB2}">
-      <thm15:themeFamily xmlns:thm15="http://schemas.microsoft.com/office/thememl/2012/main" name="Office Theme" id="{62F939B6-93AF-4DB8-9C6B-D6C7DFDC589F}" vid="{4A3C46E8-61CC-4603-A589-7422A47A8E4A}"/>
+      <thm15:themeFamily xmlns:thm15="http://schemas.microsoft.com/office/thememl/2012/main" name="RegattaVTI" id="{FFC3BCE5-6357-41D1-8E67-3F85B69D7E86}" vid="{893A6374-FE17-48E5-8B62-678C1B11AA1B}"/>
     </a:ext>
   </a:extLst>
 </a:theme>

</xml_diff>

<commit_message>
Intro on recap on Fresnel Equations
</commit_message>
<xml_diff>
--- a/Presentations/Theory of Multilayer Films.pptx
+++ b/Presentations/Theory of Multilayer Films.pptx
@@ -6,8 +6,8 @@
   </p:sldMasterIdLst>
   <p:sldIdLst>
     <p:sldId id="256" r:id="rId2"/>
-    <p:sldId id="257" r:id="rId3"/>
-    <p:sldId id="258" r:id="rId4"/>
+    <p:sldId id="258" r:id="rId3"/>
+    <p:sldId id="257" r:id="rId4"/>
     <p:sldId id="259" r:id="rId5"/>
   </p:sldIdLst>
   <p:sldSz cx="12192000" cy="6858000"/>
@@ -3926,7 +3926,7 @@
         </p:blipFill>
         <p:spPr>
           <a:xfrm>
-            <a:off x="20" y="10"/>
+            <a:off x="20" y="226433"/>
             <a:ext cx="12191980" cy="6857990"/>
           </a:xfrm>
           <a:prstGeom prst="rect">
@@ -4369,11 +4369,14 @@
           </a:bodyPr>
           <a:lstStyle/>
           <a:p>
-            <a:endParaRPr lang="en-US">
-              <a:solidFill>
-                <a:srgbClr val="FFFFFF"/>
-              </a:solidFill>
-            </a:endParaRPr>
+            <a:r>
+              <a:rPr lang="en-US" dirty="0">
+                <a:solidFill>
+                  <a:srgbClr val="FFFFFF"/>
+                </a:solidFill>
+              </a:rPr>
+              <a:t>Multilayer films</a:t>
+            </a:r>
           </a:p>
         </p:txBody>
       </p:sp>
@@ -4406,11 +4409,14 @@
           <a:lstStyle/>
           <a:p>
             <a:pPr algn="r"/>
-            <a:endParaRPr lang="en-US">
-              <a:solidFill>
-                <a:srgbClr val="FFFFFF"/>
-              </a:solidFill>
-            </a:endParaRPr>
+            <a:r>
+              <a:rPr lang="en-US" dirty="0">
+                <a:solidFill>
+                  <a:srgbClr val="FFFFFF"/>
+                </a:solidFill>
+              </a:rPr>
+              <a:t>A quick dive into the theory</a:t>
+            </a:r>
           </a:p>
         </p:txBody>
       </p:sp>
@@ -4449,7 +4455,7 @@
           <p:cNvPr id="2" name="Title 1">
             <a:extLst>
               <a:ext uri="{FF2B5EF4-FFF2-40B4-BE49-F238E27FC236}">
-                <a16:creationId xmlns:a16="http://schemas.microsoft.com/office/drawing/2014/main" id="{9C511CE3-BE54-4C1B-57E0-1E0647B8E3BC}"/>
+                <a16:creationId xmlns:a16="http://schemas.microsoft.com/office/drawing/2014/main" id="{7B157CD5-3759-8117-DD64-6CFE82CD28BB}"/>
               </a:ext>
             </a:extLst>
           </p:cNvPr>
@@ -4460,44 +4466,400 @@
             <p:ph type="title"/>
           </p:nvPr>
         </p:nvSpPr>
-        <p:spPr/>
-        <p:txBody>
-          <a:bodyPr/>
-          <a:lstStyle/>
-          <a:p>
-            <a:endParaRPr lang="en-US"/>
-          </a:p>
-        </p:txBody>
-      </p:sp>
-      <p:sp>
-        <p:nvSpPr>
-          <p:cNvPr id="3" name="Content Placeholder 2">
-            <a:extLst>
-              <a:ext uri="{FF2B5EF4-FFF2-40B4-BE49-F238E27FC236}">
-                <a16:creationId xmlns:a16="http://schemas.microsoft.com/office/drawing/2014/main" id="{DB767829-3796-14D2-A6B2-76F322F3D4A4}"/>
-              </a:ext>
-            </a:extLst>
-          </p:cNvPr>
-          <p:cNvSpPr>
-            <a:spLocks noGrp="1"/>
-          </p:cNvSpPr>
-          <p:nvPr>
-            <p:ph idx="1"/>
-          </p:nvPr>
-        </p:nvSpPr>
-        <p:spPr/>
-        <p:txBody>
-          <a:bodyPr/>
-          <a:lstStyle/>
-          <a:p>
-            <a:endParaRPr lang="en-US"/>
-          </a:p>
-        </p:txBody>
-      </p:sp>
+        <p:spPr>
+          <a:xfrm>
+            <a:off x="210313" y="132271"/>
+            <a:ext cx="5623560" cy="617537"/>
+          </a:xfrm>
+        </p:spPr>
+        <p:txBody>
+          <a:bodyPr>
+            <a:normAutofit fontScale="90000"/>
+          </a:bodyPr>
+          <a:lstStyle/>
+          <a:p>
+            <a:r>
+              <a:rPr lang="en-US" dirty="0"/>
+              <a:t>Recap</a:t>
+            </a:r>
+          </a:p>
+        </p:txBody>
+      </p:sp>
+      <p:pic>
+        <p:nvPicPr>
+          <p:cNvPr id="4" name="Google Shape;73;p15">
+            <a:extLst>
+              <a:ext uri="{FF2B5EF4-FFF2-40B4-BE49-F238E27FC236}">
+                <a16:creationId xmlns:a16="http://schemas.microsoft.com/office/drawing/2014/main" id="{D4C83997-C25D-87F6-216A-01453055D194}"/>
+              </a:ext>
+            </a:extLst>
+          </p:cNvPr>
+          <p:cNvPicPr preferRelativeResize="0"/>
+          <p:nvPr/>
+        </p:nvPicPr>
+        <p:blipFill>
+          <a:blip r:embed="rId2">
+            <a:alphaModFix/>
+          </a:blip>
+          <a:stretch>
+            <a:fillRect/>
+          </a:stretch>
+        </p:blipFill>
+        <p:spPr>
+          <a:xfrm>
+            <a:off x="128016" y="749808"/>
+            <a:ext cx="4374742" cy="2869141"/>
+          </a:xfrm>
+          <a:prstGeom prst="rect">
+            <a:avLst/>
+          </a:prstGeom>
+          <a:noFill/>
+          <a:ln>
+            <a:noFill/>
+          </a:ln>
+        </p:spPr>
+      </p:pic>
+      <p:sp>
+        <p:nvSpPr>
+          <p:cNvPr id="5" name="TextBox 4">
+            <a:extLst>
+              <a:ext uri="{FF2B5EF4-FFF2-40B4-BE49-F238E27FC236}">
+                <a16:creationId xmlns:a16="http://schemas.microsoft.com/office/drawing/2014/main" id="{2306BB86-75A1-CDDE-21FC-5ED77DA06A27}"/>
+              </a:ext>
+            </a:extLst>
+          </p:cNvPr>
+          <p:cNvSpPr txBox="1"/>
+          <p:nvPr/>
+        </p:nvSpPr>
+        <p:spPr>
+          <a:xfrm>
+            <a:off x="4928616" y="941956"/>
+            <a:ext cx="3465576" cy="1754326"/>
+          </a:xfrm>
+          <a:prstGeom prst="rect">
+            <a:avLst/>
+          </a:prstGeom>
+          <a:noFill/>
+        </p:spPr>
+        <p:txBody>
+          <a:bodyPr wrap="square" rtlCol="0">
+            <a:spAutoFit/>
+          </a:bodyPr>
+          <a:lstStyle/>
+          <a:p>
+            <a:r>
+              <a:rPr lang="en-US" i="1" dirty="0"/>
+              <a:t>Question</a:t>
+            </a:r>
+            <a:r>
+              <a:rPr lang="en-US" dirty="0"/>
+              <a:t>: </a:t>
+            </a:r>
+            <a:r>
+              <a:rPr lang="en-US" b="0" i="0" u="none" strike="noStrike" dirty="0">
+                <a:solidFill>
+                  <a:srgbClr val="ECECF1"/>
+                </a:solidFill>
+                <a:effectLst/>
+                <a:latin typeface="Söhne"/>
+              </a:rPr>
+              <a:t>In a basic linearly polarized electromagnetic wave model, can we derive equations to quantify the reflection and transmission of the incident wave in terms of irradiance?</a:t>
+            </a:r>
+            <a:endParaRPr lang="en-US" dirty="0"/>
+          </a:p>
+        </p:txBody>
+      </p:sp>
+      <p:sp>
+        <p:nvSpPr>
+          <p:cNvPr id="6" name="TextBox 5">
+            <a:extLst>
+              <a:ext uri="{FF2B5EF4-FFF2-40B4-BE49-F238E27FC236}">
+                <a16:creationId xmlns:a16="http://schemas.microsoft.com/office/drawing/2014/main" id="{49960EF9-FF7A-FC16-B1BC-879CEC04A71E}"/>
+              </a:ext>
+            </a:extLst>
+          </p:cNvPr>
+          <p:cNvSpPr txBox="1"/>
+          <p:nvPr/>
+        </p:nvSpPr>
+        <p:spPr>
+          <a:xfrm>
+            <a:off x="4928616" y="2696282"/>
+            <a:ext cx="3465576" cy="369332"/>
+          </a:xfrm>
+          <a:prstGeom prst="rect">
+            <a:avLst/>
+          </a:prstGeom>
+          <a:noFill/>
+        </p:spPr>
+        <p:txBody>
+          <a:bodyPr wrap="square" rtlCol="0">
+            <a:spAutoFit/>
+          </a:bodyPr>
+          <a:lstStyle/>
+          <a:p>
+            <a:r>
+              <a:rPr lang="en-US" i="1" dirty="0"/>
+              <a:t>Answer: </a:t>
+            </a:r>
+            <a:r>
+              <a:rPr lang="en-US" dirty="0"/>
+              <a:t>The Fresnel Equations.</a:t>
+            </a:r>
+          </a:p>
+        </p:txBody>
+      </p:sp>
+      <p:pic>
+        <p:nvPicPr>
+          <p:cNvPr id="7" name="Google Shape;184;p27" title="[102,102,102,&quot;https://www.codecogs.com/eqnedit.php?latex=t_%7BTE%7D%3D%5Cfrac%7B2cos(%5Ctheta)%7D%7Bcos(%5Ctheta)%2B%5Csqrt%7Bn%5E2-sin%5E%7B2%7D(%5Ctheta)%7D%7D#0&quot;]">
+            <a:extLst>
+              <a:ext uri="{FF2B5EF4-FFF2-40B4-BE49-F238E27FC236}">
+                <a16:creationId xmlns:a16="http://schemas.microsoft.com/office/drawing/2014/main" id="{5CF10F2E-5419-9602-B4C7-6EAB91181698}"/>
+              </a:ext>
+            </a:extLst>
+          </p:cNvPr>
+          <p:cNvPicPr preferRelativeResize="0"/>
+          <p:nvPr/>
+        </p:nvPicPr>
+        <p:blipFill>
+          <a:blip r:embed="rId3">
+            <a:alphaModFix/>
+          </a:blip>
+          <a:stretch>
+            <a:fillRect/>
+          </a:stretch>
+        </p:blipFill>
+        <p:spPr>
+          <a:xfrm>
+            <a:off x="401754" y="3705725"/>
+            <a:ext cx="3827275" cy="759099"/>
+          </a:xfrm>
+          <a:prstGeom prst="rect">
+            <a:avLst/>
+          </a:prstGeom>
+          <a:gradFill>
+            <a:gsLst>
+              <a:gs pos="0">
+                <a:schemeClr val="accent1">
+                  <a:lumMod val="5000"/>
+                  <a:lumOff val="95000"/>
+                </a:schemeClr>
+              </a:gs>
+              <a:gs pos="74000">
+                <a:schemeClr val="accent1">
+                  <a:lumMod val="45000"/>
+                  <a:lumOff val="55000"/>
+                </a:schemeClr>
+              </a:gs>
+              <a:gs pos="83000">
+                <a:schemeClr val="accent1">
+                  <a:lumMod val="45000"/>
+                  <a:lumOff val="55000"/>
+                </a:schemeClr>
+              </a:gs>
+              <a:gs pos="100000">
+                <a:schemeClr val="accent1">
+                  <a:lumMod val="30000"/>
+                  <a:lumOff val="70000"/>
+                </a:schemeClr>
+              </a:gs>
+            </a:gsLst>
+            <a:lin ang="5400000" scaled="1"/>
+          </a:gradFill>
+          <a:ln>
+            <a:noFill/>
+          </a:ln>
+        </p:spPr>
+      </p:pic>
+      <p:pic>
+        <p:nvPicPr>
+          <p:cNvPr id="8" name="Google Shape;185;p27" title="[102,102,102,&quot;https://www.codecogs.com/eqnedit.php?latex=r_%7BTE%7D%3D%5Cfrac%7Bcos(%5Ctheta)-%5Csqrt%7Bn%5E2-sin%5E%7B2%7D(%5Ctheta)%7D%7D%7Bcos(%5Ctheta)%2B%5Csqrt%7Bn%5E2-sin%5E%7B2%7D(%5Ctheta)%7D%7D#0&quot;]">
+            <a:extLst>
+              <a:ext uri="{FF2B5EF4-FFF2-40B4-BE49-F238E27FC236}">
+                <a16:creationId xmlns:a16="http://schemas.microsoft.com/office/drawing/2014/main" id="{A6963755-7A2F-6A91-FF12-A3EE3327E2C8}"/>
+              </a:ext>
+            </a:extLst>
+          </p:cNvPr>
+          <p:cNvPicPr preferRelativeResize="0"/>
+          <p:nvPr/>
+        </p:nvPicPr>
+        <p:blipFill>
+          <a:blip r:embed="rId4">
+            <a:alphaModFix/>
+          </a:blip>
+          <a:stretch>
+            <a:fillRect/>
+          </a:stretch>
+        </p:blipFill>
+        <p:spPr>
+          <a:xfrm>
+            <a:off x="401744" y="4551601"/>
+            <a:ext cx="3827285" cy="801000"/>
+          </a:xfrm>
+          <a:prstGeom prst="rect">
+            <a:avLst/>
+          </a:prstGeom>
+          <a:gradFill>
+            <a:gsLst>
+              <a:gs pos="0">
+                <a:schemeClr val="accent1">
+                  <a:lumMod val="5000"/>
+                  <a:lumOff val="95000"/>
+                </a:schemeClr>
+              </a:gs>
+              <a:gs pos="74000">
+                <a:schemeClr val="accent1">
+                  <a:lumMod val="45000"/>
+                  <a:lumOff val="55000"/>
+                </a:schemeClr>
+              </a:gs>
+              <a:gs pos="83000">
+                <a:schemeClr val="accent1">
+                  <a:lumMod val="45000"/>
+                  <a:lumOff val="55000"/>
+                </a:schemeClr>
+              </a:gs>
+              <a:gs pos="100000">
+                <a:schemeClr val="accent1">
+                  <a:lumMod val="30000"/>
+                  <a:lumOff val="70000"/>
+                </a:schemeClr>
+              </a:gs>
+            </a:gsLst>
+            <a:lin ang="5400000" scaled="1"/>
+          </a:gradFill>
+          <a:ln>
+            <a:noFill/>
+          </a:ln>
+        </p:spPr>
+      </p:pic>
+      <p:pic>
+        <p:nvPicPr>
+          <p:cNvPr id="9" name="Google Shape;165;p25" title="[102,102,102,&quot;https://www.codecogs.com/eqnedit.php?latex=%5Ctext%7BReflectance%7D%3DR%3D%5Cfrac%7BP_r%7D%7BP_i%7D%3Dr%5E2%3D(%5Cfrac%7BE_r%7D%7BE%7D)%5E2#0&quot;]">
+            <a:extLst>
+              <a:ext uri="{FF2B5EF4-FFF2-40B4-BE49-F238E27FC236}">
+                <a16:creationId xmlns:a16="http://schemas.microsoft.com/office/drawing/2014/main" id="{EF9A2338-EA03-2C50-53FA-D8750157227B}"/>
+              </a:ext>
+            </a:extLst>
+          </p:cNvPr>
+          <p:cNvPicPr preferRelativeResize="0"/>
+          <p:nvPr/>
+        </p:nvPicPr>
+        <p:blipFill>
+          <a:blip r:embed="rId5">
+            <a:alphaModFix/>
+          </a:blip>
+          <a:stretch>
+            <a:fillRect/>
+          </a:stretch>
+        </p:blipFill>
+        <p:spPr>
+          <a:xfrm>
+            <a:off x="4638974" y="3065614"/>
+            <a:ext cx="5094700" cy="733225"/>
+          </a:xfrm>
+          <a:prstGeom prst="rect">
+            <a:avLst/>
+          </a:prstGeom>
+          <a:gradFill>
+            <a:gsLst>
+              <a:gs pos="0">
+                <a:schemeClr val="accent1">
+                  <a:lumMod val="5000"/>
+                  <a:lumOff val="95000"/>
+                </a:schemeClr>
+              </a:gs>
+              <a:gs pos="74000">
+                <a:schemeClr val="accent1">
+                  <a:lumMod val="45000"/>
+                  <a:lumOff val="55000"/>
+                </a:schemeClr>
+              </a:gs>
+              <a:gs pos="83000">
+                <a:schemeClr val="accent1">
+                  <a:lumMod val="45000"/>
+                  <a:lumOff val="55000"/>
+                </a:schemeClr>
+              </a:gs>
+              <a:gs pos="100000">
+                <a:schemeClr val="accent1">
+                  <a:lumMod val="30000"/>
+                  <a:lumOff val="70000"/>
+                </a:schemeClr>
+              </a:gs>
+            </a:gsLst>
+            <a:lin ang="5400000" scaled="1"/>
+          </a:gradFill>
+          <a:ln>
+            <a:noFill/>
+          </a:ln>
+        </p:spPr>
+      </p:pic>
+      <p:pic>
+        <p:nvPicPr>
+          <p:cNvPr id="10" name="Google Shape;166;p25" title="[0,0,0,&quot;https://www.codecogs.com/eqnedit.php?latex=%5Ctext%7BTransmittance%7D%3DT%3D%5Cfrac%7BP_t%7D%7BP_i%7D%3Dnt%5E2(%5Cfrac%7Bcos(%5Ctheta_t)%7D%7Bcos(%5Ctheta)%7D)#0&quot;]">
+            <a:extLst>
+              <a:ext uri="{FF2B5EF4-FFF2-40B4-BE49-F238E27FC236}">
+                <a16:creationId xmlns:a16="http://schemas.microsoft.com/office/drawing/2014/main" id="{1950BF0A-EABA-43FD-3884-3610ADB5FCF2}"/>
+              </a:ext>
+            </a:extLst>
+          </p:cNvPr>
+          <p:cNvPicPr preferRelativeResize="0"/>
+          <p:nvPr/>
+        </p:nvPicPr>
+        <p:blipFill>
+          <a:blip r:embed="rId6">
+            <a:alphaModFix/>
+          </a:blip>
+          <a:stretch>
+            <a:fillRect/>
+          </a:stretch>
+        </p:blipFill>
+        <p:spPr>
+          <a:xfrm>
+            <a:off x="4638974" y="3834144"/>
+            <a:ext cx="5263065" cy="733225"/>
+          </a:xfrm>
+          <a:prstGeom prst="rect">
+            <a:avLst/>
+          </a:prstGeom>
+          <a:gradFill>
+            <a:gsLst>
+              <a:gs pos="0">
+                <a:schemeClr val="accent1">
+                  <a:lumMod val="5000"/>
+                  <a:lumOff val="95000"/>
+                </a:schemeClr>
+              </a:gs>
+              <a:gs pos="74000">
+                <a:schemeClr val="accent1">
+                  <a:lumMod val="45000"/>
+                  <a:lumOff val="55000"/>
+                </a:schemeClr>
+              </a:gs>
+              <a:gs pos="83000">
+                <a:schemeClr val="accent1">
+                  <a:lumMod val="45000"/>
+                  <a:lumOff val="55000"/>
+                </a:schemeClr>
+              </a:gs>
+              <a:gs pos="100000">
+                <a:schemeClr val="accent1">
+                  <a:lumMod val="30000"/>
+                  <a:lumOff val="70000"/>
+                </a:schemeClr>
+              </a:gs>
+            </a:gsLst>
+            <a:lin ang="5400000" scaled="1"/>
+          </a:gradFill>
+          <a:ln>
+            <a:noFill/>
+          </a:ln>
+        </p:spPr>
+      </p:pic>
     </p:spTree>
     <p:extLst>
       <p:ext uri="{BB962C8B-B14F-4D97-AF65-F5344CB8AC3E}">
-        <p14:creationId xmlns:p14="http://schemas.microsoft.com/office/powerpoint/2010/main" val="3440257450"/>
+        <p14:creationId xmlns:p14="http://schemas.microsoft.com/office/powerpoint/2010/main" val="2191037891"/>
       </p:ext>
     </p:extLst>
   </p:cSld>
@@ -4529,7 +4891,7 @@
           <p:cNvPr id="2" name="Title 1">
             <a:extLst>
               <a:ext uri="{FF2B5EF4-FFF2-40B4-BE49-F238E27FC236}">
-                <a16:creationId xmlns:a16="http://schemas.microsoft.com/office/drawing/2014/main" id="{7B157CD5-3759-8117-DD64-6CFE82CD28BB}"/>
+                <a16:creationId xmlns:a16="http://schemas.microsoft.com/office/drawing/2014/main" id="{9C511CE3-BE54-4C1B-57E0-1E0647B8E3BC}"/>
               </a:ext>
             </a:extLst>
           </p:cNvPr>
@@ -4540,12 +4902,20 @@
             <p:ph type="title"/>
           </p:nvPr>
         </p:nvSpPr>
-        <p:spPr/>
+        <p:spPr>
+          <a:xfrm>
+            <a:off x="146304" y="104839"/>
+            <a:ext cx="9905999" cy="1360898"/>
+          </a:xfrm>
+        </p:spPr>
         <p:txBody>
           <a:bodyPr/>
           <a:lstStyle/>
           <a:p>
-            <a:endParaRPr lang="en-US"/>
+            <a:r>
+              <a:rPr lang="en-US" dirty="0"/>
+              <a:t>The Transfer Matrix</a:t>
+            </a:r>
           </a:p>
         </p:txBody>
       </p:sp>
@@ -4554,7 +4924,7 @@
           <p:cNvPr id="3" name="Content Placeholder 2">
             <a:extLst>
               <a:ext uri="{FF2B5EF4-FFF2-40B4-BE49-F238E27FC236}">
-                <a16:creationId xmlns:a16="http://schemas.microsoft.com/office/drawing/2014/main" id="{2624D0FB-92C6-2CF7-9C03-44CC2CE45311}"/>
+                <a16:creationId xmlns:a16="http://schemas.microsoft.com/office/drawing/2014/main" id="{DB767829-3796-14D2-A6B2-76F322F3D4A4}"/>
               </a:ext>
             </a:extLst>
           </p:cNvPr>
@@ -4565,19 +4935,24 @@
             <p:ph idx="1"/>
           </p:nvPr>
         </p:nvSpPr>
-        <p:spPr/>
+        <p:spPr>
+          <a:xfrm>
+            <a:off x="237744" y="1326186"/>
+            <a:ext cx="9905999" cy="3567118"/>
+          </a:xfrm>
+        </p:spPr>
         <p:txBody>
           <a:bodyPr/>
           <a:lstStyle/>
           <a:p>
-            <a:endParaRPr lang="en-US"/>
+            <a:endParaRPr lang="en-US" dirty="0"/>
           </a:p>
         </p:txBody>
       </p:sp>
     </p:spTree>
     <p:extLst>
       <p:ext uri="{BB962C8B-B14F-4D97-AF65-F5344CB8AC3E}">
-        <p14:creationId xmlns:p14="http://schemas.microsoft.com/office/powerpoint/2010/main" val="2191037891"/>
+        <p14:creationId xmlns:p14="http://schemas.microsoft.com/office/powerpoint/2010/main" val="3440257450"/>
       </p:ext>
     </p:extLst>
   </p:cSld>

</xml_diff>

<commit_message>
Final updates to the slides (saved it)
</commit_message>
<xml_diff>
--- a/Presentations/Theory of Multilayer Films.pptx
+++ b/Presentations/Theory of Multilayer Films.pptx
@@ -522,6 +522,90 @@
           <a:bodyPr/>
           <a:lstStyle/>
           <a:p>
+            <a:endParaRPr lang="en-US" dirty="0"/>
+          </a:p>
+        </p:txBody>
+      </p:sp>
+      <p:sp>
+        <p:nvSpPr>
+          <p:cNvPr id="4" name="Slide Number Placeholder 3"/>
+          <p:cNvSpPr>
+            <a:spLocks noGrp="1"/>
+          </p:cNvSpPr>
+          <p:nvPr>
+            <p:ph type="sldNum" sz="quarter" idx="5"/>
+          </p:nvPr>
+        </p:nvSpPr>
+        <p:spPr/>
+        <p:txBody>
+          <a:bodyPr/>
+          <a:lstStyle/>
+          <a:p>
+            <a:fld id="{B7282527-7E3C-F641-833E-7E42A729E93F}" type="slidenum">
+              <a:rPr lang="en-US" smtClean="0"/>
+              <a:t>1</a:t>
+            </a:fld>
+            <a:endParaRPr lang="en-US"/>
+          </a:p>
+        </p:txBody>
+      </p:sp>
+    </p:spTree>
+    <p:extLst>
+      <p:ext uri="{BB962C8B-B14F-4D97-AF65-F5344CB8AC3E}">
+        <p14:creationId xmlns:p14="http://schemas.microsoft.com/office/powerpoint/2010/main" val="3856028044"/>
+      </p:ext>
+    </p:extLst>
+  </p:cSld>
+  <p:clrMapOvr>
+    <a:masterClrMapping/>
+  </p:clrMapOvr>
+</p:notes>
+</file>
+
+<file path=ppt/notesSlides/notesSlide2.xml><?xml version="1.0" encoding="utf-8"?>
+<p:notes xmlns:a="http://schemas.openxmlformats.org/drawingml/2006/main" xmlns:r="http://schemas.openxmlformats.org/officeDocument/2006/relationships" xmlns:p="http://schemas.openxmlformats.org/presentationml/2006/main">
+  <p:cSld>
+    <p:spTree>
+      <p:nvGrpSpPr>
+        <p:cNvPr id="1" name=""/>
+        <p:cNvGrpSpPr/>
+        <p:nvPr/>
+      </p:nvGrpSpPr>
+      <p:grpSpPr>
+        <a:xfrm>
+          <a:off x="0" y="0"/>
+          <a:ext cx="0" cy="0"/>
+          <a:chOff x="0" y="0"/>
+          <a:chExt cx="0" cy="0"/>
+        </a:xfrm>
+      </p:grpSpPr>
+      <p:sp>
+        <p:nvSpPr>
+          <p:cNvPr id="2" name="Slide Image Placeholder 1"/>
+          <p:cNvSpPr>
+            <a:spLocks noGrp="1" noRot="1" noChangeAspect="1"/>
+          </p:cNvSpPr>
+          <p:nvPr>
+            <p:ph type="sldImg"/>
+          </p:nvPr>
+        </p:nvSpPr>
+        <p:spPr/>
+      </p:sp>
+      <p:sp>
+        <p:nvSpPr>
+          <p:cNvPr id="3" name="Notes Placeholder 2"/>
+          <p:cNvSpPr>
+            <a:spLocks noGrp="1"/>
+          </p:cNvSpPr>
+          <p:nvPr>
+            <p:ph type="body" idx="1"/>
+          </p:nvPr>
+        </p:nvSpPr>
+        <p:spPr/>
+        <p:txBody>
+          <a:bodyPr/>
+          <a:lstStyle/>
+          <a:p>
             <a:r>
               <a:rPr lang="en-US" dirty="0"/>
               <a:t>The beam undergoes external reflection at the interface (a) and internal reflection at the interface (b).</a:t>
@@ -778,7 +862,7 @@
 </p:notes>
 </file>
 
-<file path=ppt/notesSlides/notesSlide2.xml><?xml version="1.0" encoding="utf-8"?>
+<file path=ppt/notesSlides/notesSlide3.xml><?xml version="1.0" encoding="utf-8"?>
 <p:notes xmlns:a="http://schemas.openxmlformats.org/drawingml/2006/main" xmlns:r="http://schemas.openxmlformats.org/officeDocument/2006/relationships" xmlns:p="http://schemas.openxmlformats.org/presentationml/2006/main">
   <p:cSld>
     <p:spTree>
@@ -4667,7 +4751,7 @@
           <p:nvPr/>
         </p:nvPicPr>
         <p:blipFill rotWithShape="1">
-          <a:blip r:embed="rId2"/>
+          <a:blip r:embed="rId3"/>
           <a:srcRect t="10016" b="5715"/>
           <a:stretch/>
         </p:blipFill>

</xml_diff>

<commit_message>
Adding explanations to open questions (see descr.)
One of the questions I am supposed to answer is to explain the significance of the length of the film (t) being of quarter- and half-wavelength. I am still trying to figure that out.
</commit_message>
<xml_diff>
--- a/Presentations/Theory of Multilayer Films.pptx
+++ b/Presentations/Theory of Multilayer Films.pptx
@@ -5,7 +5,7 @@
     <p:sldMasterId id="2147483686" r:id="rId1"/>
   </p:sldMasterIdLst>
   <p:notesMasterIdLst>
-    <p:notesMasterId r:id="rId17"/>
+    <p:notesMasterId r:id="rId18"/>
   </p:notesMasterIdLst>
   <p:sldIdLst>
     <p:sldId id="256" r:id="rId2"/>
@@ -23,6 +23,7 @@
     <p:sldId id="269" r:id="rId14"/>
     <p:sldId id="268" r:id="rId15"/>
     <p:sldId id="270" r:id="rId16"/>
+    <p:sldId id="271" r:id="rId17"/>
   </p:sldIdLst>
   <p:sldSz cx="12192000" cy="6858000"/>
   <p:notesSz cx="6858000" cy="9144000"/>
@@ -211,7 +212,7 @@
           <a:p>
             <a:fld id="{7FB3EA98-8477-194B-8967-49C01E1CEE95}" type="datetimeFigureOut">
               <a:rPr lang="en-US" smtClean="0"/>
-              <a:t>11/20/23</a:t>
+              <a:t>11/27/23</a:t>
             </a:fld>
             <a:endParaRPr lang="en-US"/>
           </a:p>
@@ -1294,7 +1295,7 @@
           <a:p>
             <a:fld id="{3CADBD16-5BFB-4D9F-9646-C75D1B53BBB6}" type="datetimeFigureOut">
               <a:rPr lang="en-US" smtClean="0"/>
-              <a:t>11/20/23</a:t>
+              <a:t>11/27/23</a:t>
             </a:fld>
             <a:endParaRPr lang="en-US"/>
           </a:p>
@@ -1535,7 +1536,7 @@
           <a:p>
             <a:fld id="{3CADBD16-5BFB-4D9F-9646-C75D1B53BBB6}" type="datetimeFigureOut">
               <a:rPr lang="en-US" smtClean="0"/>
-              <a:t>11/20/23</a:t>
+              <a:t>11/27/23</a:t>
             </a:fld>
             <a:endParaRPr lang="en-US"/>
           </a:p>
@@ -1743,7 +1744,7 @@
           <a:p>
             <a:fld id="{3CADBD16-5BFB-4D9F-9646-C75D1B53BBB6}" type="datetimeFigureOut">
               <a:rPr lang="en-US" smtClean="0"/>
-              <a:t>11/20/23</a:t>
+              <a:t>11/27/23</a:t>
             </a:fld>
             <a:endParaRPr lang="en-US"/>
           </a:p>
@@ -1941,7 +1942,7 @@
           <a:p>
             <a:fld id="{3CADBD16-5BFB-4D9F-9646-C75D1B53BBB6}" type="datetimeFigureOut">
               <a:rPr lang="en-US" smtClean="0"/>
-              <a:t>11/20/23</a:t>
+              <a:t>11/27/23</a:t>
             </a:fld>
             <a:endParaRPr lang="en-US"/>
           </a:p>
@@ -2218,7 +2219,7 @@
           <a:p>
             <a:fld id="{3CADBD16-5BFB-4D9F-9646-C75D1B53BBB6}" type="datetimeFigureOut">
               <a:rPr lang="en-US" smtClean="0"/>
-              <a:t>11/20/23</a:t>
+              <a:t>11/27/23</a:t>
             </a:fld>
             <a:endParaRPr lang="en-US"/>
           </a:p>
@@ -2483,7 +2484,7 @@
           <a:p>
             <a:fld id="{3CADBD16-5BFB-4D9F-9646-C75D1B53BBB6}" type="datetimeFigureOut">
               <a:rPr lang="en-US" smtClean="0"/>
-              <a:t>11/20/23</a:t>
+              <a:t>11/27/23</a:t>
             </a:fld>
             <a:endParaRPr lang="en-US"/>
           </a:p>
@@ -2899,7 +2900,7 @@
           <a:p>
             <a:fld id="{3CADBD16-5BFB-4D9F-9646-C75D1B53BBB6}" type="datetimeFigureOut">
               <a:rPr lang="en-US" smtClean="0"/>
-              <a:t>11/20/23</a:t>
+              <a:t>11/27/23</a:t>
             </a:fld>
             <a:endParaRPr lang="en-US"/>
           </a:p>
@@ -3049,7 +3050,7 @@
           <a:p>
             <a:fld id="{3CADBD16-5BFB-4D9F-9646-C75D1B53BBB6}" type="datetimeFigureOut">
               <a:rPr lang="en-US" smtClean="0"/>
-              <a:t>11/20/23</a:t>
+              <a:t>11/27/23</a:t>
             </a:fld>
             <a:endParaRPr lang="en-US"/>
           </a:p>
@@ -3162,7 +3163,7 @@
           <a:p>
             <a:fld id="{3CADBD16-5BFB-4D9F-9646-C75D1B53BBB6}" type="datetimeFigureOut">
               <a:rPr lang="en-US" smtClean="0"/>
-              <a:t>11/20/23</a:t>
+              <a:t>11/27/23</a:t>
             </a:fld>
             <a:endParaRPr lang="en-US"/>
           </a:p>
@@ -3478,7 +3479,7 @@
           <a:p>
             <a:fld id="{3CADBD16-5BFB-4D9F-9646-C75D1B53BBB6}" type="datetimeFigureOut">
               <a:rPr lang="en-US" smtClean="0"/>
-              <a:t>11/20/23</a:t>
+              <a:t>11/27/23</a:t>
             </a:fld>
             <a:endParaRPr lang="en-US"/>
           </a:p>
@@ -3729,7 +3730,7 @@
           <a:p>
             <a:fld id="{3CADBD16-5BFB-4D9F-9646-C75D1B53BBB6}" type="datetimeFigureOut">
               <a:rPr lang="en-US" smtClean="0"/>
-              <a:t>11/20/23</a:t>
+              <a:t>11/27/23</a:t>
             </a:fld>
             <a:endParaRPr lang="en-US"/>
           </a:p>
@@ -4238,7 +4239,7 @@
             <a:fld id="{3CADBD16-5BFB-4D9F-9646-C75D1B53BBB6}" type="datetimeFigureOut">
               <a:rPr lang="en-US" smtClean="0"/>
               <a:pPr/>
-              <a:t>11/20/23</a:t>
+              <a:t>11/27/23</a:t>
             </a:fld>
             <a:endParaRPr lang="en-US" dirty="0"/>
           </a:p>
@@ -7652,6 +7653,347 @@
   <p:clrMapOvr>
     <a:masterClrMapping/>
   </p:clrMapOvr>
+</p:sld>
+</file>
+
+<file path=ppt/slides/slide16.xml><?xml version="1.0" encoding="utf-8"?>
+<p:sld xmlns:a="http://schemas.openxmlformats.org/drawingml/2006/main" xmlns:r="http://schemas.openxmlformats.org/officeDocument/2006/relationships" xmlns:p="http://schemas.openxmlformats.org/presentationml/2006/main">
+  <p:cSld>
+    <p:spTree>
+      <p:nvGrpSpPr>
+        <p:cNvPr id="1" name=""/>
+        <p:cNvGrpSpPr/>
+        <p:nvPr/>
+      </p:nvGrpSpPr>
+      <p:grpSpPr>
+        <a:xfrm>
+          <a:off x="0" y="0"/>
+          <a:ext cx="0" cy="0"/>
+          <a:chOff x="0" y="0"/>
+          <a:chExt cx="0" cy="0"/>
+        </a:xfrm>
+      </p:grpSpPr>
+      <p:sp>
+        <p:nvSpPr>
+          <p:cNvPr id="2" name="Title 1">
+            <a:extLst>
+              <a:ext uri="{FF2B5EF4-FFF2-40B4-BE49-F238E27FC236}">
+                <a16:creationId xmlns:a16="http://schemas.microsoft.com/office/drawing/2014/main" id="{49892F61-C312-8D7D-8072-642E58908E04}"/>
+              </a:ext>
+            </a:extLst>
+          </p:cNvPr>
+          <p:cNvSpPr>
+            <a:spLocks noGrp="1"/>
+          </p:cNvSpPr>
+          <p:nvPr>
+            <p:ph type="title"/>
+          </p:nvPr>
+        </p:nvSpPr>
+        <p:spPr>
+          <a:xfrm>
+            <a:off x="0" y="0"/>
+            <a:ext cx="8138083" cy="782484"/>
+          </a:xfrm>
+        </p:spPr>
+        <p:txBody>
+          <a:bodyPr/>
+          <a:lstStyle/>
+          <a:p>
+            <a:r>
+              <a:rPr lang="en-US" dirty="0"/>
+              <a:t>Additional Stuff</a:t>
+            </a:r>
+          </a:p>
+        </p:txBody>
+      </p:sp>
+      <p:pic>
+        <p:nvPicPr>
+          <p:cNvPr id="4" name="Picture 3">
+            <a:extLst>
+              <a:ext uri="{FF2B5EF4-FFF2-40B4-BE49-F238E27FC236}">
+                <a16:creationId xmlns:a16="http://schemas.microsoft.com/office/drawing/2014/main" id="{0427E1A6-3057-AB66-457C-237857B4E168}"/>
+              </a:ext>
+            </a:extLst>
+          </p:cNvPr>
+          <p:cNvPicPr>
+            <a:picLocks noChangeAspect="1"/>
+          </p:cNvPicPr>
+          <p:nvPr/>
+        </p:nvPicPr>
+        <p:blipFill>
+          <a:blip r:embed="rId2"/>
+          <a:stretch>
+            <a:fillRect/>
+          </a:stretch>
+        </p:blipFill>
+        <p:spPr>
+          <a:xfrm>
+            <a:off x="98854" y="945292"/>
+            <a:ext cx="6314853" cy="4967416"/>
+          </a:xfrm>
+          <a:prstGeom prst="rect">
+            <a:avLst/>
+          </a:prstGeom>
+        </p:spPr>
+      </p:pic>
+      <p:sp>
+        <p:nvSpPr>
+          <p:cNvPr id="5" name="TextBox 4">
+            <a:extLst>
+              <a:ext uri="{FF2B5EF4-FFF2-40B4-BE49-F238E27FC236}">
+                <a16:creationId xmlns:a16="http://schemas.microsoft.com/office/drawing/2014/main" id="{8C0DDCCE-F493-43BD-53D0-76C10A6E2384}"/>
+              </a:ext>
+            </a:extLst>
+          </p:cNvPr>
+          <p:cNvSpPr txBox="1"/>
+          <p:nvPr/>
+        </p:nvSpPr>
+        <p:spPr>
+          <a:xfrm>
+            <a:off x="6581130" y="3097371"/>
+            <a:ext cx="3113903" cy="1477328"/>
+          </a:xfrm>
+          <a:prstGeom prst="rect">
+            <a:avLst/>
+          </a:prstGeom>
+          <a:noFill/>
+        </p:spPr>
+        <p:txBody>
+          <a:bodyPr wrap="square" rtlCol="0">
+            <a:spAutoFit/>
+          </a:bodyPr>
+          <a:lstStyle/>
+          <a:p>
+            <a:r>
+              <a:rPr lang="en-US" dirty="0"/>
+              <a:t>The magnitude of the film index determines whether the reflectance is enhanced or reduced from that of uncoated glass.</a:t>
+            </a:r>
+          </a:p>
+        </p:txBody>
+      </p:sp>
+      <p:sp>
+        <p:nvSpPr>
+          <p:cNvPr id="6" name="TextBox 5">
+            <a:extLst>
+              <a:ext uri="{FF2B5EF4-FFF2-40B4-BE49-F238E27FC236}">
+                <a16:creationId xmlns:a16="http://schemas.microsoft.com/office/drawing/2014/main" id="{1A70F64E-1E5B-818E-EC91-4A3CA40EED1A}"/>
+              </a:ext>
+            </a:extLst>
+          </p:cNvPr>
+          <p:cNvSpPr txBox="1"/>
+          <p:nvPr/>
+        </p:nvSpPr>
+        <p:spPr>
+          <a:xfrm>
+            <a:off x="6581131" y="4695511"/>
+            <a:ext cx="3113903" cy="1477328"/>
+          </a:xfrm>
+          <a:prstGeom prst="rect">
+            <a:avLst/>
+          </a:prstGeom>
+          <a:noFill/>
+        </p:spPr>
+        <p:txBody>
+          <a:bodyPr wrap="square" rtlCol="0">
+            <a:spAutoFit/>
+          </a:bodyPr>
+          <a:lstStyle/>
+          <a:p>
+            <a:r>
+              <a:rPr lang="en-US" dirty="0"/>
+              <a:t>Quarter-wave thicknesses of odd multiples thereof lead to either optimum enhancement or maximum reduction in reflectance.</a:t>
+            </a:r>
+          </a:p>
+        </p:txBody>
+      </p:sp>
+      <p:sp>
+        <p:nvSpPr>
+          <p:cNvPr id="7" name="TextBox 6">
+            <a:extLst>
+              <a:ext uri="{FF2B5EF4-FFF2-40B4-BE49-F238E27FC236}">
+                <a16:creationId xmlns:a16="http://schemas.microsoft.com/office/drawing/2014/main" id="{6C178D49-CC6E-4011-5EE3-FBC6C3563ED7}"/>
+              </a:ext>
+            </a:extLst>
+          </p:cNvPr>
+          <p:cNvSpPr txBox="1"/>
+          <p:nvPr/>
+        </p:nvSpPr>
+        <p:spPr>
+          <a:xfrm>
+            <a:off x="6581130" y="391241"/>
+            <a:ext cx="2266308" cy="2308324"/>
+          </a:xfrm>
+          <a:prstGeom prst="rect">
+            <a:avLst/>
+          </a:prstGeom>
+          <a:noFill/>
+        </p:spPr>
+        <p:txBody>
+          <a:bodyPr wrap="square" rtlCol="0">
+            <a:spAutoFit/>
+          </a:bodyPr>
+          <a:lstStyle/>
+          <a:p>
+            <a:r>
+              <a:rPr lang="en-US" dirty="0"/>
+              <a:t>X-axis: path difference (n_1*t)/(lambda) where lambda=lambda_0/n_1 being the wavelength in the film.</a:t>
+            </a:r>
+          </a:p>
+        </p:txBody>
+      </p:sp>
+      <p:pic>
+        <p:nvPicPr>
+          <p:cNvPr id="8" name="Picture 7">
+            <a:extLst>
+              <a:ext uri="{FF2B5EF4-FFF2-40B4-BE49-F238E27FC236}">
+                <a16:creationId xmlns:a16="http://schemas.microsoft.com/office/drawing/2014/main" id="{DA895A15-7B95-C196-7EB6-A75D2C8C5750}"/>
+              </a:ext>
+            </a:extLst>
+          </p:cNvPr>
+          <p:cNvPicPr>
+            <a:picLocks noChangeAspect="1"/>
+          </p:cNvPicPr>
+          <p:nvPr/>
+        </p:nvPicPr>
+        <p:blipFill>
+          <a:blip r:embed="rId3"/>
+          <a:stretch>
+            <a:fillRect/>
+          </a:stretch>
+        </p:blipFill>
+        <p:spPr>
+          <a:xfrm>
+            <a:off x="9019882" y="290997"/>
+            <a:ext cx="2649756" cy="491487"/>
+          </a:xfrm>
+          <a:prstGeom prst="rect">
+            <a:avLst/>
+          </a:prstGeom>
+        </p:spPr>
+      </p:pic>
+      <p:sp>
+        <p:nvSpPr>
+          <p:cNvPr id="9" name="TextBox 8">
+            <a:extLst>
+              <a:ext uri="{FF2B5EF4-FFF2-40B4-BE49-F238E27FC236}">
+                <a16:creationId xmlns:a16="http://schemas.microsoft.com/office/drawing/2014/main" id="{0300A668-BE4B-43F4-3120-2ACE320596DD}"/>
+              </a:ext>
+            </a:extLst>
+          </p:cNvPr>
+          <p:cNvSpPr txBox="1"/>
+          <p:nvPr/>
+        </p:nvSpPr>
+        <p:spPr>
+          <a:xfrm>
+            <a:off x="8979243" y="1180290"/>
+            <a:ext cx="3113903" cy="1200329"/>
+          </a:xfrm>
+          <a:prstGeom prst="rect">
+            <a:avLst/>
+          </a:prstGeom>
+          <a:noFill/>
+        </p:spPr>
+        <p:txBody>
+          <a:bodyPr wrap="square" rtlCol="0">
+            <a:spAutoFit/>
+          </a:bodyPr>
+          <a:lstStyle/>
+          <a:p>
+            <a:r>
+              <a:rPr lang="en-US" dirty="0"/>
+              <a:t>These minima can be made to occur at different wavelengths by changing delta_1.</a:t>
+            </a:r>
+          </a:p>
+        </p:txBody>
+      </p:sp>
+    </p:spTree>
+    <p:extLst>
+      <p:ext uri="{BB962C8B-B14F-4D97-AF65-F5344CB8AC3E}">
+        <p14:creationId xmlns:p14="http://schemas.microsoft.com/office/powerpoint/2010/main" val="2575612724"/>
+      </p:ext>
+    </p:extLst>
+  </p:cSld>
+  <p:clrMapOvr>
+    <a:masterClrMapping/>
+  </p:clrMapOvr>
+  <p:timing>
+    <p:tnLst>
+      <p:par>
+        <p:cTn id="1" dur="indefinite" restart="never" nodeType="tmRoot">
+          <p:childTnLst>
+            <p:seq concurrent="1" nextAc="seek">
+              <p:cTn id="2" dur="indefinite" nodeType="mainSeq">
+                <p:childTnLst>
+                  <p:par>
+                    <p:cTn id="3" fill="hold">
+                      <p:stCondLst>
+                        <p:cond delay="indefinite"/>
+                        <p:cond evt="onBegin" delay="0">
+                          <p:tn val="2"/>
+                        </p:cond>
+                      </p:stCondLst>
+                      <p:childTnLst>
+                        <p:par>
+                          <p:cTn id="4" fill="hold">
+                            <p:stCondLst>
+                              <p:cond delay="0"/>
+                            </p:stCondLst>
+                            <p:childTnLst>
+                              <p:par>
+                                <p:cTn id="5" presetID="1" presetClass="entr" presetSubtype="0" fill="hold" nodeType="withEffect">
+                                  <p:stCondLst>
+                                    <p:cond delay="0"/>
+                                  </p:stCondLst>
+                                  <p:childTnLst>
+                                    <p:set>
+                                      <p:cBhvr>
+                                        <p:cTn id="6" dur="1" fill="hold">
+                                          <p:stCondLst>
+                                            <p:cond delay="0"/>
+                                          </p:stCondLst>
+                                        </p:cTn>
+                                        <p:tgtEl>
+                                          <p:spTgt spid="8"/>
+                                        </p:tgtEl>
+                                        <p:attrNameLst>
+                                          <p:attrName>style.visibility</p:attrName>
+                                        </p:attrNameLst>
+                                      </p:cBhvr>
+                                      <p:to>
+                                        <p:strVal val="visible"/>
+                                      </p:to>
+                                    </p:set>
+                                  </p:childTnLst>
+                                </p:cTn>
+                              </p:par>
+                            </p:childTnLst>
+                          </p:cTn>
+                        </p:par>
+                      </p:childTnLst>
+                    </p:cTn>
+                  </p:par>
+                </p:childTnLst>
+              </p:cTn>
+              <p:prevCondLst>
+                <p:cond evt="onPrev" delay="0">
+                  <p:tgtEl>
+                    <p:sldTgt/>
+                  </p:tgtEl>
+                </p:cond>
+              </p:prevCondLst>
+              <p:nextCondLst>
+                <p:cond evt="onNext" delay="0">
+                  <p:tgtEl>
+                    <p:sldTgt/>
+                  </p:tgtEl>
+                </p:cond>
+              </p:nextCondLst>
+            </p:seq>
+          </p:childTnLst>
+        </p:cTn>
+      </p:par>
+    </p:tnLst>
+  </p:timing>
 </p:sld>
 </file>
 

</xml_diff>

<commit_message>
Added appendix to slides to explain more stuff
</commit_message>
<xml_diff>
--- a/Presentations/Theory of Multilayer Films.pptx
+++ b/Presentations/Theory of Multilayer Films.pptx
@@ -212,7 +212,7 @@
           <a:p>
             <a:fld id="{7FB3EA98-8477-194B-8967-49C01E1CEE95}" type="datetimeFigureOut">
               <a:rPr lang="en-US" smtClean="0"/>
-              <a:t>11/27/23</a:t>
+              <a:t>11/30/23</a:t>
             </a:fld>
             <a:endParaRPr lang="en-US"/>
           </a:p>
@@ -938,6 +938,90 @@
     <p:extLst>
       <p:ext uri="{BB962C8B-B14F-4D97-AF65-F5344CB8AC3E}">
         <p14:creationId xmlns:p14="http://schemas.microsoft.com/office/powerpoint/2010/main" val="2185516395"/>
+      </p:ext>
+    </p:extLst>
+  </p:cSld>
+  <p:clrMapOvr>
+    <a:masterClrMapping/>
+  </p:clrMapOvr>
+</p:notes>
+</file>
+
+<file path=ppt/notesSlides/notesSlide4.xml><?xml version="1.0" encoding="utf-8"?>
+<p:notes xmlns:a="http://schemas.openxmlformats.org/drawingml/2006/main" xmlns:r="http://schemas.openxmlformats.org/officeDocument/2006/relationships" xmlns:p="http://schemas.openxmlformats.org/presentationml/2006/main">
+  <p:cSld>
+    <p:spTree>
+      <p:nvGrpSpPr>
+        <p:cNvPr id="1" name=""/>
+        <p:cNvGrpSpPr/>
+        <p:nvPr/>
+      </p:nvGrpSpPr>
+      <p:grpSpPr>
+        <a:xfrm>
+          <a:off x="0" y="0"/>
+          <a:ext cx="0" cy="0"/>
+          <a:chOff x="0" y="0"/>
+          <a:chExt cx="0" cy="0"/>
+        </a:xfrm>
+      </p:grpSpPr>
+      <p:sp>
+        <p:nvSpPr>
+          <p:cNvPr id="2" name="Slide Image Placeholder 1"/>
+          <p:cNvSpPr>
+            <a:spLocks noGrp="1" noRot="1" noChangeAspect="1"/>
+          </p:cNvSpPr>
+          <p:nvPr>
+            <p:ph type="sldImg"/>
+          </p:nvPr>
+        </p:nvSpPr>
+        <p:spPr/>
+      </p:sp>
+      <p:sp>
+        <p:nvSpPr>
+          <p:cNvPr id="3" name="Notes Placeholder 2"/>
+          <p:cNvSpPr>
+            <a:spLocks noGrp="1"/>
+          </p:cNvSpPr>
+          <p:nvPr>
+            <p:ph type="body" idx="1"/>
+          </p:nvPr>
+        </p:nvSpPr>
+        <p:spPr/>
+        <p:txBody>
+          <a:bodyPr/>
+          <a:lstStyle/>
+          <a:p>
+            <a:endParaRPr lang="en-US" dirty="0"/>
+          </a:p>
+        </p:txBody>
+      </p:sp>
+      <p:sp>
+        <p:nvSpPr>
+          <p:cNvPr id="4" name="Slide Number Placeholder 3"/>
+          <p:cNvSpPr>
+            <a:spLocks noGrp="1"/>
+          </p:cNvSpPr>
+          <p:nvPr>
+            <p:ph type="sldNum" sz="quarter" idx="5"/>
+          </p:nvPr>
+        </p:nvSpPr>
+        <p:spPr/>
+        <p:txBody>
+          <a:bodyPr/>
+          <a:lstStyle/>
+          <a:p>
+            <a:fld id="{B7282527-7E3C-F641-833E-7E42A729E93F}" type="slidenum">
+              <a:rPr lang="en-US" smtClean="0"/>
+              <a:t>16</a:t>
+            </a:fld>
+            <a:endParaRPr lang="en-US"/>
+          </a:p>
+        </p:txBody>
+      </p:sp>
+    </p:spTree>
+    <p:extLst>
+      <p:ext uri="{BB962C8B-B14F-4D97-AF65-F5344CB8AC3E}">
+        <p14:creationId xmlns:p14="http://schemas.microsoft.com/office/powerpoint/2010/main" val="932191634"/>
       </p:ext>
     </p:extLst>
   </p:cSld>
@@ -1295,7 +1379,7 @@
           <a:p>
             <a:fld id="{3CADBD16-5BFB-4D9F-9646-C75D1B53BBB6}" type="datetimeFigureOut">
               <a:rPr lang="en-US" smtClean="0"/>
-              <a:t>11/27/23</a:t>
+              <a:t>11/30/23</a:t>
             </a:fld>
             <a:endParaRPr lang="en-US"/>
           </a:p>
@@ -1536,7 +1620,7 @@
           <a:p>
             <a:fld id="{3CADBD16-5BFB-4D9F-9646-C75D1B53BBB6}" type="datetimeFigureOut">
               <a:rPr lang="en-US" smtClean="0"/>
-              <a:t>11/27/23</a:t>
+              <a:t>11/30/23</a:t>
             </a:fld>
             <a:endParaRPr lang="en-US"/>
           </a:p>
@@ -1744,7 +1828,7 @@
           <a:p>
             <a:fld id="{3CADBD16-5BFB-4D9F-9646-C75D1B53BBB6}" type="datetimeFigureOut">
               <a:rPr lang="en-US" smtClean="0"/>
-              <a:t>11/27/23</a:t>
+              <a:t>11/30/23</a:t>
             </a:fld>
             <a:endParaRPr lang="en-US"/>
           </a:p>
@@ -1942,7 +2026,7 @@
           <a:p>
             <a:fld id="{3CADBD16-5BFB-4D9F-9646-C75D1B53BBB6}" type="datetimeFigureOut">
               <a:rPr lang="en-US" smtClean="0"/>
-              <a:t>11/27/23</a:t>
+              <a:t>11/30/23</a:t>
             </a:fld>
             <a:endParaRPr lang="en-US"/>
           </a:p>
@@ -2219,7 +2303,7 @@
           <a:p>
             <a:fld id="{3CADBD16-5BFB-4D9F-9646-C75D1B53BBB6}" type="datetimeFigureOut">
               <a:rPr lang="en-US" smtClean="0"/>
-              <a:t>11/27/23</a:t>
+              <a:t>11/30/23</a:t>
             </a:fld>
             <a:endParaRPr lang="en-US"/>
           </a:p>
@@ -2484,7 +2568,7 @@
           <a:p>
             <a:fld id="{3CADBD16-5BFB-4D9F-9646-C75D1B53BBB6}" type="datetimeFigureOut">
               <a:rPr lang="en-US" smtClean="0"/>
-              <a:t>11/27/23</a:t>
+              <a:t>11/30/23</a:t>
             </a:fld>
             <a:endParaRPr lang="en-US"/>
           </a:p>
@@ -2900,7 +2984,7 @@
           <a:p>
             <a:fld id="{3CADBD16-5BFB-4D9F-9646-C75D1B53BBB6}" type="datetimeFigureOut">
               <a:rPr lang="en-US" smtClean="0"/>
-              <a:t>11/27/23</a:t>
+              <a:t>11/30/23</a:t>
             </a:fld>
             <a:endParaRPr lang="en-US"/>
           </a:p>
@@ -3050,7 +3134,7 @@
           <a:p>
             <a:fld id="{3CADBD16-5BFB-4D9F-9646-C75D1B53BBB6}" type="datetimeFigureOut">
               <a:rPr lang="en-US" smtClean="0"/>
-              <a:t>11/27/23</a:t>
+              <a:t>11/30/23</a:t>
             </a:fld>
             <a:endParaRPr lang="en-US"/>
           </a:p>
@@ -3163,7 +3247,7 @@
           <a:p>
             <a:fld id="{3CADBD16-5BFB-4D9F-9646-C75D1B53BBB6}" type="datetimeFigureOut">
               <a:rPr lang="en-US" smtClean="0"/>
-              <a:t>11/27/23</a:t>
+              <a:t>11/30/23</a:t>
             </a:fld>
             <a:endParaRPr lang="en-US"/>
           </a:p>
@@ -3479,7 +3563,7 @@
           <a:p>
             <a:fld id="{3CADBD16-5BFB-4D9F-9646-C75D1B53BBB6}" type="datetimeFigureOut">
               <a:rPr lang="en-US" smtClean="0"/>
-              <a:t>11/27/23</a:t>
+              <a:t>11/30/23</a:t>
             </a:fld>
             <a:endParaRPr lang="en-US"/>
           </a:p>
@@ -3730,7 +3814,7 @@
           <a:p>
             <a:fld id="{3CADBD16-5BFB-4D9F-9646-C75D1B53BBB6}" type="datetimeFigureOut">
               <a:rPr lang="en-US" smtClean="0"/>
-              <a:t>11/27/23</a:t>
+              <a:t>11/30/23</a:t>
             </a:fld>
             <a:endParaRPr lang="en-US"/>
           </a:p>
@@ -4239,7 +4323,7 @@
             <a:fld id="{3CADBD16-5BFB-4D9F-9646-C75D1B53BBB6}" type="datetimeFigureOut">
               <a:rPr lang="en-US" smtClean="0"/>
               <a:pPr/>
-              <a:t>11/27/23</a:t>
+              <a:t>11/30/23</a:t>
             </a:fld>
             <a:endParaRPr lang="en-US" dirty="0"/>
           </a:p>
@@ -7721,7 +7805,7 @@
           <p:nvPr/>
         </p:nvPicPr>
         <p:blipFill>
-          <a:blip r:embed="rId2"/>
+          <a:blip r:embed="rId3"/>
           <a:stretch>
             <a:fillRect/>
           </a:stretch>
@@ -7750,7 +7834,7 @@
         </p:nvSpPr>
         <p:spPr>
           <a:xfrm>
-            <a:off x="6581130" y="3097371"/>
+            <a:off x="6581130" y="2899237"/>
             <a:ext cx="3113903" cy="1477328"/>
           </a:xfrm>
           <a:prstGeom prst="rect">
@@ -7856,7 +7940,7 @@
           <p:nvPr/>
         </p:nvPicPr>
         <p:blipFill>
-          <a:blip r:embed="rId3"/>
+          <a:blip r:embed="rId4"/>
           <a:stretch>
             <a:fillRect/>
           </a:stretch>

</xml_diff>